<commit_message>
#87: Fix missing process "New Line" character in text paragraph
</commit_message>
<xml_diff>
--- a/ShapeCrawler.Tests.Unit/Resource/001.pptx
+++ b/ShapeCrawler.Tests.Unit/Resource/001.pptx
@@ -263,7 +263,7 @@
           <a:p>
             <a:fld id="{6A2D1428-0459-4F75-829F-043936AE8C9E}" type="datetimeFigureOut">
               <a:rPr lang="en-US" smtClean="0"/>
-              <a:t>1/7/2021</a:t>
+              <a:t>1/12/2021</a:t>
             </a:fld>
             <a:endParaRPr lang="en-US"/>
           </a:p>
@@ -519,7 +519,7 @@
           <a:p>
             <a:fld id="{6A2D1428-0459-4F75-829F-043936AE8C9E}" type="datetimeFigureOut">
               <a:rPr lang="en-US" smtClean="0"/>
-              <a:t>1/7/2021</a:t>
+              <a:t>1/12/2021</a:t>
             </a:fld>
             <a:endParaRPr lang="en-US"/>
           </a:p>
@@ -729,7 +729,7 @@
           <a:p>
             <a:fld id="{6A2D1428-0459-4F75-829F-043936AE8C9E}" type="datetimeFigureOut">
               <a:rPr lang="en-US" smtClean="0"/>
-              <a:t>1/7/2021</a:t>
+              <a:t>1/12/2021</a:t>
             </a:fld>
             <a:endParaRPr lang="en-US"/>
           </a:p>
@@ -929,7 +929,7 @@
           <a:p>
             <a:fld id="{6A2D1428-0459-4F75-829F-043936AE8C9E}" type="datetimeFigureOut">
               <a:rPr lang="en-US" smtClean="0"/>
-              <a:t>1/7/2021</a:t>
+              <a:t>1/12/2021</a:t>
             </a:fld>
             <a:endParaRPr lang="en-US"/>
           </a:p>
@@ -1205,7 +1205,7 @@
           <a:p>
             <a:fld id="{6A2D1428-0459-4F75-829F-043936AE8C9E}" type="datetimeFigureOut">
               <a:rPr lang="en-US" smtClean="0"/>
-              <a:t>1/7/2021</a:t>
+              <a:t>1/12/2021</a:t>
             </a:fld>
             <a:endParaRPr lang="en-US"/>
           </a:p>
@@ -1473,7 +1473,7 @@
           <a:p>
             <a:fld id="{6A2D1428-0459-4F75-829F-043936AE8C9E}" type="datetimeFigureOut">
               <a:rPr lang="en-US" smtClean="0"/>
-              <a:t>1/7/2021</a:t>
+              <a:t>1/12/2021</a:t>
             </a:fld>
             <a:endParaRPr lang="en-US"/>
           </a:p>
@@ -1888,7 +1888,7 @@
           <a:p>
             <a:fld id="{6A2D1428-0459-4F75-829F-043936AE8C9E}" type="datetimeFigureOut">
               <a:rPr lang="en-US" smtClean="0"/>
-              <a:t>1/7/2021</a:t>
+              <a:t>1/12/2021</a:t>
             </a:fld>
             <a:endParaRPr lang="en-US"/>
           </a:p>
@@ -2030,7 +2030,7 @@
           <a:p>
             <a:fld id="{6A2D1428-0459-4F75-829F-043936AE8C9E}" type="datetimeFigureOut">
               <a:rPr lang="en-US" smtClean="0"/>
-              <a:t>1/7/2021</a:t>
+              <a:t>1/12/2021</a:t>
             </a:fld>
             <a:endParaRPr lang="en-US"/>
           </a:p>
@@ -2143,7 +2143,7 @@
           <a:p>
             <a:fld id="{6A2D1428-0459-4F75-829F-043936AE8C9E}" type="datetimeFigureOut">
               <a:rPr lang="en-US" smtClean="0"/>
-              <a:t>1/7/2021</a:t>
+              <a:t>1/12/2021</a:t>
             </a:fld>
             <a:endParaRPr lang="en-US"/>
           </a:p>
@@ -2456,7 +2456,7 @@
           <a:p>
             <a:fld id="{6A2D1428-0459-4F75-829F-043936AE8C9E}" type="datetimeFigureOut">
               <a:rPr lang="en-US" smtClean="0"/>
-              <a:t>1/7/2021</a:t>
+              <a:t>1/12/2021</a:t>
             </a:fld>
             <a:endParaRPr lang="en-US"/>
           </a:p>
@@ -2745,7 +2745,7 @@
           <a:p>
             <a:fld id="{6A2D1428-0459-4F75-829F-043936AE8C9E}" type="datetimeFigureOut">
               <a:rPr lang="en-US" smtClean="0"/>
-              <a:t>1/7/2021</a:t>
+              <a:t>1/12/2021</a:t>
             </a:fld>
             <a:endParaRPr lang="en-US"/>
           </a:p>
@@ -2988,7 +2988,7 @@
           <a:p>
             <a:fld id="{6A2D1428-0459-4F75-829F-043936AE8C9E}" type="datetimeFigureOut">
               <a:rPr lang="en-US" smtClean="0"/>
-              <a:t>1/7/2021</a:t>
+              <a:t>1/12/2021</a:t>
             </a:fld>
             <a:endParaRPr lang="en-US"/>
           </a:p>
@@ -3479,6 +3479,131 @@
           </a:p>
         </p:txBody>
       </p:sp>
+      <p:sp>
+        <p:nvSpPr>
+          <p:cNvPr id="5" name="TextBox 4">
+            <a:extLst>
+              <a:ext uri="{FF2B5EF4-FFF2-40B4-BE49-F238E27FC236}">
+                <a16:creationId xmlns:a16="http://schemas.microsoft.com/office/drawing/2014/main" id="{73982BA7-898A-4C6F-9935-60B15B764D16}"/>
+              </a:ext>
+            </a:extLst>
+          </p:cNvPr>
+          <p:cNvSpPr txBox="1"/>
+          <p:nvPr/>
+        </p:nvSpPr>
+        <p:spPr>
+          <a:xfrm>
+            <a:off x="1524000" y="4740422"/>
+            <a:ext cx="1281723" cy="338554"/>
+          </a:xfrm>
+          <a:prstGeom prst="rect">
+            <a:avLst/>
+          </a:prstGeom>
+        </p:spPr>
+        <p:style>
+          <a:lnRef idx="2">
+            <a:schemeClr val="dk1"/>
+          </a:lnRef>
+          <a:fillRef idx="1">
+            <a:schemeClr val="lt1"/>
+          </a:fillRef>
+          <a:effectRef idx="0">
+            <a:schemeClr val="dk1"/>
+          </a:effectRef>
+          <a:fontRef idx="minor">
+            <a:schemeClr val="dk1"/>
+          </a:fontRef>
+        </p:style>
+        <p:txBody>
+          <a:bodyPr wrap="square" rtlCol="0">
+            <a:spAutoFit/>
+          </a:bodyPr>
+          <a:lstStyle/>
+          <a:p>
+            <a:r>
+              <a:rPr lang="en-US" sz="1600" dirty="0"/>
+              <a:t> </a:t>
+            </a:r>
+            <a:r>
+              <a:rPr lang="en-US" sz="1600" dirty="0">
+                <a:latin typeface="+mj-lt"/>
+              </a:rPr>
+              <a:t>id5-Text1</a:t>
+            </a:r>
+            <a:endParaRPr lang="ru-RU" sz="1600" dirty="0">
+              <a:latin typeface="+mj-lt"/>
+            </a:endParaRPr>
+          </a:p>
+        </p:txBody>
+      </p:sp>
+      <p:sp>
+        <p:nvSpPr>
+          <p:cNvPr id="6" name="TextBox 5">
+            <a:extLst>
+              <a:ext uri="{FF2B5EF4-FFF2-40B4-BE49-F238E27FC236}">
+                <a16:creationId xmlns:a16="http://schemas.microsoft.com/office/drawing/2014/main" id="{477C390C-15D3-4828-8059-8081B75FA1C8}"/>
+              </a:ext>
+            </a:extLst>
+          </p:cNvPr>
+          <p:cNvSpPr txBox="1"/>
+          <p:nvPr/>
+        </p:nvSpPr>
+        <p:spPr>
+          <a:xfrm>
+            <a:off x="3157415" y="4040554"/>
+            <a:ext cx="1281723" cy="584775"/>
+          </a:xfrm>
+          <a:prstGeom prst="rect">
+            <a:avLst/>
+          </a:prstGeom>
+        </p:spPr>
+        <p:style>
+          <a:lnRef idx="2">
+            <a:schemeClr val="dk1"/>
+          </a:lnRef>
+          <a:fillRef idx="1">
+            <a:schemeClr val="lt1"/>
+          </a:fillRef>
+          <a:effectRef idx="0">
+            <a:schemeClr val="dk1"/>
+          </a:effectRef>
+          <a:fontRef idx="minor">
+            <a:schemeClr val="dk1"/>
+          </a:fontRef>
+        </p:style>
+        <p:txBody>
+          <a:bodyPr wrap="square" rtlCol="0">
+            <a:spAutoFit/>
+          </a:bodyPr>
+          <a:lstStyle/>
+          <a:p>
+            <a:pPr marL="285750" indent="-285750">
+              <a:buFont typeface="Arial" panose="020B0604020202020204" pitchFamily="34" charset="0"/>
+              <a:buChar char="•"/>
+            </a:pPr>
+            <a:r>
+              <a:rPr lang="en-US" sz="1600" dirty="0">
+                <a:latin typeface="+mj-lt"/>
+              </a:rPr>
+              <a:t>id6-Text1</a:t>
+            </a:r>
+            <a:br>
+              <a:rPr lang="en-US" sz="1600" dirty="0">
+                <a:latin typeface="+mj-lt"/>
+              </a:rPr>
+            </a:br>
+            <a:r>
+              <a:rPr lang="en-US" sz="1600" dirty="0">
+                <a:latin typeface="+mj-lt"/>
+              </a:rPr>
+              <a:t>Text2</a:t>
+            </a:r>
+            <a:endParaRPr lang="ru-RU" sz="1600" dirty="0">
+              <a:latin typeface="+mj-lt"/>
+            </a:endParaRPr>
+          </a:p>
+        </p:txBody>
+      </p:sp>
     </p:spTree>
     <p:extLst>
       <p:ext uri="{BB962C8B-B14F-4D97-AF65-F5344CB8AC3E}">

</xml_diff>

<commit_message>
#87: Fix missing process "New Line" character in text paragraph (#88)
</commit_message>
<xml_diff>
--- a/ShapeCrawler.Tests.Unit/Resource/001.pptx
+++ b/ShapeCrawler.Tests.Unit/Resource/001.pptx
@@ -263,7 +263,7 @@
           <a:p>
             <a:fld id="{6A2D1428-0459-4F75-829F-043936AE8C9E}" type="datetimeFigureOut">
               <a:rPr lang="en-US" smtClean="0"/>
-              <a:t>1/7/2021</a:t>
+              <a:t>1/12/2021</a:t>
             </a:fld>
             <a:endParaRPr lang="en-US"/>
           </a:p>
@@ -519,7 +519,7 @@
           <a:p>
             <a:fld id="{6A2D1428-0459-4F75-829F-043936AE8C9E}" type="datetimeFigureOut">
               <a:rPr lang="en-US" smtClean="0"/>
-              <a:t>1/7/2021</a:t>
+              <a:t>1/12/2021</a:t>
             </a:fld>
             <a:endParaRPr lang="en-US"/>
           </a:p>
@@ -729,7 +729,7 @@
           <a:p>
             <a:fld id="{6A2D1428-0459-4F75-829F-043936AE8C9E}" type="datetimeFigureOut">
               <a:rPr lang="en-US" smtClean="0"/>
-              <a:t>1/7/2021</a:t>
+              <a:t>1/12/2021</a:t>
             </a:fld>
             <a:endParaRPr lang="en-US"/>
           </a:p>
@@ -929,7 +929,7 @@
           <a:p>
             <a:fld id="{6A2D1428-0459-4F75-829F-043936AE8C9E}" type="datetimeFigureOut">
               <a:rPr lang="en-US" smtClean="0"/>
-              <a:t>1/7/2021</a:t>
+              <a:t>1/12/2021</a:t>
             </a:fld>
             <a:endParaRPr lang="en-US"/>
           </a:p>
@@ -1205,7 +1205,7 @@
           <a:p>
             <a:fld id="{6A2D1428-0459-4F75-829F-043936AE8C9E}" type="datetimeFigureOut">
               <a:rPr lang="en-US" smtClean="0"/>
-              <a:t>1/7/2021</a:t>
+              <a:t>1/12/2021</a:t>
             </a:fld>
             <a:endParaRPr lang="en-US"/>
           </a:p>
@@ -1473,7 +1473,7 @@
           <a:p>
             <a:fld id="{6A2D1428-0459-4F75-829F-043936AE8C9E}" type="datetimeFigureOut">
               <a:rPr lang="en-US" smtClean="0"/>
-              <a:t>1/7/2021</a:t>
+              <a:t>1/12/2021</a:t>
             </a:fld>
             <a:endParaRPr lang="en-US"/>
           </a:p>
@@ -1888,7 +1888,7 @@
           <a:p>
             <a:fld id="{6A2D1428-0459-4F75-829F-043936AE8C9E}" type="datetimeFigureOut">
               <a:rPr lang="en-US" smtClean="0"/>
-              <a:t>1/7/2021</a:t>
+              <a:t>1/12/2021</a:t>
             </a:fld>
             <a:endParaRPr lang="en-US"/>
           </a:p>
@@ -2030,7 +2030,7 @@
           <a:p>
             <a:fld id="{6A2D1428-0459-4F75-829F-043936AE8C9E}" type="datetimeFigureOut">
               <a:rPr lang="en-US" smtClean="0"/>
-              <a:t>1/7/2021</a:t>
+              <a:t>1/12/2021</a:t>
             </a:fld>
             <a:endParaRPr lang="en-US"/>
           </a:p>
@@ -2143,7 +2143,7 @@
           <a:p>
             <a:fld id="{6A2D1428-0459-4F75-829F-043936AE8C9E}" type="datetimeFigureOut">
               <a:rPr lang="en-US" smtClean="0"/>
-              <a:t>1/7/2021</a:t>
+              <a:t>1/12/2021</a:t>
             </a:fld>
             <a:endParaRPr lang="en-US"/>
           </a:p>
@@ -2456,7 +2456,7 @@
           <a:p>
             <a:fld id="{6A2D1428-0459-4F75-829F-043936AE8C9E}" type="datetimeFigureOut">
               <a:rPr lang="en-US" smtClean="0"/>
-              <a:t>1/7/2021</a:t>
+              <a:t>1/12/2021</a:t>
             </a:fld>
             <a:endParaRPr lang="en-US"/>
           </a:p>
@@ -2745,7 +2745,7 @@
           <a:p>
             <a:fld id="{6A2D1428-0459-4F75-829F-043936AE8C9E}" type="datetimeFigureOut">
               <a:rPr lang="en-US" smtClean="0"/>
-              <a:t>1/7/2021</a:t>
+              <a:t>1/12/2021</a:t>
             </a:fld>
             <a:endParaRPr lang="en-US"/>
           </a:p>
@@ -2988,7 +2988,7 @@
           <a:p>
             <a:fld id="{6A2D1428-0459-4F75-829F-043936AE8C9E}" type="datetimeFigureOut">
               <a:rPr lang="en-US" smtClean="0"/>
-              <a:t>1/7/2021</a:t>
+              <a:t>1/12/2021</a:t>
             </a:fld>
             <a:endParaRPr lang="en-US"/>
           </a:p>
@@ -3479,6 +3479,131 @@
           </a:p>
         </p:txBody>
       </p:sp>
+      <p:sp>
+        <p:nvSpPr>
+          <p:cNvPr id="5" name="TextBox 4">
+            <a:extLst>
+              <a:ext uri="{FF2B5EF4-FFF2-40B4-BE49-F238E27FC236}">
+                <a16:creationId xmlns:a16="http://schemas.microsoft.com/office/drawing/2014/main" id="{73982BA7-898A-4C6F-9935-60B15B764D16}"/>
+              </a:ext>
+            </a:extLst>
+          </p:cNvPr>
+          <p:cNvSpPr txBox="1"/>
+          <p:nvPr/>
+        </p:nvSpPr>
+        <p:spPr>
+          <a:xfrm>
+            <a:off x="1524000" y="4740422"/>
+            <a:ext cx="1281723" cy="338554"/>
+          </a:xfrm>
+          <a:prstGeom prst="rect">
+            <a:avLst/>
+          </a:prstGeom>
+        </p:spPr>
+        <p:style>
+          <a:lnRef idx="2">
+            <a:schemeClr val="dk1"/>
+          </a:lnRef>
+          <a:fillRef idx="1">
+            <a:schemeClr val="lt1"/>
+          </a:fillRef>
+          <a:effectRef idx="0">
+            <a:schemeClr val="dk1"/>
+          </a:effectRef>
+          <a:fontRef idx="minor">
+            <a:schemeClr val="dk1"/>
+          </a:fontRef>
+        </p:style>
+        <p:txBody>
+          <a:bodyPr wrap="square" rtlCol="0">
+            <a:spAutoFit/>
+          </a:bodyPr>
+          <a:lstStyle/>
+          <a:p>
+            <a:r>
+              <a:rPr lang="en-US" sz="1600" dirty="0"/>
+              <a:t> </a:t>
+            </a:r>
+            <a:r>
+              <a:rPr lang="en-US" sz="1600" dirty="0">
+                <a:latin typeface="+mj-lt"/>
+              </a:rPr>
+              <a:t>id5-Text1</a:t>
+            </a:r>
+            <a:endParaRPr lang="ru-RU" sz="1600" dirty="0">
+              <a:latin typeface="+mj-lt"/>
+            </a:endParaRPr>
+          </a:p>
+        </p:txBody>
+      </p:sp>
+      <p:sp>
+        <p:nvSpPr>
+          <p:cNvPr id="6" name="TextBox 5">
+            <a:extLst>
+              <a:ext uri="{FF2B5EF4-FFF2-40B4-BE49-F238E27FC236}">
+                <a16:creationId xmlns:a16="http://schemas.microsoft.com/office/drawing/2014/main" id="{477C390C-15D3-4828-8059-8081B75FA1C8}"/>
+              </a:ext>
+            </a:extLst>
+          </p:cNvPr>
+          <p:cNvSpPr txBox="1"/>
+          <p:nvPr/>
+        </p:nvSpPr>
+        <p:spPr>
+          <a:xfrm>
+            <a:off x="3157415" y="4040554"/>
+            <a:ext cx="1281723" cy="584775"/>
+          </a:xfrm>
+          <a:prstGeom prst="rect">
+            <a:avLst/>
+          </a:prstGeom>
+        </p:spPr>
+        <p:style>
+          <a:lnRef idx="2">
+            <a:schemeClr val="dk1"/>
+          </a:lnRef>
+          <a:fillRef idx="1">
+            <a:schemeClr val="lt1"/>
+          </a:fillRef>
+          <a:effectRef idx="0">
+            <a:schemeClr val="dk1"/>
+          </a:effectRef>
+          <a:fontRef idx="minor">
+            <a:schemeClr val="dk1"/>
+          </a:fontRef>
+        </p:style>
+        <p:txBody>
+          <a:bodyPr wrap="square" rtlCol="0">
+            <a:spAutoFit/>
+          </a:bodyPr>
+          <a:lstStyle/>
+          <a:p>
+            <a:pPr marL="285750" indent="-285750">
+              <a:buFont typeface="Arial" panose="020B0604020202020204" pitchFamily="34" charset="0"/>
+              <a:buChar char="•"/>
+            </a:pPr>
+            <a:r>
+              <a:rPr lang="en-US" sz="1600" dirty="0">
+                <a:latin typeface="+mj-lt"/>
+              </a:rPr>
+              <a:t>id6-Text1</a:t>
+            </a:r>
+            <a:br>
+              <a:rPr lang="en-US" sz="1600" dirty="0">
+                <a:latin typeface="+mj-lt"/>
+              </a:rPr>
+            </a:br>
+            <a:r>
+              <a:rPr lang="en-US" sz="1600" dirty="0">
+                <a:latin typeface="+mj-lt"/>
+              </a:rPr>
+              <a:t>Text2</a:t>
+            </a:r>
+            <a:endParaRPr lang="ru-RU" sz="1600" dirty="0">
+              <a:latin typeface="+mj-lt"/>
+            </a:endParaRPr>
+          </a:p>
+        </p:txBody>
+      </p:sp>
     </p:spTree>
     <p:extLst>
       <p:ext uri="{BB962C8B-B14F-4D97-AF65-F5344CB8AC3E}">

</xml_diff>

<commit_message>
SC-31: Add setter for Text.Content
</commit_message>
<xml_diff>
--- a/ShapeCrawler.Tests.Unit/Resource/001.pptx
+++ b/ShapeCrawler.Tests.Unit/Resource/001.pptx
@@ -263,7 +263,7 @@
           <a:p>
             <a:fld id="{6A2D1428-0459-4F75-829F-043936AE8C9E}" type="datetimeFigureOut">
               <a:rPr lang="en-US" smtClean="0"/>
-              <a:t>1/12/2021</a:t>
+              <a:t>1/19/2021</a:t>
             </a:fld>
             <a:endParaRPr lang="en-US"/>
           </a:p>
@@ -519,7 +519,7 @@
           <a:p>
             <a:fld id="{6A2D1428-0459-4F75-829F-043936AE8C9E}" type="datetimeFigureOut">
               <a:rPr lang="en-US" smtClean="0"/>
-              <a:t>1/12/2021</a:t>
+              <a:t>1/19/2021</a:t>
             </a:fld>
             <a:endParaRPr lang="en-US"/>
           </a:p>
@@ -729,7 +729,7 @@
           <a:p>
             <a:fld id="{6A2D1428-0459-4F75-829F-043936AE8C9E}" type="datetimeFigureOut">
               <a:rPr lang="en-US" smtClean="0"/>
-              <a:t>1/12/2021</a:t>
+              <a:t>1/19/2021</a:t>
             </a:fld>
             <a:endParaRPr lang="en-US"/>
           </a:p>
@@ -929,7 +929,7 @@
           <a:p>
             <a:fld id="{6A2D1428-0459-4F75-829F-043936AE8C9E}" type="datetimeFigureOut">
               <a:rPr lang="en-US" smtClean="0"/>
-              <a:t>1/12/2021</a:t>
+              <a:t>1/19/2021</a:t>
             </a:fld>
             <a:endParaRPr lang="en-US"/>
           </a:p>
@@ -1205,7 +1205,7 @@
           <a:p>
             <a:fld id="{6A2D1428-0459-4F75-829F-043936AE8C9E}" type="datetimeFigureOut">
               <a:rPr lang="en-US" smtClean="0"/>
-              <a:t>1/12/2021</a:t>
+              <a:t>1/19/2021</a:t>
             </a:fld>
             <a:endParaRPr lang="en-US"/>
           </a:p>
@@ -1473,7 +1473,7 @@
           <a:p>
             <a:fld id="{6A2D1428-0459-4F75-829F-043936AE8C9E}" type="datetimeFigureOut">
               <a:rPr lang="en-US" smtClean="0"/>
-              <a:t>1/12/2021</a:t>
+              <a:t>1/19/2021</a:t>
             </a:fld>
             <a:endParaRPr lang="en-US"/>
           </a:p>
@@ -1888,7 +1888,7 @@
           <a:p>
             <a:fld id="{6A2D1428-0459-4F75-829F-043936AE8C9E}" type="datetimeFigureOut">
               <a:rPr lang="en-US" smtClean="0"/>
-              <a:t>1/12/2021</a:t>
+              <a:t>1/19/2021</a:t>
             </a:fld>
             <a:endParaRPr lang="en-US"/>
           </a:p>
@@ -2030,7 +2030,7 @@
           <a:p>
             <a:fld id="{6A2D1428-0459-4F75-829F-043936AE8C9E}" type="datetimeFigureOut">
               <a:rPr lang="en-US" smtClean="0"/>
-              <a:t>1/12/2021</a:t>
+              <a:t>1/19/2021</a:t>
             </a:fld>
             <a:endParaRPr lang="en-US"/>
           </a:p>
@@ -2143,7 +2143,7 @@
           <a:p>
             <a:fld id="{6A2D1428-0459-4F75-829F-043936AE8C9E}" type="datetimeFigureOut">
               <a:rPr lang="en-US" smtClean="0"/>
-              <a:t>1/12/2021</a:t>
+              <a:t>1/19/2021</a:t>
             </a:fld>
             <a:endParaRPr lang="en-US"/>
           </a:p>
@@ -2456,7 +2456,7 @@
           <a:p>
             <a:fld id="{6A2D1428-0459-4F75-829F-043936AE8C9E}" type="datetimeFigureOut">
               <a:rPr lang="en-US" smtClean="0"/>
-              <a:t>1/12/2021</a:t>
+              <a:t>1/19/2021</a:t>
             </a:fld>
             <a:endParaRPr lang="en-US"/>
           </a:p>
@@ -2745,7 +2745,7 @@
           <a:p>
             <a:fld id="{6A2D1428-0459-4F75-829F-043936AE8C9E}" type="datetimeFigureOut">
               <a:rPr lang="en-US" smtClean="0"/>
-              <a:t>1/12/2021</a:t>
+              <a:t>1/19/2021</a:t>
             </a:fld>
             <a:endParaRPr lang="en-US"/>
           </a:p>
@@ -2988,7 +2988,7 @@
           <a:p>
             <a:fld id="{6A2D1428-0459-4F75-829F-043936AE8C9E}" type="datetimeFigureOut">
               <a:rPr lang="en-US" smtClean="0"/>
-              <a:t>1/12/2021</a:t>
+              <a:t>1/19/2021</a:t>
             </a:fld>
             <a:endParaRPr lang="en-US"/>
           </a:p>
@@ -3604,6 +3604,84 @@
           </a:p>
         </p:txBody>
       </p:sp>
+      <p:sp>
+        <p:nvSpPr>
+          <p:cNvPr id="3" name="TextBox 2">
+            <a:extLst>
+              <a:ext uri="{FF2B5EF4-FFF2-40B4-BE49-F238E27FC236}">
+                <a16:creationId xmlns:a16="http://schemas.microsoft.com/office/drawing/2014/main" id="{7933C1D2-13CD-4C4A-B08E-7C6D1058940F}"/>
+              </a:ext>
+            </a:extLst>
+          </p:cNvPr>
+          <p:cNvSpPr txBox="1"/>
+          <p:nvPr/>
+        </p:nvSpPr>
+        <p:spPr>
+          <a:xfrm>
+            <a:off x="4876801" y="4040554"/>
+            <a:ext cx="3212122" cy="523220"/>
+          </a:xfrm>
+          <a:prstGeom prst="rect">
+            <a:avLst/>
+          </a:prstGeom>
+        </p:spPr>
+        <p:style>
+          <a:lnRef idx="2">
+            <a:schemeClr val="accent5"/>
+          </a:lnRef>
+          <a:fillRef idx="1">
+            <a:schemeClr val="lt1"/>
+          </a:fillRef>
+          <a:effectRef idx="0">
+            <a:schemeClr val="accent5"/>
+          </a:effectRef>
+          <a:fontRef idx="minor">
+            <a:schemeClr val="dk1"/>
+          </a:fontRef>
+        </p:style>
+        <p:txBody>
+          <a:bodyPr wrap="square" rtlCol="0">
+            <a:spAutoFit/>
+          </a:bodyPr>
+          <a:lstStyle/>
+          <a:p>
+            <a:r>
+              <a:rPr lang="en-US" sz="1400" dirty="0">
+                <a:latin typeface="Times New Roman" panose="02020603050405020304" pitchFamily="18" charset="0"/>
+                <a:cs typeface="Times New Roman" panose="02020603050405020304" pitchFamily="18" charset="0"/>
+              </a:rPr>
+              <a:t>id3_Hello World</a:t>
+            </a:r>
+          </a:p>
+          <a:p>
+            <a:r>
+              <a:rPr lang="en-US" sz="1400" b="1" dirty="0">
+                <a:latin typeface="Times New Roman" panose="02020603050405020304" pitchFamily="18" charset="0"/>
+                <a:cs typeface="Times New Roman" panose="02020603050405020304" pitchFamily="18" charset="0"/>
+              </a:rPr>
+              <a:t>I am </a:t>
+            </a:r>
+            <a:r>
+              <a:rPr lang="en-US" sz="1400" b="1" dirty="0" err="1">
+                <a:latin typeface="Times New Roman" panose="02020603050405020304" pitchFamily="18" charset="0"/>
+                <a:cs typeface="Times New Roman" panose="02020603050405020304" pitchFamily="18" charset="0"/>
+              </a:rPr>
+              <a:t>ShapeCrawler</a:t>
+            </a:r>
+            <a:r>
+              <a:rPr lang="en-US" sz="1400" b="1" dirty="0">
+                <a:latin typeface="Times New Roman" panose="02020603050405020304" pitchFamily="18" charset="0"/>
+                <a:cs typeface="Times New Roman" panose="02020603050405020304" pitchFamily="18" charset="0"/>
+              </a:rPr>
+              <a:t>!</a:t>
+            </a:r>
+            <a:endParaRPr lang="ru-RU" sz="1400" b="1" dirty="0">
+              <a:latin typeface="Times New Roman" panose="02020603050405020304" pitchFamily="18" charset="0"/>
+              <a:cs typeface="Times New Roman" panose="02020603050405020304" pitchFamily="18" charset="0"/>
+            </a:endParaRPr>
+          </a:p>
+        </p:txBody>
+      </p:sp>
     </p:spTree>
     <p:extLst>
       <p:ext uri="{BB962C8B-B14F-4D97-AF65-F5344CB8AC3E}">

</xml_diff>

<commit_message>
SC-31: Add setter for Text.Content (#92)
</commit_message>
<xml_diff>
--- a/ShapeCrawler.Tests.Unit/Resource/001.pptx
+++ b/ShapeCrawler.Tests.Unit/Resource/001.pptx
@@ -263,7 +263,7 @@
           <a:p>
             <a:fld id="{6A2D1428-0459-4F75-829F-043936AE8C9E}" type="datetimeFigureOut">
               <a:rPr lang="en-US" smtClean="0"/>
-              <a:t>1/12/2021</a:t>
+              <a:t>1/19/2021</a:t>
             </a:fld>
             <a:endParaRPr lang="en-US"/>
           </a:p>
@@ -519,7 +519,7 @@
           <a:p>
             <a:fld id="{6A2D1428-0459-4F75-829F-043936AE8C9E}" type="datetimeFigureOut">
               <a:rPr lang="en-US" smtClean="0"/>
-              <a:t>1/12/2021</a:t>
+              <a:t>1/19/2021</a:t>
             </a:fld>
             <a:endParaRPr lang="en-US"/>
           </a:p>
@@ -729,7 +729,7 @@
           <a:p>
             <a:fld id="{6A2D1428-0459-4F75-829F-043936AE8C9E}" type="datetimeFigureOut">
               <a:rPr lang="en-US" smtClean="0"/>
-              <a:t>1/12/2021</a:t>
+              <a:t>1/19/2021</a:t>
             </a:fld>
             <a:endParaRPr lang="en-US"/>
           </a:p>
@@ -929,7 +929,7 @@
           <a:p>
             <a:fld id="{6A2D1428-0459-4F75-829F-043936AE8C9E}" type="datetimeFigureOut">
               <a:rPr lang="en-US" smtClean="0"/>
-              <a:t>1/12/2021</a:t>
+              <a:t>1/19/2021</a:t>
             </a:fld>
             <a:endParaRPr lang="en-US"/>
           </a:p>
@@ -1205,7 +1205,7 @@
           <a:p>
             <a:fld id="{6A2D1428-0459-4F75-829F-043936AE8C9E}" type="datetimeFigureOut">
               <a:rPr lang="en-US" smtClean="0"/>
-              <a:t>1/12/2021</a:t>
+              <a:t>1/19/2021</a:t>
             </a:fld>
             <a:endParaRPr lang="en-US"/>
           </a:p>
@@ -1473,7 +1473,7 @@
           <a:p>
             <a:fld id="{6A2D1428-0459-4F75-829F-043936AE8C9E}" type="datetimeFigureOut">
               <a:rPr lang="en-US" smtClean="0"/>
-              <a:t>1/12/2021</a:t>
+              <a:t>1/19/2021</a:t>
             </a:fld>
             <a:endParaRPr lang="en-US"/>
           </a:p>
@@ -1888,7 +1888,7 @@
           <a:p>
             <a:fld id="{6A2D1428-0459-4F75-829F-043936AE8C9E}" type="datetimeFigureOut">
               <a:rPr lang="en-US" smtClean="0"/>
-              <a:t>1/12/2021</a:t>
+              <a:t>1/19/2021</a:t>
             </a:fld>
             <a:endParaRPr lang="en-US"/>
           </a:p>
@@ -2030,7 +2030,7 @@
           <a:p>
             <a:fld id="{6A2D1428-0459-4F75-829F-043936AE8C9E}" type="datetimeFigureOut">
               <a:rPr lang="en-US" smtClean="0"/>
-              <a:t>1/12/2021</a:t>
+              <a:t>1/19/2021</a:t>
             </a:fld>
             <a:endParaRPr lang="en-US"/>
           </a:p>
@@ -2143,7 +2143,7 @@
           <a:p>
             <a:fld id="{6A2D1428-0459-4F75-829F-043936AE8C9E}" type="datetimeFigureOut">
               <a:rPr lang="en-US" smtClean="0"/>
-              <a:t>1/12/2021</a:t>
+              <a:t>1/19/2021</a:t>
             </a:fld>
             <a:endParaRPr lang="en-US"/>
           </a:p>
@@ -2456,7 +2456,7 @@
           <a:p>
             <a:fld id="{6A2D1428-0459-4F75-829F-043936AE8C9E}" type="datetimeFigureOut">
               <a:rPr lang="en-US" smtClean="0"/>
-              <a:t>1/12/2021</a:t>
+              <a:t>1/19/2021</a:t>
             </a:fld>
             <a:endParaRPr lang="en-US"/>
           </a:p>
@@ -2745,7 +2745,7 @@
           <a:p>
             <a:fld id="{6A2D1428-0459-4F75-829F-043936AE8C9E}" type="datetimeFigureOut">
               <a:rPr lang="en-US" smtClean="0"/>
-              <a:t>1/12/2021</a:t>
+              <a:t>1/19/2021</a:t>
             </a:fld>
             <a:endParaRPr lang="en-US"/>
           </a:p>
@@ -2988,7 +2988,7 @@
           <a:p>
             <a:fld id="{6A2D1428-0459-4F75-829F-043936AE8C9E}" type="datetimeFigureOut">
               <a:rPr lang="en-US" smtClean="0"/>
-              <a:t>1/12/2021</a:t>
+              <a:t>1/19/2021</a:t>
             </a:fld>
             <a:endParaRPr lang="en-US"/>
           </a:p>
@@ -3604,6 +3604,84 @@
           </a:p>
         </p:txBody>
       </p:sp>
+      <p:sp>
+        <p:nvSpPr>
+          <p:cNvPr id="3" name="TextBox 2">
+            <a:extLst>
+              <a:ext uri="{FF2B5EF4-FFF2-40B4-BE49-F238E27FC236}">
+                <a16:creationId xmlns:a16="http://schemas.microsoft.com/office/drawing/2014/main" id="{7933C1D2-13CD-4C4A-B08E-7C6D1058940F}"/>
+              </a:ext>
+            </a:extLst>
+          </p:cNvPr>
+          <p:cNvSpPr txBox="1"/>
+          <p:nvPr/>
+        </p:nvSpPr>
+        <p:spPr>
+          <a:xfrm>
+            <a:off x="4876801" y="4040554"/>
+            <a:ext cx="3212122" cy="523220"/>
+          </a:xfrm>
+          <a:prstGeom prst="rect">
+            <a:avLst/>
+          </a:prstGeom>
+        </p:spPr>
+        <p:style>
+          <a:lnRef idx="2">
+            <a:schemeClr val="accent5"/>
+          </a:lnRef>
+          <a:fillRef idx="1">
+            <a:schemeClr val="lt1"/>
+          </a:fillRef>
+          <a:effectRef idx="0">
+            <a:schemeClr val="accent5"/>
+          </a:effectRef>
+          <a:fontRef idx="minor">
+            <a:schemeClr val="dk1"/>
+          </a:fontRef>
+        </p:style>
+        <p:txBody>
+          <a:bodyPr wrap="square" rtlCol="0">
+            <a:spAutoFit/>
+          </a:bodyPr>
+          <a:lstStyle/>
+          <a:p>
+            <a:r>
+              <a:rPr lang="en-US" sz="1400" dirty="0">
+                <a:latin typeface="Times New Roman" panose="02020603050405020304" pitchFamily="18" charset="0"/>
+                <a:cs typeface="Times New Roman" panose="02020603050405020304" pitchFamily="18" charset="0"/>
+              </a:rPr>
+              <a:t>id3_Hello World</a:t>
+            </a:r>
+          </a:p>
+          <a:p>
+            <a:r>
+              <a:rPr lang="en-US" sz="1400" b="1" dirty="0">
+                <a:latin typeface="Times New Roman" panose="02020603050405020304" pitchFamily="18" charset="0"/>
+                <a:cs typeface="Times New Roman" panose="02020603050405020304" pitchFamily="18" charset="0"/>
+              </a:rPr>
+              <a:t>I am </a:t>
+            </a:r>
+            <a:r>
+              <a:rPr lang="en-US" sz="1400" b="1" dirty="0" err="1">
+                <a:latin typeface="Times New Roman" panose="02020603050405020304" pitchFamily="18" charset="0"/>
+                <a:cs typeface="Times New Roman" panose="02020603050405020304" pitchFamily="18" charset="0"/>
+              </a:rPr>
+              <a:t>ShapeCrawler</a:t>
+            </a:r>
+            <a:r>
+              <a:rPr lang="en-US" sz="1400" b="1" dirty="0">
+                <a:latin typeface="Times New Roman" panose="02020603050405020304" pitchFamily="18" charset="0"/>
+                <a:cs typeface="Times New Roman" panose="02020603050405020304" pitchFamily="18" charset="0"/>
+              </a:rPr>
+              <a:t>!</a:t>
+            </a:r>
+            <a:endParaRPr lang="ru-RU" sz="1400" b="1" dirty="0">
+              <a:latin typeface="Times New Roman" panose="02020603050405020304" pitchFamily="18" charset="0"/>
+              <a:cs typeface="Times New Roman" panose="02020603050405020304" pitchFamily="18" charset="0"/>
+            </a:endParaRPr>
+          </a:p>
+        </p:txBody>
+      </p:sp>
     </p:spTree>
     <p:extLst>
       <p:ext uri="{BB962C8B-B14F-4D97-AF65-F5344CB8AC3E}">

</xml_diff>

<commit_message>
SC-35: Add CellSc.IsMergedCell property to detect whether cell is merged
</commit_message>
<xml_diff>
--- a/ShapeCrawler.Tests.Unit/Resource/001.pptx
+++ b/ShapeCrawler.Tests.Unit/Resource/001.pptx
@@ -263,7 +263,7 @@
           <a:p>
             <a:fld id="{6A2D1428-0459-4F75-829F-043936AE8C9E}" type="datetimeFigureOut">
               <a:rPr lang="en-US" smtClean="0"/>
-              <a:t>1/19/2021</a:t>
+              <a:t>1/20/2021</a:t>
             </a:fld>
             <a:endParaRPr lang="en-US"/>
           </a:p>
@@ -519,7 +519,7 @@
           <a:p>
             <a:fld id="{6A2D1428-0459-4F75-829F-043936AE8C9E}" type="datetimeFigureOut">
               <a:rPr lang="en-US" smtClean="0"/>
-              <a:t>1/19/2021</a:t>
+              <a:t>1/20/2021</a:t>
             </a:fld>
             <a:endParaRPr lang="en-US"/>
           </a:p>
@@ -729,7 +729,7 @@
           <a:p>
             <a:fld id="{6A2D1428-0459-4F75-829F-043936AE8C9E}" type="datetimeFigureOut">
               <a:rPr lang="en-US" smtClean="0"/>
-              <a:t>1/19/2021</a:t>
+              <a:t>1/20/2021</a:t>
             </a:fld>
             <a:endParaRPr lang="en-US"/>
           </a:p>
@@ -929,7 +929,7 @@
           <a:p>
             <a:fld id="{6A2D1428-0459-4F75-829F-043936AE8C9E}" type="datetimeFigureOut">
               <a:rPr lang="en-US" smtClean="0"/>
-              <a:t>1/19/2021</a:t>
+              <a:t>1/20/2021</a:t>
             </a:fld>
             <a:endParaRPr lang="en-US"/>
           </a:p>
@@ -1205,7 +1205,7 @@
           <a:p>
             <a:fld id="{6A2D1428-0459-4F75-829F-043936AE8C9E}" type="datetimeFigureOut">
               <a:rPr lang="en-US" smtClean="0"/>
-              <a:t>1/19/2021</a:t>
+              <a:t>1/20/2021</a:t>
             </a:fld>
             <a:endParaRPr lang="en-US"/>
           </a:p>
@@ -1473,7 +1473,7 @@
           <a:p>
             <a:fld id="{6A2D1428-0459-4F75-829F-043936AE8C9E}" type="datetimeFigureOut">
               <a:rPr lang="en-US" smtClean="0"/>
-              <a:t>1/19/2021</a:t>
+              <a:t>1/20/2021</a:t>
             </a:fld>
             <a:endParaRPr lang="en-US"/>
           </a:p>
@@ -1888,7 +1888,7 @@
           <a:p>
             <a:fld id="{6A2D1428-0459-4F75-829F-043936AE8C9E}" type="datetimeFigureOut">
               <a:rPr lang="en-US" smtClean="0"/>
-              <a:t>1/19/2021</a:t>
+              <a:t>1/20/2021</a:t>
             </a:fld>
             <a:endParaRPr lang="en-US"/>
           </a:p>
@@ -2030,7 +2030,7 @@
           <a:p>
             <a:fld id="{6A2D1428-0459-4F75-829F-043936AE8C9E}" type="datetimeFigureOut">
               <a:rPr lang="en-US" smtClean="0"/>
-              <a:t>1/19/2021</a:t>
+              <a:t>1/20/2021</a:t>
             </a:fld>
             <a:endParaRPr lang="en-US"/>
           </a:p>
@@ -2143,7 +2143,7 @@
           <a:p>
             <a:fld id="{6A2D1428-0459-4F75-829F-043936AE8C9E}" type="datetimeFigureOut">
               <a:rPr lang="en-US" smtClean="0"/>
-              <a:t>1/19/2021</a:t>
+              <a:t>1/20/2021</a:t>
             </a:fld>
             <a:endParaRPr lang="en-US"/>
           </a:p>
@@ -2456,7 +2456,7 @@
           <a:p>
             <a:fld id="{6A2D1428-0459-4F75-829F-043936AE8C9E}" type="datetimeFigureOut">
               <a:rPr lang="en-US" smtClean="0"/>
-              <a:t>1/19/2021</a:t>
+              <a:t>1/20/2021</a:t>
             </a:fld>
             <a:endParaRPr lang="en-US"/>
           </a:p>
@@ -2745,7 +2745,7 @@
           <a:p>
             <a:fld id="{6A2D1428-0459-4F75-829F-043936AE8C9E}" type="datetimeFigureOut">
               <a:rPr lang="en-US" smtClean="0"/>
-              <a:t>1/19/2021</a:t>
+              <a:t>1/20/2021</a:t>
             </a:fld>
             <a:endParaRPr lang="en-US"/>
           </a:p>
@@ -2988,7 +2988,7 @@
           <a:p>
             <a:fld id="{6A2D1428-0459-4F75-829F-043936AE8C9E}" type="datetimeFigureOut">
               <a:rPr lang="en-US" smtClean="0"/>
-              <a:t>1/19/2021</a:t>
+              <a:t>1/20/2021</a:t>
             </a:fld>
             <a:endParaRPr lang="en-US"/>
           </a:p>
@@ -3737,31 +3737,179 @@
           </a:p>
         </p:txBody>
       </p:sp>
-      <p:sp>
-        <p:nvSpPr>
-          <p:cNvPr id="3" name="Объект 2">
-            <a:extLst>
-              <a:ext uri="{FF2B5EF4-FFF2-40B4-BE49-F238E27FC236}">
-                <a16:creationId xmlns:a16="http://schemas.microsoft.com/office/drawing/2014/main" id="{1F54E322-57A1-4938-9063-DC16452F38A5}"/>
-              </a:ext>
-            </a:extLst>
-          </p:cNvPr>
-          <p:cNvSpPr>
-            <a:spLocks noGrp="1"/>
-          </p:cNvSpPr>
+      <p:graphicFrame>
+        <p:nvGraphicFramePr>
+          <p:cNvPr id="4" name="Table 4">
+            <a:extLst>
+              <a:ext uri="{FF2B5EF4-FFF2-40B4-BE49-F238E27FC236}">
+                <a16:creationId xmlns:a16="http://schemas.microsoft.com/office/drawing/2014/main" id="{ECBA6AFA-27CE-4D58-9829-EAE05792B891}"/>
+              </a:ext>
+            </a:extLst>
+          </p:cNvPr>
+          <p:cNvGraphicFramePr>
+            <a:graphicFrameLocks noGrp="1"/>
+          </p:cNvGraphicFramePr>
           <p:nvPr>
             <p:ph idx="1"/>
-          </p:nvPr>
-        </p:nvSpPr>
-        <p:spPr/>
-        <p:txBody>
-          <a:bodyPr/>
-          <a:lstStyle/>
-          <a:p>
-            <a:endParaRPr lang="en-US"/>
-          </a:p>
-        </p:txBody>
-      </p:sp>
+            <p:extLst>
+              <p:ext uri="{D42A27DB-BD31-4B8C-83A1-F6EECF244321}">
+                <p14:modId xmlns:p14="http://schemas.microsoft.com/office/powerpoint/2010/main" val="725651782"/>
+              </p:ext>
+            </p:extLst>
+          </p:nvPr>
+        </p:nvGraphicFramePr>
+        <p:xfrm>
+          <a:off x="838203" y="2266461"/>
+          <a:ext cx="10515597" cy="1107440"/>
+        </p:xfrm>
+        <a:graphic>
+          <a:graphicData uri="http://schemas.openxmlformats.org/drawingml/2006/table">
+            <a:tbl>
+              <a:tblPr firstRow="1" bandRow="1">
+                <a:tableStyleId>{5C22544A-7EE6-4342-B048-85BDC9FD1C3A}</a:tableStyleId>
+              </a:tblPr>
+              <a:tblGrid>
+                <a:gridCol w="3505199">
+                  <a:extLst>
+                    <a:ext uri="{9D8B030D-6E8A-4147-A177-3AD203B41FA5}">
+                      <a16:colId xmlns:a16="http://schemas.microsoft.com/office/drawing/2014/main" val="540924168"/>
+                    </a:ext>
+                  </a:extLst>
+                </a:gridCol>
+                <a:gridCol w="3505199">
+                  <a:extLst>
+                    <a:ext uri="{9D8B030D-6E8A-4147-A177-3AD203B41FA5}">
+                      <a16:colId xmlns:a16="http://schemas.microsoft.com/office/drawing/2014/main" val="338313790"/>
+                    </a:ext>
+                  </a:extLst>
+                </a:gridCol>
+                <a:gridCol w="3505199">
+                  <a:extLst>
+                    <a:ext uri="{9D8B030D-6E8A-4147-A177-3AD203B41FA5}">
+                      <a16:colId xmlns:a16="http://schemas.microsoft.com/office/drawing/2014/main" val="1402180249"/>
+                    </a:ext>
+                  </a:extLst>
+                </a:gridCol>
+              </a:tblGrid>
+              <a:tr h="320773">
+                <a:tc>
+                  <a:txBody>
+                    <a:bodyPr/>
+                    <a:lstStyle/>
+                    <a:p>
+                      <a:r>
+                        <a:rPr lang="en-US" dirty="0"/>
+                        <a:t>Id4</a:t>
+                      </a:r>
+                      <a:endParaRPr lang="ru-RU" dirty="0"/>
+                    </a:p>
+                  </a:txBody>
+                  <a:tcPr/>
+                </a:tc>
+                <a:tc>
+                  <a:txBody>
+                    <a:bodyPr/>
+                    <a:lstStyle/>
+                    <a:p>
+                      <a:endParaRPr lang="ru-RU"/>
+                    </a:p>
+                  </a:txBody>
+                  <a:tcPr/>
+                </a:tc>
+                <a:tc>
+                  <a:txBody>
+                    <a:bodyPr/>
+                    <a:lstStyle/>
+                    <a:p>
+                      <a:endParaRPr lang="ru-RU"/>
+                    </a:p>
+                  </a:txBody>
+                  <a:tcPr/>
+                </a:tc>
+                <a:extLst>
+                  <a:ext uri="{0D108BD9-81ED-4DB2-BD59-A6C34878D82A}">
+                    <a16:rowId xmlns:a16="http://schemas.microsoft.com/office/drawing/2014/main" val="864746071"/>
+                  </a:ext>
+                </a:extLst>
+              </a:tr>
+              <a:tr h="370840">
+                <a:tc gridSpan="2">
+                  <a:txBody>
+                    <a:bodyPr/>
+                    <a:lstStyle/>
+                    <a:p>
+                      <a:endParaRPr lang="ru-RU" dirty="0"/>
+                    </a:p>
+                  </a:txBody>
+                  <a:tcPr/>
+                </a:tc>
+                <a:tc hMerge="1">
+                  <a:txBody>
+                    <a:bodyPr/>
+                    <a:lstStyle/>
+                    <a:p>
+                      <a:endParaRPr lang="ru-RU" dirty="0"/>
+                    </a:p>
+                  </a:txBody>
+                  <a:tcPr/>
+                </a:tc>
+                <a:tc>
+                  <a:txBody>
+                    <a:bodyPr/>
+                    <a:lstStyle/>
+                    <a:p>
+                      <a:endParaRPr lang="ru-RU"/>
+                    </a:p>
+                  </a:txBody>
+                  <a:tcPr/>
+                </a:tc>
+                <a:extLst>
+                  <a:ext uri="{0D108BD9-81ED-4DB2-BD59-A6C34878D82A}">
+                    <a16:rowId xmlns:a16="http://schemas.microsoft.com/office/drawing/2014/main" val="2407265832"/>
+                  </a:ext>
+                </a:extLst>
+              </a:tr>
+              <a:tr h="370840">
+                <a:tc>
+                  <a:txBody>
+                    <a:bodyPr/>
+                    <a:lstStyle/>
+                    <a:p>
+                      <a:endParaRPr lang="ru-RU"/>
+                    </a:p>
+                  </a:txBody>
+                  <a:tcPr/>
+                </a:tc>
+                <a:tc>
+                  <a:txBody>
+                    <a:bodyPr/>
+                    <a:lstStyle/>
+                    <a:p>
+                      <a:endParaRPr lang="ru-RU"/>
+                    </a:p>
+                  </a:txBody>
+                  <a:tcPr/>
+                </a:tc>
+                <a:tc>
+                  <a:txBody>
+                    <a:bodyPr/>
+                    <a:lstStyle/>
+                    <a:p>
+                      <a:endParaRPr lang="ru-RU" dirty="0"/>
+                    </a:p>
+                  </a:txBody>
+                  <a:tcPr/>
+                </a:tc>
+                <a:extLst>
+                  <a:ext uri="{0D108BD9-81ED-4DB2-BD59-A6C34878D82A}">
+                    <a16:rowId xmlns:a16="http://schemas.microsoft.com/office/drawing/2014/main" val="222541286"/>
+                  </a:ext>
+                </a:extLst>
+              </a:tr>
+            </a:tbl>
+          </a:graphicData>
+        </a:graphic>
+      </p:graphicFrame>
     </p:spTree>
     <p:extLst>
       <p:ext uri="{BB962C8B-B14F-4D97-AF65-F5344CB8AC3E}">

</xml_diff>

<commit_message>
SC-35: Add CellSc.IsMergedCell property to detect whether cell is merged (#93)
</commit_message>
<xml_diff>
--- a/ShapeCrawler.Tests.Unit/Resource/001.pptx
+++ b/ShapeCrawler.Tests.Unit/Resource/001.pptx
@@ -263,7 +263,7 @@
           <a:p>
             <a:fld id="{6A2D1428-0459-4F75-829F-043936AE8C9E}" type="datetimeFigureOut">
               <a:rPr lang="en-US" smtClean="0"/>
-              <a:t>1/19/2021</a:t>
+              <a:t>1/20/2021</a:t>
             </a:fld>
             <a:endParaRPr lang="en-US"/>
           </a:p>
@@ -519,7 +519,7 @@
           <a:p>
             <a:fld id="{6A2D1428-0459-4F75-829F-043936AE8C9E}" type="datetimeFigureOut">
               <a:rPr lang="en-US" smtClean="0"/>
-              <a:t>1/19/2021</a:t>
+              <a:t>1/20/2021</a:t>
             </a:fld>
             <a:endParaRPr lang="en-US"/>
           </a:p>
@@ -729,7 +729,7 @@
           <a:p>
             <a:fld id="{6A2D1428-0459-4F75-829F-043936AE8C9E}" type="datetimeFigureOut">
               <a:rPr lang="en-US" smtClean="0"/>
-              <a:t>1/19/2021</a:t>
+              <a:t>1/20/2021</a:t>
             </a:fld>
             <a:endParaRPr lang="en-US"/>
           </a:p>
@@ -929,7 +929,7 @@
           <a:p>
             <a:fld id="{6A2D1428-0459-4F75-829F-043936AE8C9E}" type="datetimeFigureOut">
               <a:rPr lang="en-US" smtClean="0"/>
-              <a:t>1/19/2021</a:t>
+              <a:t>1/20/2021</a:t>
             </a:fld>
             <a:endParaRPr lang="en-US"/>
           </a:p>
@@ -1205,7 +1205,7 @@
           <a:p>
             <a:fld id="{6A2D1428-0459-4F75-829F-043936AE8C9E}" type="datetimeFigureOut">
               <a:rPr lang="en-US" smtClean="0"/>
-              <a:t>1/19/2021</a:t>
+              <a:t>1/20/2021</a:t>
             </a:fld>
             <a:endParaRPr lang="en-US"/>
           </a:p>
@@ -1473,7 +1473,7 @@
           <a:p>
             <a:fld id="{6A2D1428-0459-4F75-829F-043936AE8C9E}" type="datetimeFigureOut">
               <a:rPr lang="en-US" smtClean="0"/>
-              <a:t>1/19/2021</a:t>
+              <a:t>1/20/2021</a:t>
             </a:fld>
             <a:endParaRPr lang="en-US"/>
           </a:p>
@@ -1888,7 +1888,7 @@
           <a:p>
             <a:fld id="{6A2D1428-0459-4F75-829F-043936AE8C9E}" type="datetimeFigureOut">
               <a:rPr lang="en-US" smtClean="0"/>
-              <a:t>1/19/2021</a:t>
+              <a:t>1/20/2021</a:t>
             </a:fld>
             <a:endParaRPr lang="en-US"/>
           </a:p>
@@ -2030,7 +2030,7 @@
           <a:p>
             <a:fld id="{6A2D1428-0459-4F75-829F-043936AE8C9E}" type="datetimeFigureOut">
               <a:rPr lang="en-US" smtClean="0"/>
-              <a:t>1/19/2021</a:t>
+              <a:t>1/20/2021</a:t>
             </a:fld>
             <a:endParaRPr lang="en-US"/>
           </a:p>
@@ -2143,7 +2143,7 @@
           <a:p>
             <a:fld id="{6A2D1428-0459-4F75-829F-043936AE8C9E}" type="datetimeFigureOut">
               <a:rPr lang="en-US" smtClean="0"/>
-              <a:t>1/19/2021</a:t>
+              <a:t>1/20/2021</a:t>
             </a:fld>
             <a:endParaRPr lang="en-US"/>
           </a:p>
@@ -2456,7 +2456,7 @@
           <a:p>
             <a:fld id="{6A2D1428-0459-4F75-829F-043936AE8C9E}" type="datetimeFigureOut">
               <a:rPr lang="en-US" smtClean="0"/>
-              <a:t>1/19/2021</a:t>
+              <a:t>1/20/2021</a:t>
             </a:fld>
             <a:endParaRPr lang="en-US"/>
           </a:p>
@@ -2745,7 +2745,7 @@
           <a:p>
             <a:fld id="{6A2D1428-0459-4F75-829F-043936AE8C9E}" type="datetimeFigureOut">
               <a:rPr lang="en-US" smtClean="0"/>
-              <a:t>1/19/2021</a:t>
+              <a:t>1/20/2021</a:t>
             </a:fld>
             <a:endParaRPr lang="en-US"/>
           </a:p>
@@ -2988,7 +2988,7 @@
           <a:p>
             <a:fld id="{6A2D1428-0459-4F75-829F-043936AE8C9E}" type="datetimeFigureOut">
               <a:rPr lang="en-US" smtClean="0"/>
-              <a:t>1/19/2021</a:t>
+              <a:t>1/20/2021</a:t>
             </a:fld>
             <a:endParaRPr lang="en-US"/>
           </a:p>
@@ -3737,31 +3737,179 @@
           </a:p>
         </p:txBody>
       </p:sp>
-      <p:sp>
-        <p:nvSpPr>
-          <p:cNvPr id="3" name="Объект 2">
-            <a:extLst>
-              <a:ext uri="{FF2B5EF4-FFF2-40B4-BE49-F238E27FC236}">
-                <a16:creationId xmlns:a16="http://schemas.microsoft.com/office/drawing/2014/main" id="{1F54E322-57A1-4938-9063-DC16452F38A5}"/>
-              </a:ext>
-            </a:extLst>
-          </p:cNvPr>
-          <p:cNvSpPr>
-            <a:spLocks noGrp="1"/>
-          </p:cNvSpPr>
+      <p:graphicFrame>
+        <p:nvGraphicFramePr>
+          <p:cNvPr id="4" name="Table 4">
+            <a:extLst>
+              <a:ext uri="{FF2B5EF4-FFF2-40B4-BE49-F238E27FC236}">
+                <a16:creationId xmlns:a16="http://schemas.microsoft.com/office/drawing/2014/main" id="{ECBA6AFA-27CE-4D58-9829-EAE05792B891}"/>
+              </a:ext>
+            </a:extLst>
+          </p:cNvPr>
+          <p:cNvGraphicFramePr>
+            <a:graphicFrameLocks noGrp="1"/>
+          </p:cNvGraphicFramePr>
           <p:nvPr>
             <p:ph idx="1"/>
-          </p:nvPr>
-        </p:nvSpPr>
-        <p:spPr/>
-        <p:txBody>
-          <a:bodyPr/>
-          <a:lstStyle/>
-          <a:p>
-            <a:endParaRPr lang="en-US"/>
-          </a:p>
-        </p:txBody>
-      </p:sp>
+            <p:extLst>
+              <p:ext uri="{D42A27DB-BD31-4B8C-83A1-F6EECF244321}">
+                <p14:modId xmlns:p14="http://schemas.microsoft.com/office/powerpoint/2010/main" val="725651782"/>
+              </p:ext>
+            </p:extLst>
+          </p:nvPr>
+        </p:nvGraphicFramePr>
+        <p:xfrm>
+          <a:off x="838203" y="2266461"/>
+          <a:ext cx="10515597" cy="1107440"/>
+        </p:xfrm>
+        <a:graphic>
+          <a:graphicData uri="http://schemas.openxmlformats.org/drawingml/2006/table">
+            <a:tbl>
+              <a:tblPr firstRow="1" bandRow="1">
+                <a:tableStyleId>{5C22544A-7EE6-4342-B048-85BDC9FD1C3A}</a:tableStyleId>
+              </a:tblPr>
+              <a:tblGrid>
+                <a:gridCol w="3505199">
+                  <a:extLst>
+                    <a:ext uri="{9D8B030D-6E8A-4147-A177-3AD203B41FA5}">
+                      <a16:colId xmlns:a16="http://schemas.microsoft.com/office/drawing/2014/main" val="540924168"/>
+                    </a:ext>
+                  </a:extLst>
+                </a:gridCol>
+                <a:gridCol w="3505199">
+                  <a:extLst>
+                    <a:ext uri="{9D8B030D-6E8A-4147-A177-3AD203B41FA5}">
+                      <a16:colId xmlns:a16="http://schemas.microsoft.com/office/drawing/2014/main" val="338313790"/>
+                    </a:ext>
+                  </a:extLst>
+                </a:gridCol>
+                <a:gridCol w="3505199">
+                  <a:extLst>
+                    <a:ext uri="{9D8B030D-6E8A-4147-A177-3AD203B41FA5}">
+                      <a16:colId xmlns:a16="http://schemas.microsoft.com/office/drawing/2014/main" val="1402180249"/>
+                    </a:ext>
+                  </a:extLst>
+                </a:gridCol>
+              </a:tblGrid>
+              <a:tr h="320773">
+                <a:tc>
+                  <a:txBody>
+                    <a:bodyPr/>
+                    <a:lstStyle/>
+                    <a:p>
+                      <a:r>
+                        <a:rPr lang="en-US" dirty="0"/>
+                        <a:t>Id4</a:t>
+                      </a:r>
+                      <a:endParaRPr lang="ru-RU" dirty="0"/>
+                    </a:p>
+                  </a:txBody>
+                  <a:tcPr/>
+                </a:tc>
+                <a:tc>
+                  <a:txBody>
+                    <a:bodyPr/>
+                    <a:lstStyle/>
+                    <a:p>
+                      <a:endParaRPr lang="ru-RU"/>
+                    </a:p>
+                  </a:txBody>
+                  <a:tcPr/>
+                </a:tc>
+                <a:tc>
+                  <a:txBody>
+                    <a:bodyPr/>
+                    <a:lstStyle/>
+                    <a:p>
+                      <a:endParaRPr lang="ru-RU"/>
+                    </a:p>
+                  </a:txBody>
+                  <a:tcPr/>
+                </a:tc>
+                <a:extLst>
+                  <a:ext uri="{0D108BD9-81ED-4DB2-BD59-A6C34878D82A}">
+                    <a16:rowId xmlns:a16="http://schemas.microsoft.com/office/drawing/2014/main" val="864746071"/>
+                  </a:ext>
+                </a:extLst>
+              </a:tr>
+              <a:tr h="370840">
+                <a:tc gridSpan="2">
+                  <a:txBody>
+                    <a:bodyPr/>
+                    <a:lstStyle/>
+                    <a:p>
+                      <a:endParaRPr lang="ru-RU" dirty="0"/>
+                    </a:p>
+                  </a:txBody>
+                  <a:tcPr/>
+                </a:tc>
+                <a:tc hMerge="1">
+                  <a:txBody>
+                    <a:bodyPr/>
+                    <a:lstStyle/>
+                    <a:p>
+                      <a:endParaRPr lang="ru-RU" dirty="0"/>
+                    </a:p>
+                  </a:txBody>
+                  <a:tcPr/>
+                </a:tc>
+                <a:tc>
+                  <a:txBody>
+                    <a:bodyPr/>
+                    <a:lstStyle/>
+                    <a:p>
+                      <a:endParaRPr lang="ru-RU"/>
+                    </a:p>
+                  </a:txBody>
+                  <a:tcPr/>
+                </a:tc>
+                <a:extLst>
+                  <a:ext uri="{0D108BD9-81ED-4DB2-BD59-A6C34878D82A}">
+                    <a16:rowId xmlns:a16="http://schemas.microsoft.com/office/drawing/2014/main" val="2407265832"/>
+                  </a:ext>
+                </a:extLst>
+              </a:tr>
+              <a:tr h="370840">
+                <a:tc>
+                  <a:txBody>
+                    <a:bodyPr/>
+                    <a:lstStyle/>
+                    <a:p>
+                      <a:endParaRPr lang="ru-RU"/>
+                    </a:p>
+                  </a:txBody>
+                  <a:tcPr/>
+                </a:tc>
+                <a:tc>
+                  <a:txBody>
+                    <a:bodyPr/>
+                    <a:lstStyle/>
+                    <a:p>
+                      <a:endParaRPr lang="ru-RU"/>
+                    </a:p>
+                  </a:txBody>
+                  <a:tcPr/>
+                </a:tc>
+                <a:tc>
+                  <a:txBody>
+                    <a:bodyPr/>
+                    <a:lstStyle/>
+                    <a:p>
+                      <a:endParaRPr lang="ru-RU" dirty="0"/>
+                    </a:p>
+                  </a:txBody>
+                  <a:tcPr/>
+                </a:tc>
+                <a:extLst>
+                  <a:ext uri="{0D108BD9-81ED-4DB2-BD59-A6C34878D82A}">
+                    <a16:rowId xmlns:a16="http://schemas.microsoft.com/office/drawing/2014/main" val="222541286"/>
+                  </a:ext>
+                </a:extLst>
+              </a:tr>
+            </a:tbl>
+          </a:graphicData>
+        </a:graphic>
+      </p:graphicFrame>
     </p:spTree>
     <p:extLst>
       <p:ext uri="{BB962C8B-B14F-4D97-AF65-F5344CB8AC3E}">

</xml_diff>

<commit_message>
SC-62: Add ParagraphCollection.Add() method to add a new paragraph
</commit_message>
<xml_diff>
--- a/ShapeCrawler.Tests.Unit/Resource/001.pptx
+++ b/ShapeCrawler.Tests.Unit/Resource/001.pptx
@@ -263,7 +263,7 @@
           <a:p>
             <a:fld id="{6A2D1428-0459-4F75-829F-043936AE8C9E}" type="datetimeFigureOut">
               <a:rPr lang="en-US" smtClean="0"/>
-              <a:t>1/20/2021</a:t>
+              <a:t>1/22/2021</a:t>
             </a:fld>
             <a:endParaRPr lang="en-US"/>
           </a:p>
@@ -519,7 +519,7 @@
           <a:p>
             <a:fld id="{6A2D1428-0459-4F75-829F-043936AE8C9E}" type="datetimeFigureOut">
               <a:rPr lang="en-US" smtClean="0"/>
-              <a:t>1/20/2021</a:t>
+              <a:t>1/22/2021</a:t>
             </a:fld>
             <a:endParaRPr lang="en-US"/>
           </a:p>
@@ -729,7 +729,7 @@
           <a:p>
             <a:fld id="{6A2D1428-0459-4F75-829F-043936AE8C9E}" type="datetimeFigureOut">
               <a:rPr lang="en-US" smtClean="0"/>
-              <a:t>1/20/2021</a:t>
+              <a:t>1/22/2021</a:t>
             </a:fld>
             <a:endParaRPr lang="en-US"/>
           </a:p>
@@ -929,7 +929,7 @@
           <a:p>
             <a:fld id="{6A2D1428-0459-4F75-829F-043936AE8C9E}" type="datetimeFigureOut">
               <a:rPr lang="en-US" smtClean="0"/>
-              <a:t>1/20/2021</a:t>
+              <a:t>1/22/2021</a:t>
             </a:fld>
             <a:endParaRPr lang="en-US"/>
           </a:p>
@@ -1205,7 +1205,7 @@
           <a:p>
             <a:fld id="{6A2D1428-0459-4F75-829F-043936AE8C9E}" type="datetimeFigureOut">
               <a:rPr lang="en-US" smtClean="0"/>
-              <a:t>1/20/2021</a:t>
+              <a:t>1/22/2021</a:t>
             </a:fld>
             <a:endParaRPr lang="en-US"/>
           </a:p>
@@ -1473,7 +1473,7 @@
           <a:p>
             <a:fld id="{6A2D1428-0459-4F75-829F-043936AE8C9E}" type="datetimeFigureOut">
               <a:rPr lang="en-US" smtClean="0"/>
-              <a:t>1/20/2021</a:t>
+              <a:t>1/22/2021</a:t>
             </a:fld>
             <a:endParaRPr lang="en-US"/>
           </a:p>
@@ -1888,7 +1888,7 @@
           <a:p>
             <a:fld id="{6A2D1428-0459-4F75-829F-043936AE8C9E}" type="datetimeFigureOut">
               <a:rPr lang="en-US" smtClean="0"/>
-              <a:t>1/20/2021</a:t>
+              <a:t>1/22/2021</a:t>
             </a:fld>
             <a:endParaRPr lang="en-US"/>
           </a:p>
@@ -2030,7 +2030,7 @@
           <a:p>
             <a:fld id="{6A2D1428-0459-4F75-829F-043936AE8C9E}" type="datetimeFigureOut">
               <a:rPr lang="en-US" smtClean="0"/>
-              <a:t>1/20/2021</a:t>
+              <a:t>1/22/2021</a:t>
             </a:fld>
             <a:endParaRPr lang="en-US"/>
           </a:p>
@@ -2143,7 +2143,7 @@
           <a:p>
             <a:fld id="{6A2D1428-0459-4F75-829F-043936AE8C9E}" type="datetimeFigureOut">
               <a:rPr lang="en-US" smtClean="0"/>
-              <a:t>1/20/2021</a:t>
+              <a:t>1/22/2021</a:t>
             </a:fld>
             <a:endParaRPr lang="en-US"/>
           </a:p>
@@ -2456,7 +2456,7 @@
           <a:p>
             <a:fld id="{6A2D1428-0459-4F75-829F-043936AE8C9E}" type="datetimeFigureOut">
               <a:rPr lang="en-US" smtClean="0"/>
-              <a:t>1/20/2021</a:t>
+              <a:t>1/22/2021</a:t>
             </a:fld>
             <a:endParaRPr lang="en-US"/>
           </a:p>
@@ -2745,7 +2745,7 @@
           <a:p>
             <a:fld id="{6A2D1428-0459-4F75-829F-043936AE8C9E}" type="datetimeFigureOut">
               <a:rPr lang="en-US" smtClean="0"/>
-              <a:t>1/20/2021</a:t>
+              <a:t>1/22/2021</a:t>
             </a:fld>
             <a:endParaRPr lang="en-US"/>
           </a:p>
@@ -2988,7 +2988,7 @@
           <a:p>
             <a:fld id="{6A2D1428-0459-4F75-829F-043936AE8C9E}" type="datetimeFigureOut">
               <a:rPr lang="en-US" smtClean="0"/>
-              <a:t>1/20/2021</a:t>
+              <a:t>1/22/2021</a:t>
             </a:fld>
             <a:endParaRPr lang="en-US"/>
           </a:p>
@@ -3084,6 +3084,666 @@
           </a:p>
         </p:txBody>
       </p:sp>
+      <p:sp>
+        <p:nvSpPr>
+          <p:cNvPr id="8" name="Freeform: Shape 7">
+            <a:extLst>
+              <a:ext uri="{FF2B5EF4-FFF2-40B4-BE49-F238E27FC236}">
+                <a16:creationId xmlns:a16="http://schemas.microsoft.com/office/drawing/2014/main" id="{2D9BF09A-E248-4139-A2FA-9918C793F77B}"/>
+              </a:ext>
+            </a:extLst>
+          </p:cNvPr>
+          <p:cNvSpPr/>
+          <p:nvPr userDrawn="1"/>
+        </p:nvSpPr>
+        <p:spPr>
+          <a:xfrm>
+            <a:off x="8227479" y="883138"/>
+            <a:ext cx="1573013" cy="547077"/>
+          </a:xfrm>
+          <a:custGeom>
+            <a:avLst/>
+            <a:gdLst>
+              <a:gd name="connsiteX0" fmla="*/ 111536 w 1573013"/>
+              <a:gd name="connsiteY0" fmla="*/ 461108 h 547077"/>
+              <a:gd name="connsiteX1" fmla="*/ 72459 w 1573013"/>
+              <a:gd name="connsiteY1" fmla="*/ 437662 h 547077"/>
+              <a:gd name="connsiteX2" fmla="*/ 41198 w 1573013"/>
+              <a:gd name="connsiteY2" fmla="*/ 390770 h 547077"/>
+              <a:gd name="connsiteX3" fmla="*/ 17752 w 1573013"/>
+              <a:gd name="connsiteY3" fmla="*/ 367324 h 547077"/>
+              <a:gd name="connsiteX4" fmla="*/ 9936 w 1573013"/>
+              <a:gd name="connsiteY4" fmla="*/ 343877 h 547077"/>
+              <a:gd name="connsiteX5" fmla="*/ 9936 w 1573013"/>
+              <a:gd name="connsiteY5" fmla="*/ 117231 h 547077"/>
+              <a:gd name="connsiteX6" fmla="*/ 33383 w 1573013"/>
+              <a:gd name="connsiteY6" fmla="*/ 70339 h 547077"/>
+              <a:gd name="connsiteX7" fmla="*/ 80275 w 1573013"/>
+              <a:gd name="connsiteY7" fmla="*/ 39077 h 547077"/>
+              <a:gd name="connsiteX8" fmla="*/ 150613 w 1573013"/>
+              <a:gd name="connsiteY8" fmla="*/ 15631 h 547077"/>
+              <a:gd name="connsiteX9" fmla="*/ 174059 w 1573013"/>
+              <a:gd name="connsiteY9" fmla="*/ 7816 h 547077"/>
+              <a:gd name="connsiteX10" fmla="*/ 197506 w 1573013"/>
+              <a:gd name="connsiteY10" fmla="*/ 0 h 547077"/>
+              <a:gd name="connsiteX11" fmla="*/ 431967 w 1573013"/>
+              <a:gd name="connsiteY11" fmla="*/ 7816 h 547077"/>
+              <a:gd name="connsiteX12" fmla="*/ 478859 w 1573013"/>
+              <a:gd name="connsiteY12" fmla="*/ 15631 h 547077"/>
+              <a:gd name="connsiteX13" fmla="*/ 533567 w 1573013"/>
+              <a:gd name="connsiteY13" fmla="*/ 23447 h 547077"/>
+              <a:gd name="connsiteX14" fmla="*/ 564829 w 1573013"/>
+              <a:gd name="connsiteY14" fmla="*/ 31262 h 547077"/>
+              <a:gd name="connsiteX15" fmla="*/ 713321 w 1573013"/>
+              <a:gd name="connsiteY15" fmla="*/ 46893 h 547077"/>
+              <a:gd name="connsiteX16" fmla="*/ 1002490 w 1573013"/>
+              <a:gd name="connsiteY16" fmla="*/ 39077 h 547077"/>
+              <a:gd name="connsiteX17" fmla="*/ 1057198 w 1573013"/>
+              <a:gd name="connsiteY17" fmla="*/ 23447 h 547077"/>
+              <a:gd name="connsiteX18" fmla="*/ 1143167 w 1573013"/>
+              <a:gd name="connsiteY18" fmla="*/ 0 h 547077"/>
+              <a:gd name="connsiteX19" fmla="*/ 1346367 w 1573013"/>
+              <a:gd name="connsiteY19" fmla="*/ 7816 h 547077"/>
+              <a:gd name="connsiteX20" fmla="*/ 1369813 w 1573013"/>
+              <a:gd name="connsiteY20" fmla="*/ 15631 h 547077"/>
+              <a:gd name="connsiteX21" fmla="*/ 1416706 w 1573013"/>
+              <a:gd name="connsiteY21" fmla="*/ 46893 h 547077"/>
+              <a:gd name="connsiteX22" fmla="*/ 1440152 w 1573013"/>
+              <a:gd name="connsiteY22" fmla="*/ 70339 h 547077"/>
+              <a:gd name="connsiteX23" fmla="*/ 1487044 w 1573013"/>
+              <a:gd name="connsiteY23" fmla="*/ 85970 h 547077"/>
+              <a:gd name="connsiteX24" fmla="*/ 1510490 w 1573013"/>
+              <a:gd name="connsiteY24" fmla="*/ 101600 h 547077"/>
+              <a:gd name="connsiteX25" fmla="*/ 1541752 w 1573013"/>
+              <a:gd name="connsiteY25" fmla="*/ 140677 h 547077"/>
+              <a:gd name="connsiteX26" fmla="*/ 1549567 w 1573013"/>
+              <a:gd name="connsiteY26" fmla="*/ 164124 h 547077"/>
+              <a:gd name="connsiteX27" fmla="*/ 1573013 w 1573013"/>
+              <a:gd name="connsiteY27" fmla="*/ 250093 h 547077"/>
+              <a:gd name="connsiteX28" fmla="*/ 1565198 w 1573013"/>
+              <a:gd name="connsiteY28" fmla="*/ 429847 h 547077"/>
+              <a:gd name="connsiteX29" fmla="*/ 1557383 w 1573013"/>
+              <a:gd name="connsiteY29" fmla="*/ 453293 h 547077"/>
+              <a:gd name="connsiteX30" fmla="*/ 1533936 w 1573013"/>
+              <a:gd name="connsiteY30" fmla="*/ 468924 h 547077"/>
+              <a:gd name="connsiteX31" fmla="*/ 1502675 w 1573013"/>
+              <a:gd name="connsiteY31" fmla="*/ 500185 h 547077"/>
+              <a:gd name="connsiteX32" fmla="*/ 1479229 w 1573013"/>
+              <a:gd name="connsiteY32" fmla="*/ 523631 h 547077"/>
+              <a:gd name="connsiteX33" fmla="*/ 1455783 w 1573013"/>
+              <a:gd name="connsiteY33" fmla="*/ 531447 h 547077"/>
+              <a:gd name="connsiteX34" fmla="*/ 1432336 w 1573013"/>
+              <a:gd name="connsiteY34" fmla="*/ 547077 h 547077"/>
+              <a:gd name="connsiteX35" fmla="*/ 1221321 w 1573013"/>
+              <a:gd name="connsiteY35" fmla="*/ 539262 h 547077"/>
+              <a:gd name="connsiteX36" fmla="*/ 1166613 w 1573013"/>
+              <a:gd name="connsiteY36" fmla="*/ 523631 h 547077"/>
+              <a:gd name="connsiteX37" fmla="*/ 1143167 w 1573013"/>
+              <a:gd name="connsiteY37" fmla="*/ 508000 h 547077"/>
+              <a:gd name="connsiteX38" fmla="*/ 1096275 w 1573013"/>
+              <a:gd name="connsiteY38" fmla="*/ 492370 h 547077"/>
+              <a:gd name="connsiteX39" fmla="*/ 1072829 w 1573013"/>
+              <a:gd name="connsiteY39" fmla="*/ 476739 h 547077"/>
+              <a:gd name="connsiteX40" fmla="*/ 1025936 w 1573013"/>
+              <a:gd name="connsiteY40" fmla="*/ 461108 h 547077"/>
+              <a:gd name="connsiteX41" fmla="*/ 1002490 w 1573013"/>
+              <a:gd name="connsiteY41" fmla="*/ 445477 h 547077"/>
+              <a:gd name="connsiteX42" fmla="*/ 955598 w 1573013"/>
+              <a:gd name="connsiteY42" fmla="*/ 429847 h 547077"/>
+              <a:gd name="connsiteX43" fmla="*/ 900890 w 1573013"/>
+              <a:gd name="connsiteY43" fmla="*/ 414216 h 547077"/>
+              <a:gd name="connsiteX44" fmla="*/ 822736 w 1573013"/>
+              <a:gd name="connsiteY44" fmla="*/ 422031 h 547077"/>
+              <a:gd name="connsiteX45" fmla="*/ 775844 w 1573013"/>
+              <a:gd name="connsiteY45" fmla="*/ 437662 h 547077"/>
+              <a:gd name="connsiteX46" fmla="*/ 752398 w 1573013"/>
+              <a:gd name="connsiteY46" fmla="*/ 445477 h 547077"/>
+              <a:gd name="connsiteX47" fmla="*/ 705506 w 1573013"/>
+              <a:gd name="connsiteY47" fmla="*/ 461108 h 547077"/>
+              <a:gd name="connsiteX48" fmla="*/ 682059 w 1573013"/>
+              <a:gd name="connsiteY48" fmla="*/ 468924 h 547077"/>
+              <a:gd name="connsiteX49" fmla="*/ 642983 w 1573013"/>
+              <a:gd name="connsiteY49" fmla="*/ 476739 h 547077"/>
+              <a:gd name="connsiteX50" fmla="*/ 596090 w 1573013"/>
+              <a:gd name="connsiteY50" fmla="*/ 492370 h 547077"/>
+              <a:gd name="connsiteX51" fmla="*/ 424152 w 1573013"/>
+              <a:gd name="connsiteY51" fmla="*/ 508000 h 547077"/>
+              <a:gd name="connsiteX52" fmla="*/ 275659 w 1573013"/>
+              <a:gd name="connsiteY52" fmla="*/ 500185 h 547077"/>
+              <a:gd name="connsiteX53" fmla="*/ 127167 w 1573013"/>
+              <a:gd name="connsiteY53" fmla="*/ 476739 h 547077"/>
+              <a:gd name="connsiteX54" fmla="*/ 111536 w 1573013"/>
+              <a:gd name="connsiteY54" fmla="*/ 461108 h 547077"/>
+            </a:gdLst>
+            <a:ahLst/>
+            <a:cxnLst>
+              <a:cxn ang="0">
+                <a:pos x="connsiteX0" y="connsiteY0"/>
+              </a:cxn>
+              <a:cxn ang="0">
+                <a:pos x="connsiteX1" y="connsiteY1"/>
+              </a:cxn>
+              <a:cxn ang="0">
+                <a:pos x="connsiteX2" y="connsiteY2"/>
+              </a:cxn>
+              <a:cxn ang="0">
+                <a:pos x="connsiteX3" y="connsiteY3"/>
+              </a:cxn>
+              <a:cxn ang="0">
+                <a:pos x="connsiteX4" y="connsiteY4"/>
+              </a:cxn>
+              <a:cxn ang="0">
+                <a:pos x="connsiteX5" y="connsiteY5"/>
+              </a:cxn>
+              <a:cxn ang="0">
+                <a:pos x="connsiteX6" y="connsiteY6"/>
+              </a:cxn>
+              <a:cxn ang="0">
+                <a:pos x="connsiteX7" y="connsiteY7"/>
+              </a:cxn>
+              <a:cxn ang="0">
+                <a:pos x="connsiteX8" y="connsiteY8"/>
+              </a:cxn>
+              <a:cxn ang="0">
+                <a:pos x="connsiteX9" y="connsiteY9"/>
+              </a:cxn>
+              <a:cxn ang="0">
+                <a:pos x="connsiteX10" y="connsiteY10"/>
+              </a:cxn>
+              <a:cxn ang="0">
+                <a:pos x="connsiteX11" y="connsiteY11"/>
+              </a:cxn>
+              <a:cxn ang="0">
+                <a:pos x="connsiteX12" y="connsiteY12"/>
+              </a:cxn>
+              <a:cxn ang="0">
+                <a:pos x="connsiteX13" y="connsiteY13"/>
+              </a:cxn>
+              <a:cxn ang="0">
+                <a:pos x="connsiteX14" y="connsiteY14"/>
+              </a:cxn>
+              <a:cxn ang="0">
+                <a:pos x="connsiteX15" y="connsiteY15"/>
+              </a:cxn>
+              <a:cxn ang="0">
+                <a:pos x="connsiteX16" y="connsiteY16"/>
+              </a:cxn>
+              <a:cxn ang="0">
+                <a:pos x="connsiteX17" y="connsiteY17"/>
+              </a:cxn>
+              <a:cxn ang="0">
+                <a:pos x="connsiteX18" y="connsiteY18"/>
+              </a:cxn>
+              <a:cxn ang="0">
+                <a:pos x="connsiteX19" y="connsiteY19"/>
+              </a:cxn>
+              <a:cxn ang="0">
+                <a:pos x="connsiteX20" y="connsiteY20"/>
+              </a:cxn>
+              <a:cxn ang="0">
+                <a:pos x="connsiteX21" y="connsiteY21"/>
+              </a:cxn>
+              <a:cxn ang="0">
+                <a:pos x="connsiteX22" y="connsiteY22"/>
+              </a:cxn>
+              <a:cxn ang="0">
+                <a:pos x="connsiteX23" y="connsiteY23"/>
+              </a:cxn>
+              <a:cxn ang="0">
+                <a:pos x="connsiteX24" y="connsiteY24"/>
+              </a:cxn>
+              <a:cxn ang="0">
+                <a:pos x="connsiteX25" y="connsiteY25"/>
+              </a:cxn>
+              <a:cxn ang="0">
+                <a:pos x="connsiteX26" y="connsiteY26"/>
+              </a:cxn>
+              <a:cxn ang="0">
+                <a:pos x="connsiteX27" y="connsiteY27"/>
+              </a:cxn>
+              <a:cxn ang="0">
+                <a:pos x="connsiteX28" y="connsiteY28"/>
+              </a:cxn>
+              <a:cxn ang="0">
+                <a:pos x="connsiteX29" y="connsiteY29"/>
+              </a:cxn>
+              <a:cxn ang="0">
+                <a:pos x="connsiteX30" y="connsiteY30"/>
+              </a:cxn>
+              <a:cxn ang="0">
+                <a:pos x="connsiteX31" y="connsiteY31"/>
+              </a:cxn>
+              <a:cxn ang="0">
+                <a:pos x="connsiteX32" y="connsiteY32"/>
+              </a:cxn>
+              <a:cxn ang="0">
+                <a:pos x="connsiteX33" y="connsiteY33"/>
+              </a:cxn>
+              <a:cxn ang="0">
+                <a:pos x="connsiteX34" y="connsiteY34"/>
+              </a:cxn>
+              <a:cxn ang="0">
+                <a:pos x="connsiteX35" y="connsiteY35"/>
+              </a:cxn>
+              <a:cxn ang="0">
+                <a:pos x="connsiteX36" y="connsiteY36"/>
+              </a:cxn>
+              <a:cxn ang="0">
+                <a:pos x="connsiteX37" y="connsiteY37"/>
+              </a:cxn>
+              <a:cxn ang="0">
+                <a:pos x="connsiteX38" y="connsiteY38"/>
+              </a:cxn>
+              <a:cxn ang="0">
+                <a:pos x="connsiteX39" y="connsiteY39"/>
+              </a:cxn>
+              <a:cxn ang="0">
+                <a:pos x="connsiteX40" y="connsiteY40"/>
+              </a:cxn>
+              <a:cxn ang="0">
+                <a:pos x="connsiteX41" y="connsiteY41"/>
+              </a:cxn>
+              <a:cxn ang="0">
+                <a:pos x="connsiteX42" y="connsiteY42"/>
+              </a:cxn>
+              <a:cxn ang="0">
+                <a:pos x="connsiteX43" y="connsiteY43"/>
+              </a:cxn>
+              <a:cxn ang="0">
+                <a:pos x="connsiteX44" y="connsiteY44"/>
+              </a:cxn>
+              <a:cxn ang="0">
+                <a:pos x="connsiteX45" y="connsiteY45"/>
+              </a:cxn>
+              <a:cxn ang="0">
+                <a:pos x="connsiteX46" y="connsiteY46"/>
+              </a:cxn>
+              <a:cxn ang="0">
+                <a:pos x="connsiteX47" y="connsiteY47"/>
+              </a:cxn>
+              <a:cxn ang="0">
+                <a:pos x="connsiteX48" y="connsiteY48"/>
+              </a:cxn>
+              <a:cxn ang="0">
+                <a:pos x="connsiteX49" y="connsiteY49"/>
+              </a:cxn>
+              <a:cxn ang="0">
+                <a:pos x="connsiteX50" y="connsiteY50"/>
+              </a:cxn>
+              <a:cxn ang="0">
+                <a:pos x="connsiteX51" y="connsiteY51"/>
+              </a:cxn>
+              <a:cxn ang="0">
+                <a:pos x="connsiteX52" y="connsiteY52"/>
+              </a:cxn>
+              <a:cxn ang="0">
+                <a:pos x="connsiteX53" y="connsiteY53"/>
+              </a:cxn>
+              <a:cxn ang="0">
+                <a:pos x="connsiteX54" y="connsiteY54"/>
+              </a:cxn>
+            </a:cxnLst>
+            <a:rect l="l" t="t" r="r" b="b"/>
+            <a:pathLst>
+              <a:path w="1573013" h="547077">
+                <a:moveTo>
+                  <a:pt x="111536" y="461108"/>
+                </a:moveTo>
+                <a:cubicBezTo>
+                  <a:pt x="98510" y="453293"/>
+                  <a:pt x="83200" y="448403"/>
+                  <a:pt x="72459" y="437662"/>
+                </a:cubicBezTo>
+                <a:cubicBezTo>
+                  <a:pt x="59176" y="424379"/>
+                  <a:pt x="54481" y="404053"/>
+                  <a:pt x="41198" y="390770"/>
+                </a:cubicBezTo>
+                <a:lnTo>
+                  <a:pt x="17752" y="367324"/>
+                </a:lnTo>
+                <a:cubicBezTo>
+                  <a:pt x="15147" y="359508"/>
+                  <a:pt x="11723" y="351919"/>
+                  <a:pt x="9936" y="343877"/>
+                </a:cubicBezTo>
+                <a:cubicBezTo>
+                  <a:pt x="-7970" y="263302"/>
+                  <a:pt x="2308" y="216395"/>
+                  <a:pt x="9936" y="117231"/>
+                </a:cubicBezTo>
+                <a:cubicBezTo>
+                  <a:pt x="10913" y="104530"/>
+                  <a:pt x="24367" y="78228"/>
+                  <a:pt x="33383" y="70339"/>
+                </a:cubicBezTo>
+                <a:cubicBezTo>
+                  <a:pt x="47521" y="57968"/>
+                  <a:pt x="62453" y="45017"/>
+                  <a:pt x="80275" y="39077"/>
+                </a:cubicBezTo>
+                <a:lnTo>
+                  <a:pt x="150613" y="15631"/>
+                </a:lnTo>
+                <a:lnTo>
+                  <a:pt x="174059" y="7816"/>
+                </a:lnTo>
+                <a:lnTo>
+                  <a:pt x="197506" y="0"/>
+                </a:lnTo>
+                <a:cubicBezTo>
+                  <a:pt x="275660" y="2605"/>
+                  <a:pt x="353890" y="3478"/>
+                  <a:pt x="431967" y="7816"/>
+                </a:cubicBezTo>
+                <a:cubicBezTo>
+                  <a:pt x="447789" y="8695"/>
+                  <a:pt x="463197" y="13221"/>
+                  <a:pt x="478859" y="15631"/>
+                </a:cubicBezTo>
+                <a:cubicBezTo>
+                  <a:pt x="497066" y="18432"/>
+                  <a:pt x="515443" y="20152"/>
+                  <a:pt x="533567" y="23447"/>
+                </a:cubicBezTo>
+                <a:cubicBezTo>
+                  <a:pt x="544135" y="25368"/>
+                  <a:pt x="554178" y="29873"/>
+                  <a:pt x="564829" y="31262"/>
+                </a:cubicBezTo>
+                <a:cubicBezTo>
+                  <a:pt x="614182" y="37699"/>
+                  <a:pt x="713321" y="46893"/>
+                  <a:pt x="713321" y="46893"/>
+                </a:cubicBezTo>
+                <a:cubicBezTo>
+                  <a:pt x="809711" y="44288"/>
+                  <a:pt x="906180" y="43775"/>
+                  <a:pt x="1002490" y="39077"/>
+                </a:cubicBezTo>
+                <a:cubicBezTo>
+                  <a:pt x="1018343" y="38304"/>
+                  <a:pt x="1041509" y="27726"/>
+                  <a:pt x="1057198" y="23447"/>
+                </a:cubicBezTo>
+                <a:cubicBezTo>
+                  <a:pt x="1154138" y="-2991"/>
+                  <a:pt x="1089208" y="17988"/>
+                  <a:pt x="1143167" y="0"/>
+                </a:cubicBezTo>
+                <a:cubicBezTo>
+                  <a:pt x="1210900" y="2605"/>
+                  <a:pt x="1278744" y="3152"/>
+                  <a:pt x="1346367" y="7816"/>
+                </a:cubicBezTo>
+                <a:cubicBezTo>
+                  <a:pt x="1354586" y="8383"/>
+                  <a:pt x="1362959" y="11061"/>
+                  <a:pt x="1369813" y="15631"/>
+                </a:cubicBezTo>
+                <a:cubicBezTo>
+                  <a:pt x="1428358" y="54661"/>
+                  <a:pt x="1360953" y="28308"/>
+                  <a:pt x="1416706" y="46893"/>
+                </a:cubicBezTo>
+                <a:cubicBezTo>
+                  <a:pt x="1424521" y="54708"/>
+                  <a:pt x="1430490" y="64971"/>
+                  <a:pt x="1440152" y="70339"/>
+                </a:cubicBezTo>
+                <a:cubicBezTo>
+                  <a:pt x="1454555" y="78341"/>
+                  <a:pt x="1473335" y="76831"/>
+                  <a:pt x="1487044" y="85970"/>
+                </a:cubicBezTo>
+                <a:lnTo>
+                  <a:pt x="1510490" y="101600"/>
+                </a:lnTo>
+                <a:cubicBezTo>
+                  <a:pt x="1530137" y="160539"/>
+                  <a:pt x="1501349" y="90172"/>
+                  <a:pt x="1541752" y="140677"/>
+                </a:cubicBezTo>
+                <a:cubicBezTo>
+                  <a:pt x="1546898" y="147110"/>
+                  <a:pt x="1547399" y="156176"/>
+                  <a:pt x="1549567" y="164124"/>
+                </a:cubicBezTo>
+                <a:cubicBezTo>
+                  <a:pt x="1576008" y="261077"/>
+                  <a:pt x="1555026" y="196129"/>
+                  <a:pt x="1573013" y="250093"/>
+                </a:cubicBezTo>
+                <a:cubicBezTo>
+                  <a:pt x="1570408" y="310011"/>
+                  <a:pt x="1569798" y="370049"/>
+                  <a:pt x="1565198" y="429847"/>
+                </a:cubicBezTo>
+                <a:cubicBezTo>
+                  <a:pt x="1564566" y="438061"/>
+                  <a:pt x="1562529" y="446860"/>
+                  <a:pt x="1557383" y="453293"/>
+                </a:cubicBezTo>
+                <a:cubicBezTo>
+                  <a:pt x="1551515" y="460628"/>
+                  <a:pt x="1541752" y="463714"/>
+                  <a:pt x="1533936" y="468924"/>
+                </a:cubicBezTo>
+                <a:cubicBezTo>
+                  <a:pt x="1519050" y="513583"/>
+                  <a:pt x="1538402" y="476367"/>
+                  <a:pt x="1502675" y="500185"/>
+                </a:cubicBezTo>
+                <a:cubicBezTo>
+                  <a:pt x="1493479" y="506316"/>
+                  <a:pt x="1488425" y="517500"/>
+                  <a:pt x="1479229" y="523631"/>
+                </a:cubicBezTo>
+                <a:cubicBezTo>
+                  <a:pt x="1472374" y="528201"/>
+                  <a:pt x="1463151" y="527763"/>
+                  <a:pt x="1455783" y="531447"/>
+                </a:cubicBezTo>
+                <a:cubicBezTo>
+                  <a:pt x="1447382" y="535648"/>
+                  <a:pt x="1440152" y="541867"/>
+                  <a:pt x="1432336" y="547077"/>
+                </a:cubicBezTo>
+                <a:cubicBezTo>
+                  <a:pt x="1361998" y="544472"/>
+                  <a:pt x="1291562" y="543793"/>
+                  <a:pt x="1221321" y="539262"/>
+                </a:cubicBezTo>
+                <a:cubicBezTo>
+                  <a:pt x="1215567" y="538891"/>
+                  <a:pt x="1174556" y="527603"/>
+                  <a:pt x="1166613" y="523631"/>
+                </a:cubicBezTo>
+                <a:cubicBezTo>
+                  <a:pt x="1158212" y="519430"/>
+                  <a:pt x="1151750" y="511815"/>
+                  <a:pt x="1143167" y="508000"/>
+                </a:cubicBezTo>
+                <a:cubicBezTo>
+                  <a:pt x="1128111" y="501308"/>
+                  <a:pt x="1096275" y="492370"/>
+                  <a:pt x="1096275" y="492370"/>
+                </a:cubicBezTo>
+                <a:cubicBezTo>
+                  <a:pt x="1088460" y="487160"/>
+                  <a:pt x="1081412" y="480554"/>
+                  <a:pt x="1072829" y="476739"/>
+                </a:cubicBezTo>
+                <a:cubicBezTo>
+                  <a:pt x="1057773" y="470047"/>
+                  <a:pt x="1039645" y="470248"/>
+                  <a:pt x="1025936" y="461108"/>
+                </a:cubicBezTo>
+                <a:cubicBezTo>
+                  <a:pt x="1018121" y="455898"/>
+                  <a:pt x="1011073" y="449292"/>
+                  <a:pt x="1002490" y="445477"/>
+                </a:cubicBezTo>
+                <a:cubicBezTo>
+                  <a:pt x="987434" y="438785"/>
+                  <a:pt x="971229" y="435057"/>
+                  <a:pt x="955598" y="429847"/>
+                </a:cubicBezTo>
+                <a:cubicBezTo>
+                  <a:pt x="921950" y="418631"/>
+                  <a:pt x="940159" y="424033"/>
+                  <a:pt x="900890" y="414216"/>
+                </a:cubicBezTo>
+                <a:cubicBezTo>
+                  <a:pt x="874839" y="416821"/>
+                  <a:pt x="848469" y="417206"/>
+                  <a:pt x="822736" y="422031"/>
+                </a:cubicBezTo>
+                <a:cubicBezTo>
+                  <a:pt x="806542" y="425067"/>
+                  <a:pt x="791475" y="432452"/>
+                  <a:pt x="775844" y="437662"/>
+                </a:cubicBezTo>
+                <a:lnTo>
+                  <a:pt x="752398" y="445477"/>
+                </a:lnTo>
+                <a:lnTo>
+                  <a:pt x="705506" y="461108"/>
+                </a:lnTo>
+                <a:cubicBezTo>
+                  <a:pt x="697690" y="463713"/>
+                  <a:pt x="690137" y="467308"/>
+                  <a:pt x="682059" y="468924"/>
+                </a:cubicBezTo>
+                <a:cubicBezTo>
+                  <a:pt x="669034" y="471529"/>
+                  <a:pt x="655798" y="473244"/>
+                  <a:pt x="642983" y="476739"/>
+                </a:cubicBezTo>
+                <a:cubicBezTo>
+                  <a:pt x="627087" y="481074"/>
+                  <a:pt x="612510" y="491002"/>
+                  <a:pt x="596090" y="492370"/>
+                </a:cubicBezTo>
+                <a:cubicBezTo>
+                  <a:pt x="476215" y="502359"/>
+                  <a:pt x="533520" y="497064"/>
+                  <a:pt x="424152" y="508000"/>
+                </a:cubicBezTo>
+                <a:lnTo>
+                  <a:pt x="275659" y="500185"/>
+                </a:lnTo>
+                <a:cubicBezTo>
+                  <a:pt x="275429" y="500171"/>
+                  <a:pt x="149143" y="498715"/>
+                  <a:pt x="127167" y="476739"/>
+                </a:cubicBezTo>
+                <a:lnTo>
+                  <a:pt x="111536" y="461108"/>
+                </a:lnTo>
+                <a:close/>
+              </a:path>
+            </a:pathLst>
+          </a:custGeom>
+        </p:spPr>
+        <p:style>
+          <a:lnRef idx="2">
+            <a:schemeClr val="accent1">
+              <a:shade val="50000"/>
+            </a:schemeClr>
+          </a:lnRef>
+          <a:fillRef idx="1">
+            <a:schemeClr val="accent1"/>
+          </a:fillRef>
+          <a:effectRef idx="0">
+            <a:schemeClr val="accent1"/>
+          </a:effectRef>
+          <a:fontRef idx="minor">
+            <a:schemeClr val="lt1"/>
+          </a:fontRef>
+        </p:style>
+        <p:txBody>
+          <a:bodyPr rtlCol="0" anchor="ctr"/>
+          <a:lstStyle/>
+          <a:p>
+            <a:pPr algn="ctr"/>
+            <a:r>
+              <a:rPr lang="en-US" dirty="0">
+                <a:latin typeface="Times New Roman" panose="02020603050405020304" pitchFamily="18" charset="0"/>
+                <a:cs typeface="Times New Roman" panose="02020603050405020304" pitchFamily="18" charset="0"/>
+              </a:rPr>
+              <a:t>id8</a:t>
+            </a:r>
+            <a:endParaRPr lang="ru-RU" dirty="0">
+              <a:latin typeface="Times New Roman" panose="02020603050405020304" pitchFamily="18" charset="0"/>
+              <a:cs typeface="Times New Roman" panose="02020603050405020304" pitchFamily="18" charset="0"/>
+            </a:endParaRPr>
+          </a:p>
+        </p:txBody>
+      </p:sp>
+      <p:graphicFrame>
+        <p:nvGraphicFramePr>
+          <p:cNvPr id="7" name="Object 6" descr="id7">
+            <a:extLst>
+              <a:ext uri="{FF2B5EF4-FFF2-40B4-BE49-F238E27FC236}">
+                <a16:creationId xmlns:a16="http://schemas.microsoft.com/office/drawing/2014/main" id="{AEDDDB48-9DC6-4D3F-9352-D37ED34567A0}"/>
+              </a:ext>
+            </a:extLst>
+          </p:cNvPr>
+          <p:cNvGraphicFramePr>
+            <a:graphicFrameLocks noChangeAspect="1"/>
+          </p:cNvGraphicFramePr>
+          <p:nvPr userDrawn="1">
+            <p:extLst>
+              <p:ext uri="{D42A27DB-BD31-4B8C-83A1-F6EECF244321}">
+                <p14:modId xmlns:p14="http://schemas.microsoft.com/office/powerpoint/2010/main" val="4057474641"/>
+              </p:ext>
+            </p:extLst>
+          </p:nvPr>
+        </p:nvGraphicFramePr>
+        <p:xfrm>
+          <a:off x="10593472" y="56357"/>
+          <a:ext cx="1520656" cy="1701800"/>
+        </p:xfrm>
+        <a:graphic>
+          <a:graphicData uri="http://schemas.openxmlformats.org/presentationml/2006/ole">
+            <mc:AlternateContent xmlns:mc="http://schemas.openxmlformats.org/markup-compatibility/2006">
+              <mc:Choice xmlns:v="urn:schemas-microsoft-com:vml" Requires="v">
+                <p:oleObj name="PDF" r:id="rId13" imgW="0" imgH="360" progId="FoxitReader.Document">
+                  <p:embed/>
+                </p:oleObj>
+              </mc:Choice>
+              <mc:Fallback>
+                <p:oleObj name="PDF" r:id="rId13" imgW="0" imgH="360" progId="FoxitReader.Document">
+                  <p:embed/>
+                  <p:pic>
+                    <p:nvPicPr>
+                      <p:cNvPr id="0" name=""/>
+                      <p:cNvPicPr/>
+                      <p:nvPr/>
+                    </p:nvPicPr>
+                    <p:blipFill>
+                      <a:blip r:embed="rId14"/>
+                      <a:stretch>
+                        <a:fillRect/>
+                      </a:stretch>
+                    </p:blipFill>
+                    <p:spPr>
+                      <a:xfrm>
+                        <a:off x="10593472" y="56357"/>
+                        <a:ext cx="1520656" cy="1701800"/>
+                      </a:xfrm>
+                      <a:prstGeom prst="rect">
+                        <a:avLst/>
+                      </a:prstGeom>
+                    </p:spPr>
+                  </p:pic>
+                </p:oleObj>
+              </mc:Fallback>
+            </mc:AlternateContent>
+          </a:graphicData>
+        </a:graphic>
+      </p:graphicFrame>
     </p:spTree>
     <p:extLst>
       <p:ext uri="{BB962C8B-B14F-4D97-AF65-F5344CB8AC3E}">

</xml_diff>

<commit_message>
SC-62: Add ParagraphCollection.Add() method to add a new paragraph (#96)
</commit_message>
<xml_diff>
--- a/ShapeCrawler.Tests.Unit/Resource/001.pptx
+++ b/ShapeCrawler.Tests.Unit/Resource/001.pptx
@@ -263,7 +263,7 @@
           <a:p>
             <a:fld id="{6A2D1428-0459-4F75-829F-043936AE8C9E}" type="datetimeFigureOut">
               <a:rPr lang="en-US" smtClean="0"/>
-              <a:t>1/20/2021</a:t>
+              <a:t>1/22/2021</a:t>
             </a:fld>
             <a:endParaRPr lang="en-US"/>
           </a:p>
@@ -519,7 +519,7 @@
           <a:p>
             <a:fld id="{6A2D1428-0459-4F75-829F-043936AE8C9E}" type="datetimeFigureOut">
               <a:rPr lang="en-US" smtClean="0"/>
-              <a:t>1/20/2021</a:t>
+              <a:t>1/22/2021</a:t>
             </a:fld>
             <a:endParaRPr lang="en-US"/>
           </a:p>
@@ -729,7 +729,7 @@
           <a:p>
             <a:fld id="{6A2D1428-0459-4F75-829F-043936AE8C9E}" type="datetimeFigureOut">
               <a:rPr lang="en-US" smtClean="0"/>
-              <a:t>1/20/2021</a:t>
+              <a:t>1/22/2021</a:t>
             </a:fld>
             <a:endParaRPr lang="en-US"/>
           </a:p>
@@ -929,7 +929,7 @@
           <a:p>
             <a:fld id="{6A2D1428-0459-4F75-829F-043936AE8C9E}" type="datetimeFigureOut">
               <a:rPr lang="en-US" smtClean="0"/>
-              <a:t>1/20/2021</a:t>
+              <a:t>1/22/2021</a:t>
             </a:fld>
             <a:endParaRPr lang="en-US"/>
           </a:p>
@@ -1205,7 +1205,7 @@
           <a:p>
             <a:fld id="{6A2D1428-0459-4F75-829F-043936AE8C9E}" type="datetimeFigureOut">
               <a:rPr lang="en-US" smtClean="0"/>
-              <a:t>1/20/2021</a:t>
+              <a:t>1/22/2021</a:t>
             </a:fld>
             <a:endParaRPr lang="en-US"/>
           </a:p>
@@ -1473,7 +1473,7 @@
           <a:p>
             <a:fld id="{6A2D1428-0459-4F75-829F-043936AE8C9E}" type="datetimeFigureOut">
               <a:rPr lang="en-US" smtClean="0"/>
-              <a:t>1/20/2021</a:t>
+              <a:t>1/22/2021</a:t>
             </a:fld>
             <a:endParaRPr lang="en-US"/>
           </a:p>
@@ -1888,7 +1888,7 @@
           <a:p>
             <a:fld id="{6A2D1428-0459-4F75-829F-043936AE8C9E}" type="datetimeFigureOut">
               <a:rPr lang="en-US" smtClean="0"/>
-              <a:t>1/20/2021</a:t>
+              <a:t>1/22/2021</a:t>
             </a:fld>
             <a:endParaRPr lang="en-US"/>
           </a:p>
@@ -2030,7 +2030,7 @@
           <a:p>
             <a:fld id="{6A2D1428-0459-4F75-829F-043936AE8C9E}" type="datetimeFigureOut">
               <a:rPr lang="en-US" smtClean="0"/>
-              <a:t>1/20/2021</a:t>
+              <a:t>1/22/2021</a:t>
             </a:fld>
             <a:endParaRPr lang="en-US"/>
           </a:p>
@@ -2143,7 +2143,7 @@
           <a:p>
             <a:fld id="{6A2D1428-0459-4F75-829F-043936AE8C9E}" type="datetimeFigureOut">
               <a:rPr lang="en-US" smtClean="0"/>
-              <a:t>1/20/2021</a:t>
+              <a:t>1/22/2021</a:t>
             </a:fld>
             <a:endParaRPr lang="en-US"/>
           </a:p>
@@ -2456,7 +2456,7 @@
           <a:p>
             <a:fld id="{6A2D1428-0459-4F75-829F-043936AE8C9E}" type="datetimeFigureOut">
               <a:rPr lang="en-US" smtClean="0"/>
-              <a:t>1/20/2021</a:t>
+              <a:t>1/22/2021</a:t>
             </a:fld>
             <a:endParaRPr lang="en-US"/>
           </a:p>
@@ -2745,7 +2745,7 @@
           <a:p>
             <a:fld id="{6A2D1428-0459-4F75-829F-043936AE8C9E}" type="datetimeFigureOut">
               <a:rPr lang="en-US" smtClean="0"/>
-              <a:t>1/20/2021</a:t>
+              <a:t>1/22/2021</a:t>
             </a:fld>
             <a:endParaRPr lang="en-US"/>
           </a:p>
@@ -2988,7 +2988,7 @@
           <a:p>
             <a:fld id="{6A2D1428-0459-4F75-829F-043936AE8C9E}" type="datetimeFigureOut">
               <a:rPr lang="en-US" smtClean="0"/>
-              <a:t>1/20/2021</a:t>
+              <a:t>1/22/2021</a:t>
             </a:fld>
             <a:endParaRPr lang="en-US"/>
           </a:p>
@@ -3084,6 +3084,666 @@
           </a:p>
         </p:txBody>
       </p:sp>
+      <p:sp>
+        <p:nvSpPr>
+          <p:cNvPr id="8" name="Freeform: Shape 7">
+            <a:extLst>
+              <a:ext uri="{FF2B5EF4-FFF2-40B4-BE49-F238E27FC236}">
+                <a16:creationId xmlns:a16="http://schemas.microsoft.com/office/drawing/2014/main" id="{2D9BF09A-E248-4139-A2FA-9918C793F77B}"/>
+              </a:ext>
+            </a:extLst>
+          </p:cNvPr>
+          <p:cNvSpPr/>
+          <p:nvPr userDrawn="1"/>
+        </p:nvSpPr>
+        <p:spPr>
+          <a:xfrm>
+            <a:off x="8227479" y="883138"/>
+            <a:ext cx="1573013" cy="547077"/>
+          </a:xfrm>
+          <a:custGeom>
+            <a:avLst/>
+            <a:gdLst>
+              <a:gd name="connsiteX0" fmla="*/ 111536 w 1573013"/>
+              <a:gd name="connsiteY0" fmla="*/ 461108 h 547077"/>
+              <a:gd name="connsiteX1" fmla="*/ 72459 w 1573013"/>
+              <a:gd name="connsiteY1" fmla="*/ 437662 h 547077"/>
+              <a:gd name="connsiteX2" fmla="*/ 41198 w 1573013"/>
+              <a:gd name="connsiteY2" fmla="*/ 390770 h 547077"/>
+              <a:gd name="connsiteX3" fmla="*/ 17752 w 1573013"/>
+              <a:gd name="connsiteY3" fmla="*/ 367324 h 547077"/>
+              <a:gd name="connsiteX4" fmla="*/ 9936 w 1573013"/>
+              <a:gd name="connsiteY4" fmla="*/ 343877 h 547077"/>
+              <a:gd name="connsiteX5" fmla="*/ 9936 w 1573013"/>
+              <a:gd name="connsiteY5" fmla="*/ 117231 h 547077"/>
+              <a:gd name="connsiteX6" fmla="*/ 33383 w 1573013"/>
+              <a:gd name="connsiteY6" fmla="*/ 70339 h 547077"/>
+              <a:gd name="connsiteX7" fmla="*/ 80275 w 1573013"/>
+              <a:gd name="connsiteY7" fmla="*/ 39077 h 547077"/>
+              <a:gd name="connsiteX8" fmla="*/ 150613 w 1573013"/>
+              <a:gd name="connsiteY8" fmla="*/ 15631 h 547077"/>
+              <a:gd name="connsiteX9" fmla="*/ 174059 w 1573013"/>
+              <a:gd name="connsiteY9" fmla="*/ 7816 h 547077"/>
+              <a:gd name="connsiteX10" fmla="*/ 197506 w 1573013"/>
+              <a:gd name="connsiteY10" fmla="*/ 0 h 547077"/>
+              <a:gd name="connsiteX11" fmla="*/ 431967 w 1573013"/>
+              <a:gd name="connsiteY11" fmla="*/ 7816 h 547077"/>
+              <a:gd name="connsiteX12" fmla="*/ 478859 w 1573013"/>
+              <a:gd name="connsiteY12" fmla="*/ 15631 h 547077"/>
+              <a:gd name="connsiteX13" fmla="*/ 533567 w 1573013"/>
+              <a:gd name="connsiteY13" fmla="*/ 23447 h 547077"/>
+              <a:gd name="connsiteX14" fmla="*/ 564829 w 1573013"/>
+              <a:gd name="connsiteY14" fmla="*/ 31262 h 547077"/>
+              <a:gd name="connsiteX15" fmla="*/ 713321 w 1573013"/>
+              <a:gd name="connsiteY15" fmla="*/ 46893 h 547077"/>
+              <a:gd name="connsiteX16" fmla="*/ 1002490 w 1573013"/>
+              <a:gd name="connsiteY16" fmla="*/ 39077 h 547077"/>
+              <a:gd name="connsiteX17" fmla="*/ 1057198 w 1573013"/>
+              <a:gd name="connsiteY17" fmla="*/ 23447 h 547077"/>
+              <a:gd name="connsiteX18" fmla="*/ 1143167 w 1573013"/>
+              <a:gd name="connsiteY18" fmla="*/ 0 h 547077"/>
+              <a:gd name="connsiteX19" fmla="*/ 1346367 w 1573013"/>
+              <a:gd name="connsiteY19" fmla="*/ 7816 h 547077"/>
+              <a:gd name="connsiteX20" fmla="*/ 1369813 w 1573013"/>
+              <a:gd name="connsiteY20" fmla="*/ 15631 h 547077"/>
+              <a:gd name="connsiteX21" fmla="*/ 1416706 w 1573013"/>
+              <a:gd name="connsiteY21" fmla="*/ 46893 h 547077"/>
+              <a:gd name="connsiteX22" fmla="*/ 1440152 w 1573013"/>
+              <a:gd name="connsiteY22" fmla="*/ 70339 h 547077"/>
+              <a:gd name="connsiteX23" fmla="*/ 1487044 w 1573013"/>
+              <a:gd name="connsiteY23" fmla="*/ 85970 h 547077"/>
+              <a:gd name="connsiteX24" fmla="*/ 1510490 w 1573013"/>
+              <a:gd name="connsiteY24" fmla="*/ 101600 h 547077"/>
+              <a:gd name="connsiteX25" fmla="*/ 1541752 w 1573013"/>
+              <a:gd name="connsiteY25" fmla="*/ 140677 h 547077"/>
+              <a:gd name="connsiteX26" fmla="*/ 1549567 w 1573013"/>
+              <a:gd name="connsiteY26" fmla="*/ 164124 h 547077"/>
+              <a:gd name="connsiteX27" fmla="*/ 1573013 w 1573013"/>
+              <a:gd name="connsiteY27" fmla="*/ 250093 h 547077"/>
+              <a:gd name="connsiteX28" fmla="*/ 1565198 w 1573013"/>
+              <a:gd name="connsiteY28" fmla="*/ 429847 h 547077"/>
+              <a:gd name="connsiteX29" fmla="*/ 1557383 w 1573013"/>
+              <a:gd name="connsiteY29" fmla="*/ 453293 h 547077"/>
+              <a:gd name="connsiteX30" fmla="*/ 1533936 w 1573013"/>
+              <a:gd name="connsiteY30" fmla="*/ 468924 h 547077"/>
+              <a:gd name="connsiteX31" fmla="*/ 1502675 w 1573013"/>
+              <a:gd name="connsiteY31" fmla="*/ 500185 h 547077"/>
+              <a:gd name="connsiteX32" fmla="*/ 1479229 w 1573013"/>
+              <a:gd name="connsiteY32" fmla="*/ 523631 h 547077"/>
+              <a:gd name="connsiteX33" fmla="*/ 1455783 w 1573013"/>
+              <a:gd name="connsiteY33" fmla="*/ 531447 h 547077"/>
+              <a:gd name="connsiteX34" fmla="*/ 1432336 w 1573013"/>
+              <a:gd name="connsiteY34" fmla="*/ 547077 h 547077"/>
+              <a:gd name="connsiteX35" fmla="*/ 1221321 w 1573013"/>
+              <a:gd name="connsiteY35" fmla="*/ 539262 h 547077"/>
+              <a:gd name="connsiteX36" fmla="*/ 1166613 w 1573013"/>
+              <a:gd name="connsiteY36" fmla="*/ 523631 h 547077"/>
+              <a:gd name="connsiteX37" fmla="*/ 1143167 w 1573013"/>
+              <a:gd name="connsiteY37" fmla="*/ 508000 h 547077"/>
+              <a:gd name="connsiteX38" fmla="*/ 1096275 w 1573013"/>
+              <a:gd name="connsiteY38" fmla="*/ 492370 h 547077"/>
+              <a:gd name="connsiteX39" fmla="*/ 1072829 w 1573013"/>
+              <a:gd name="connsiteY39" fmla="*/ 476739 h 547077"/>
+              <a:gd name="connsiteX40" fmla="*/ 1025936 w 1573013"/>
+              <a:gd name="connsiteY40" fmla="*/ 461108 h 547077"/>
+              <a:gd name="connsiteX41" fmla="*/ 1002490 w 1573013"/>
+              <a:gd name="connsiteY41" fmla="*/ 445477 h 547077"/>
+              <a:gd name="connsiteX42" fmla="*/ 955598 w 1573013"/>
+              <a:gd name="connsiteY42" fmla="*/ 429847 h 547077"/>
+              <a:gd name="connsiteX43" fmla="*/ 900890 w 1573013"/>
+              <a:gd name="connsiteY43" fmla="*/ 414216 h 547077"/>
+              <a:gd name="connsiteX44" fmla="*/ 822736 w 1573013"/>
+              <a:gd name="connsiteY44" fmla="*/ 422031 h 547077"/>
+              <a:gd name="connsiteX45" fmla="*/ 775844 w 1573013"/>
+              <a:gd name="connsiteY45" fmla="*/ 437662 h 547077"/>
+              <a:gd name="connsiteX46" fmla="*/ 752398 w 1573013"/>
+              <a:gd name="connsiteY46" fmla="*/ 445477 h 547077"/>
+              <a:gd name="connsiteX47" fmla="*/ 705506 w 1573013"/>
+              <a:gd name="connsiteY47" fmla="*/ 461108 h 547077"/>
+              <a:gd name="connsiteX48" fmla="*/ 682059 w 1573013"/>
+              <a:gd name="connsiteY48" fmla="*/ 468924 h 547077"/>
+              <a:gd name="connsiteX49" fmla="*/ 642983 w 1573013"/>
+              <a:gd name="connsiteY49" fmla="*/ 476739 h 547077"/>
+              <a:gd name="connsiteX50" fmla="*/ 596090 w 1573013"/>
+              <a:gd name="connsiteY50" fmla="*/ 492370 h 547077"/>
+              <a:gd name="connsiteX51" fmla="*/ 424152 w 1573013"/>
+              <a:gd name="connsiteY51" fmla="*/ 508000 h 547077"/>
+              <a:gd name="connsiteX52" fmla="*/ 275659 w 1573013"/>
+              <a:gd name="connsiteY52" fmla="*/ 500185 h 547077"/>
+              <a:gd name="connsiteX53" fmla="*/ 127167 w 1573013"/>
+              <a:gd name="connsiteY53" fmla="*/ 476739 h 547077"/>
+              <a:gd name="connsiteX54" fmla="*/ 111536 w 1573013"/>
+              <a:gd name="connsiteY54" fmla="*/ 461108 h 547077"/>
+            </a:gdLst>
+            <a:ahLst/>
+            <a:cxnLst>
+              <a:cxn ang="0">
+                <a:pos x="connsiteX0" y="connsiteY0"/>
+              </a:cxn>
+              <a:cxn ang="0">
+                <a:pos x="connsiteX1" y="connsiteY1"/>
+              </a:cxn>
+              <a:cxn ang="0">
+                <a:pos x="connsiteX2" y="connsiteY2"/>
+              </a:cxn>
+              <a:cxn ang="0">
+                <a:pos x="connsiteX3" y="connsiteY3"/>
+              </a:cxn>
+              <a:cxn ang="0">
+                <a:pos x="connsiteX4" y="connsiteY4"/>
+              </a:cxn>
+              <a:cxn ang="0">
+                <a:pos x="connsiteX5" y="connsiteY5"/>
+              </a:cxn>
+              <a:cxn ang="0">
+                <a:pos x="connsiteX6" y="connsiteY6"/>
+              </a:cxn>
+              <a:cxn ang="0">
+                <a:pos x="connsiteX7" y="connsiteY7"/>
+              </a:cxn>
+              <a:cxn ang="0">
+                <a:pos x="connsiteX8" y="connsiteY8"/>
+              </a:cxn>
+              <a:cxn ang="0">
+                <a:pos x="connsiteX9" y="connsiteY9"/>
+              </a:cxn>
+              <a:cxn ang="0">
+                <a:pos x="connsiteX10" y="connsiteY10"/>
+              </a:cxn>
+              <a:cxn ang="0">
+                <a:pos x="connsiteX11" y="connsiteY11"/>
+              </a:cxn>
+              <a:cxn ang="0">
+                <a:pos x="connsiteX12" y="connsiteY12"/>
+              </a:cxn>
+              <a:cxn ang="0">
+                <a:pos x="connsiteX13" y="connsiteY13"/>
+              </a:cxn>
+              <a:cxn ang="0">
+                <a:pos x="connsiteX14" y="connsiteY14"/>
+              </a:cxn>
+              <a:cxn ang="0">
+                <a:pos x="connsiteX15" y="connsiteY15"/>
+              </a:cxn>
+              <a:cxn ang="0">
+                <a:pos x="connsiteX16" y="connsiteY16"/>
+              </a:cxn>
+              <a:cxn ang="0">
+                <a:pos x="connsiteX17" y="connsiteY17"/>
+              </a:cxn>
+              <a:cxn ang="0">
+                <a:pos x="connsiteX18" y="connsiteY18"/>
+              </a:cxn>
+              <a:cxn ang="0">
+                <a:pos x="connsiteX19" y="connsiteY19"/>
+              </a:cxn>
+              <a:cxn ang="0">
+                <a:pos x="connsiteX20" y="connsiteY20"/>
+              </a:cxn>
+              <a:cxn ang="0">
+                <a:pos x="connsiteX21" y="connsiteY21"/>
+              </a:cxn>
+              <a:cxn ang="0">
+                <a:pos x="connsiteX22" y="connsiteY22"/>
+              </a:cxn>
+              <a:cxn ang="0">
+                <a:pos x="connsiteX23" y="connsiteY23"/>
+              </a:cxn>
+              <a:cxn ang="0">
+                <a:pos x="connsiteX24" y="connsiteY24"/>
+              </a:cxn>
+              <a:cxn ang="0">
+                <a:pos x="connsiteX25" y="connsiteY25"/>
+              </a:cxn>
+              <a:cxn ang="0">
+                <a:pos x="connsiteX26" y="connsiteY26"/>
+              </a:cxn>
+              <a:cxn ang="0">
+                <a:pos x="connsiteX27" y="connsiteY27"/>
+              </a:cxn>
+              <a:cxn ang="0">
+                <a:pos x="connsiteX28" y="connsiteY28"/>
+              </a:cxn>
+              <a:cxn ang="0">
+                <a:pos x="connsiteX29" y="connsiteY29"/>
+              </a:cxn>
+              <a:cxn ang="0">
+                <a:pos x="connsiteX30" y="connsiteY30"/>
+              </a:cxn>
+              <a:cxn ang="0">
+                <a:pos x="connsiteX31" y="connsiteY31"/>
+              </a:cxn>
+              <a:cxn ang="0">
+                <a:pos x="connsiteX32" y="connsiteY32"/>
+              </a:cxn>
+              <a:cxn ang="0">
+                <a:pos x="connsiteX33" y="connsiteY33"/>
+              </a:cxn>
+              <a:cxn ang="0">
+                <a:pos x="connsiteX34" y="connsiteY34"/>
+              </a:cxn>
+              <a:cxn ang="0">
+                <a:pos x="connsiteX35" y="connsiteY35"/>
+              </a:cxn>
+              <a:cxn ang="0">
+                <a:pos x="connsiteX36" y="connsiteY36"/>
+              </a:cxn>
+              <a:cxn ang="0">
+                <a:pos x="connsiteX37" y="connsiteY37"/>
+              </a:cxn>
+              <a:cxn ang="0">
+                <a:pos x="connsiteX38" y="connsiteY38"/>
+              </a:cxn>
+              <a:cxn ang="0">
+                <a:pos x="connsiteX39" y="connsiteY39"/>
+              </a:cxn>
+              <a:cxn ang="0">
+                <a:pos x="connsiteX40" y="connsiteY40"/>
+              </a:cxn>
+              <a:cxn ang="0">
+                <a:pos x="connsiteX41" y="connsiteY41"/>
+              </a:cxn>
+              <a:cxn ang="0">
+                <a:pos x="connsiteX42" y="connsiteY42"/>
+              </a:cxn>
+              <a:cxn ang="0">
+                <a:pos x="connsiteX43" y="connsiteY43"/>
+              </a:cxn>
+              <a:cxn ang="0">
+                <a:pos x="connsiteX44" y="connsiteY44"/>
+              </a:cxn>
+              <a:cxn ang="0">
+                <a:pos x="connsiteX45" y="connsiteY45"/>
+              </a:cxn>
+              <a:cxn ang="0">
+                <a:pos x="connsiteX46" y="connsiteY46"/>
+              </a:cxn>
+              <a:cxn ang="0">
+                <a:pos x="connsiteX47" y="connsiteY47"/>
+              </a:cxn>
+              <a:cxn ang="0">
+                <a:pos x="connsiteX48" y="connsiteY48"/>
+              </a:cxn>
+              <a:cxn ang="0">
+                <a:pos x="connsiteX49" y="connsiteY49"/>
+              </a:cxn>
+              <a:cxn ang="0">
+                <a:pos x="connsiteX50" y="connsiteY50"/>
+              </a:cxn>
+              <a:cxn ang="0">
+                <a:pos x="connsiteX51" y="connsiteY51"/>
+              </a:cxn>
+              <a:cxn ang="0">
+                <a:pos x="connsiteX52" y="connsiteY52"/>
+              </a:cxn>
+              <a:cxn ang="0">
+                <a:pos x="connsiteX53" y="connsiteY53"/>
+              </a:cxn>
+              <a:cxn ang="0">
+                <a:pos x="connsiteX54" y="connsiteY54"/>
+              </a:cxn>
+            </a:cxnLst>
+            <a:rect l="l" t="t" r="r" b="b"/>
+            <a:pathLst>
+              <a:path w="1573013" h="547077">
+                <a:moveTo>
+                  <a:pt x="111536" y="461108"/>
+                </a:moveTo>
+                <a:cubicBezTo>
+                  <a:pt x="98510" y="453293"/>
+                  <a:pt x="83200" y="448403"/>
+                  <a:pt x="72459" y="437662"/>
+                </a:cubicBezTo>
+                <a:cubicBezTo>
+                  <a:pt x="59176" y="424379"/>
+                  <a:pt x="54481" y="404053"/>
+                  <a:pt x="41198" y="390770"/>
+                </a:cubicBezTo>
+                <a:lnTo>
+                  <a:pt x="17752" y="367324"/>
+                </a:lnTo>
+                <a:cubicBezTo>
+                  <a:pt x="15147" y="359508"/>
+                  <a:pt x="11723" y="351919"/>
+                  <a:pt x="9936" y="343877"/>
+                </a:cubicBezTo>
+                <a:cubicBezTo>
+                  <a:pt x="-7970" y="263302"/>
+                  <a:pt x="2308" y="216395"/>
+                  <a:pt x="9936" y="117231"/>
+                </a:cubicBezTo>
+                <a:cubicBezTo>
+                  <a:pt x="10913" y="104530"/>
+                  <a:pt x="24367" y="78228"/>
+                  <a:pt x="33383" y="70339"/>
+                </a:cubicBezTo>
+                <a:cubicBezTo>
+                  <a:pt x="47521" y="57968"/>
+                  <a:pt x="62453" y="45017"/>
+                  <a:pt x="80275" y="39077"/>
+                </a:cubicBezTo>
+                <a:lnTo>
+                  <a:pt x="150613" y="15631"/>
+                </a:lnTo>
+                <a:lnTo>
+                  <a:pt x="174059" y="7816"/>
+                </a:lnTo>
+                <a:lnTo>
+                  <a:pt x="197506" y="0"/>
+                </a:lnTo>
+                <a:cubicBezTo>
+                  <a:pt x="275660" y="2605"/>
+                  <a:pt x="353890" y="3478"/>
+                  <a:pt x="431967" y="7816"/>
+                </a:cubicBezTo>
+                <a:cubicBezTo>
+                  <a:pt x="447789" y="8695"/>
+                  <a:pt x="463197" y="13221"/>
+                  <a:pt x="478859" y="15631"/>
+                </a:cubicBezTo>
+                <a:cubicBezTo>
+                  <a:pt x="497066" y="18432"/>
+                  <a:pt x="515443" y="20152"/>
+                  <a:pt x="533567" y="23447"/>
+                </a:cubicBezTo>
+                <a:cubicBezTo>
+                  <a:pt x="544135" y="25368"/>
+                  <a:pt x="554178" y="29873"/>
+                  <a:pt x="564829" y="31262"/>
+                </a:cubicBezTo>
+                <a:cubicBezTo>
+                  <a:pt x="614182" y="37699"/>
+                  <a:pt x="713321" y="46893"/>
+                  <a:pt x="713321" y="46893"/>
+                </a:cubicBezTo>
+                <a:cubicBezTo>
+                  <a:pt x="809711" y="44288"/>
+                  <a:pt x="906180" y="43775"/>
+                  <a:pt x="1002490" y="39077"/>
+                </a:cubicBezTo>
+                <a:cubicBezTo>
+                  <a:pt x="1018343" y="38304"/>
+                  <a:pt x="1041509" y="27726"/>
+                  <a:pt x="1057198" y="23447"/>
+                </a:cubicBezTo>
+                <a:cubicBezTo>
+                  <a:pt x="1154138" y="-2991"/>
+                  <a:pt x="1089208" y="17988"/>
+                  <a:pt x="1143167" y="0"/>
+                </a:cubicBezTo>
+                <a:cubicBezTo>
+                  <a:pt x="1210900" y="2605"/>
+                  <a:pt x="1278744" y="3152"/>
+                  <a:pt x="1346367" y="7816"/>
+                </a:cubicBezTo>
+                <a:cubicBezTo>
+                  <a:pt x="1354586" y="8383"/>
+                  <a:pt x="1362959" y="11061"/>
+                  <a:pt x="1369813" y="15631"/>
+                </a:cubicBezTo>
+                <a:cubicBezTo>
+                  <a:pt x="1428358" y="54661"/>
+                  <a:pt x="1360953" y="28308"/>
+                  <a:pt x="1416706" y="46893"/>
+                </a:cubicBezTo>
+                <a:cubicBezTo>
+                  <a:pt x="1424521" y="54708"/>
+                  <a:pt x="1430490" y="64971"/>
+                  <a:pt x="1440152" y="70339"/>
+                </a:cubicBezTo>
+                <a:cubicBezTo>
+                  <a:pt x="1454555" y="78341"/>
+                  <a:pt x="1473335" y="76831"/>
+                  <a:pt x="1487044" y="85970"/>
+                </a:cubicBezTo>
+                <a:lnTo>
+                  <a:pt x="1510490" y="101600"/>
+                </a:lnTo>
+                <a:cubicBezTo>
+                  <a:pt x="1530137" y="160539"/>
+                  <a:pt x="1501349" y="90172"/>
+                  <a:pt x="1541752" y="140677"/>
+                </a:cubicBezTo>
+                <a:cubicBezTo>
+                  <a:pt x="1546898" y="147110"/>
+                  <a:pt x="1547399" y="156176"/>
+                  <a:pt x="1549567" y="164124"/>
+                </a:cubicBezTo>
+                <a:cubicBezTo>
+                  <a:pt x="1576008" y="261077"/>
+                  <a:pt x="1555026" y="196129"/>
+                  <a:pt x="1573013" y="250093"/>
+                </a:cubicBezTo>
+                <a:cubicBezTo>
+                  <a:pt x="1570408" y="310011"/>
+                  <a:pt x="1569798" y="370049"/>
+                  <a:pt x="1565198" y="429847"/>
+                </a:cubicBezTo>
+                <a:cubicBezTo>
+                  <a:pt x="1564566" y="438061"/>
+                  <a:pt x="1562529" y="446860"/>
+                  <a:pt x="1557383" y="453293"/>
+                </a:cubicBezTo>
+                <a:cubicBezTo>
+                  <a:pt x="1551515" y="460628"/>
+                  <a:pt x="1541752" y="463714"/>
+                  <a:pt x="1533936" y="468924"/>
+                </a:cubicBezTo>
+                <a:cubicBezTo>
+                  <a:pt x="1519050" y="513583"/>
+                  <a:pt x="1538402" y="476367"/>
+                  <a:pt x="1502675" y="500185"/>
+                </a:cubicBezTo>
+                <a:cubicBezTo>
+                  <a:pt x="1493479" y="506316"/>
+                  <a:pt x="1488425" y="517500"/>
+                  <a:pt x="1479229" y="523631"/>
+                </a:cubicBezTo>
+                <a:cubicBezTo>
+                  <a:pt x="1472374" y="528201"/>
+                  <a:pt x="1463151" y="527763"/>
+                  <a:pt x="1455783" y="531447"/>
+                </a:cubicBezTo>
+                <a:cubicBezTo>
+                  <a:pt x="1447382" y="535648"/>
+                  <a:pt x="1440152" y="541867"/>
+                  <a:pt x="1432336" y="547077"/>
+                </a:cubicBezTo>
+                <a:cubicBezTo>
+                  <a:pt x="1361998" y="544472"/>
+                  <a:pt x="1291562" y="543793"/>
+                  <a:pt x="1221321" y="539262"/>
+                </a:cubicBezTo>
+                <a:cubicBezTo>
+                  <a:pt x="1215567" y="538891"/>
+                  <a:pt x="1174556" y="527603"/>
+                  <a:pt x="1166613" y="523631"/>
+                </a:cubicBezTo>
+                <a:cubicBezTo>
+                  <a:pt x="1158212" y="519430"/>
+                  <a:pt x="1151750" y="511815"/>
+                  <a:pt x="1143167" y="508000"/>
+                </a:cubicBezTo>
+                <a:cubicBezTo>
+                  <a:pt x="1128111" y="501308"/>
+                  <a:pt x="1096275" y="492370"/>
+                  <a:pt x="1096275" y="492370"/>
+                </a:cubicBezTo>
+                <a:cubicBezTo>
+                  <a:pt x="1088460" y="487160"/>
+                  <a:pt x="1081412" y="480554"/>
+                  <a:pt x="1072829" y="476739"/>
+                </a:cubicBezTo>
+                <a:cubicBezTo>
+                  <a:pt x="1057773" y="470047"/>
+                  <a:pt x="1039645" y="470248"/>
+                  <a:pt x="1025936" y="461108"/>
+                </a:cubicBezTo>
+                <a:cubicBezTo>
+                  <a:pt x="1018121" y="455898"/>
+                  <a:pt x="1011073" y="449292"/>
+                  <a:pt x="1002490" y="445477"/>
+                </a:cubicBezTo>
+                <a:cubicBezTo>
+                  <a:pt x="987434" y="438785"/>
+                  <a:pt x="971229" y="435057"/>
+                  <a:pt x="955598" y="429847"/>
+                </a:cubicBezTo>
+                <a:cubicBezTo>
+                  <a:pt x="921950" y="418631"/>
+                  <a:pt x="940159" y="424033"/>
+                  <a:pt x="900890" y="414216"/>
+                </a:cubicBezTo>
+                <a:cubicBezTo>
+                  <a:pt x="874839" y="416821"/>
+                  <a:pt x="848469" y="417206"/>
+                  <a:pt x="822736" y="422031"/>
+                </a:cubicBezTo>
+                <a:cubicBezTo>
+                  <a:pt x="806542" y="425067"/>
+                  <a:pt x="791475" y="432452"/>
+                  <a:pt x="775844" y="437662"/>
+                </a:cubicBezTo>
+                <a:lnTo>
+                  <a:pt x="752398" y="445477"/>
+                </a:lnTo>
+                <a:lnTo>
+                  <a:pt x="705506" y="461108"/>
+                </a:lnTo>
+                <a:cubicBezTo>
+                  <a:pt x="697690" y="463713"/>
+                  <a:pt x="690137" y="467308"/>
+                  <a:pt x="682059" y="468924"/>
+                </a:cubicBezTo>
+                <a:cubicBezTo>
+                  <a:pt x="669034" y="471529"/>
+                  <a:pt x="655798" y="473244"/>
+                  <a:pt x="642983" y="476739"/>
+                </a:cubicBezTo>
+                <a:cubicBezTo>
+                  <a:pt x="627087" y="481074"/>
+                  <a:pt x="612510" y="491002"/>
+                  <a:pt x="596090" y="492370"/>
+                </a:cubicBezTo>
+                <a:cubicBezTo>
+                  <a:pt x="476215" y="502359"/>
+                  <a:pt x="533520" y="497064"/>
+                  <a:pt x="424152" y="508000"/>
+                </a:cubicBezTo>
+                <a:lnTo>
+                  <a:pt x="275659" y="500185"/>
+                </a:lnTo>
+                <a:cubicBezTo>
+                  <a:pt x="275429" y="500171"/>
+                  <a:pt x="149143" y="498715"/>
+                  <a:pt x="127167" y="476739"/>
+                </a:cubicBezTo>
+                <a:lnTo>
+                  <a:pt x="111536" y="461108"/>
+                </a:lnTo>
+                <a:close/>
+              </a:path>
+            </a:pathLst>
+          </a:custGeom>
+        </p:spPr>
+        <p:style>
+          <a:lnRef idx="2">
+            <a:schemeClr val="accent1">
+              <a:shade val="50000"/>
+            </a:schemeClr>
+          </a:lnRef>
+          <a:fillRef idx="1">
+            <a:schemeClr val="accent1"/>
+          </a:fillRef>
+          <a:effectRef idx="0">
+            <a:schemeClr val="accent1"/>
+          </a:effectRef>
+          <a:fontRef idx="minor">
+            <a:schemeClr val="lt1"/>
+          </a:fontRef>
+        </p:style>
+        <p:txBody>
+          <a:bodyPr rtlCol="0" anchor="ctr"/>
+          <a:lstStyle/>
+          <a:p>
+            <a:pPr algn="ctr"/>
+            <a:r>
+              <a:rPr lang="en-US" dirty="0">
+                <a:latin typeface="Times New Roman" panose="02020603050405020304" pitchFamily="18" charset="0"/>
+                <a:cs typeface="Times New Roman" panose="02020603050405020304" pitchFamily="18" charset="0"/>
+              </a:rPr>
+              <a:t>id8</a:t>
+            </a:r>
+            <a:endParaRPr lang="ru-RU" dirty="0">
+              <a:latin typeface="Times New Roman" panose="02020603050405020304" pitchFamily="18" charset="0"/>
+              <a:cs typeface="Times New Roman" panose="02020603050405020304" pitchFamily="18" charset="0"/>
+            </a:endParaRPr>
+          </a:p>
+        </p:txBody>
+      </p:sp>
+      <p:graphicFrame>
+        <p:nvGraphicFramePr>
+          <p:cNvPr id="7" name="Object 6" descr="id7">
+            <a:extLst>
+              <a:ext uri="{FF2B5EF4-FFF2-40B4-BE49-F238E27FC236}">
+                <a16:creationId xmlns:a16="http://schemas.microsoft.com/office/drawing/2014/main" id="{AEDDDB48-9DC6-4D3F-9352-D37ED34567A0}"/>
+              </a:ext>
+            </a:extLst>
+          </p:cNvPr>
+          <p:cNvGraphicFramePr>
+            <a:graphicFrameLocks noChangeAspect="1"/>
+          </p:cNvGraphicFramePr>
+          <p:nvPr userDrawn="1">
+            <p:extLst>
+              <p:ext uri="{D42A27DB-BD31-4B8C-83A1-F6EECF244321}">
+                <p14:modId xmlns:p14="http://schemas.microsoft.com/office/powerpoint/2010/main" val="4057474641"/>
+              </p:ext>
+            </p:extLst>
+          </p:nvPr>
+        </p:nvGraphicFramePr>
+        <p:xfrm>
+          <a:off x="10593472" y="56357"/>
+          <a:ext cx="1520656" cy="1701800"/>
+        </p:xfrm>
+        <a:graphic>
+          <a:graphicData uri="http://schemas.openxmlformats.org/presentationml/2006/ole">
+            <mc:AlternateContent xmlns:mc="http://schemas.openxmlformats.org/markup-compatibility/2006">
+              <mc:Choice xmlns:v="urn:schemas-microsoft-com:vml" Requires="v">
+                <p:oleObj name="PDF" r:id="rId13" imgW="0" imgH="360" progId="FoxitReader.Document">
+                  <p:embed/>
+                </p:oleObj>
+              </mc:Choice>
+              <mc:Fallback>
+                <p:oleObj name="PDF" r:id="rId13" imgW="0" imgH="360" progId="FoxitReader.Document">
+                  <p:embed/>
+                  <p:pic>
+                    <p:nvPicPr>
+                      <p:cNvPr id="0" name=""/>
+                      <p:cNvPicPr/>
+                      <p:nvPr/>
+                    </p:nvPicPr>
+                    <p:blipFill>
+                      <a:blip r:embed="rId14"/>
+                      <a:stretch>
+                        <a:fillRect/>
+                      </a:stretch>
+                    </p:blipFill>
+                    <p:spPr>
+                      <a:xfrm>
+                        <a:off x="10593472" y="56357"/>
+                        <a:ext cx="1520656" cy="1701800"/>
+                      </a:xfrm>
+                      <a:prstGeom prst="rect">
+                        <a:avLst/>
+                      </a:prstGeom>
+                    </p:spPr>
+                  </p:pic>
+                </p:oleObj>
+              </mc:Fallback>
+            </mc:AlternateContent>
+          </a:graphicData>
+        </a:graphic>
+      </p:graphicFrame>
     </p:spTree>
     <p:extLst>
       <p:ext uri="{BB962C8B-B14F-4D97-AF65-F5344CB8AC3E}">

</xml_diff>

<commit_message>
SC-98: Add .NET 5.0 target
</commit_message>
<xml_diff>
--- a/ShapeCrawler.Tests.Unit/Resource/001.pptx
+++ b/ShapeCrawler.Tests.Unit/Resource/001.pptx
@@ -263,7 +263,7 @@
           <a:p>
             <a:fld id="{6A2D1428-0459-4F75-829F-043936AE8C9E}" type="datetimeFigureOut">
               <a:rPr lang="en-US" smtClean="0"/>
-              <a:t>1/22/2021</a:t>
+              <a:t>1/27/2021</a:t>
             </a:fld>
             <a:endParaRPr lang="en-US"/>
           </a:p>
@@ -519,7 +519,7 @@
           <a:p>
             <a:fld id="{6A2D1428-0459-4F75-829F-043936AE8C9E}" type="datetimeFigureOut">
               <a:rPr lang="en-US" smtClean="0"/>
-              <a:t>1/22/2021</a:t>
+              <a:t>1/27/2021</a:t>
             </a:fld>
             <a:endParaRPr lang="en-US"/>
           </a:p>
@@ -729,7 +729,7 @@
           <a:p>
             <a:fld id="{6A2D1428-0459-4F75-829F-043936AE8C9E}" type="datetimeFigureOut">
               <a:rPr lang="en-US" smtClean="0"/>
-              <a:t>1/22/2021</a:t>
+              <a:t>1/27/2021</a:t>
             </a:fld>
             <a:endParaRPr lang="en-US"/>
           </a:p>
@@ -929,7 +929,7 @@
           <a:p>
             <a:fld id="{6A2D1428-0459-4F75-829F-043936AE8C9E}" type="datetimeFigureOut">
               <a:rPr lang="en-US" smtClean="0"/>
-              <a:t>1/22/2021</a:t>
+              <a:t>1/27/2021</a:t>
             </a:fld>
             <a:endParaRPr lang="en-US"/>
           </a:p>
@@ -1205,7 +1205,7 @@
           <a:p>
             <a:fld id="{6A2D1428-0459-4F75-829F-043936AE8C9E}" type="datetimeFigureOut">
               <a:rPr lang="en-US" smtClean="0"/>
-              <a:t>1/22/2021</a:t>
+              <a:t>1/27/2021</a:t>
             </a:fld>
             <a:endParaRPr lang="en-US"/>
           </a:p>
@@ -1473,7 +1473,7 @@
           <a:p>
             <a:fld id="{6A2D1428-0459-4F75-829F-043936AE8C9E}" type="datetimeFigureOut">
               <a:rPr lang="en-US" smtClean="0"/>
-              <a:t>1/22/2021</a:t>
+              <a:t>1/27/2021</a:t>
             </a:fld>
             <a:endParaRPr lang="en-US"/>
           </a:p>
@@ -1888,7 +1888,7 @@
           <a:p>
             <a:fld id="{6A2D1428-0459-4F75-829F-043936AE8C9E}" type="datetimeFigureOut">
               <a:rPr lang="en-US" smtClean="0"/>
-              <a:t>1/22/2021</a:t>
+              <a:t>1/27/2021</a:t>
             </a:fld>
             <a:endParaRPr lang="en-US"/>
           </a:p>
@@ -2030,7 +2030,7 @@
           <a:p>
             <a:fld id="{6A2D1428-0459-4F75-829F-043936AE8C9E}" type="datetimeFigureOut">
               <a:rPr lang="en-US" smtClean="0"/>
-              <a:t>1/22/2021</a:t>
+              <a:t>1/27/2021</a:t>
             </a:fld>
             <a:endParaRPr lang="en-US"/>
           </a:p>
@@ -2143,7 +2143,7 @@
           <a:p>
             <a:fld id="{6A2D1428-0459-4F75-829F-043936AE8C9E}" type="datetimeFigureOut">
               <a:rPr lang="en-US" smtClean="0"/>
-              <a:t>1/22/2021</a:t>
+              <a:t>1/27/2021</a:t>
             </a:fld>
             <a:endParaRPr lang="en-US"/>
           </a:p>
@@ -2456,7 +2456,7 @@
           <a:p>
             <a:fld id="{6A2D1428-0459-4F75-829F-043936AE8C9E}" type="datetimeFigureOut">
               <a:rPr lang="en-US" smtClean="0"/>
-              <a:t>1/22/2021</a:t>
+              <a:t>1/27/2021</a:t>
             </a:fld>
             <a:endParaRPr lang="en-US"/>
           </a:p>
@@ -2745,7 +2745,7 @@
           <a:p>
             <a:fld id="{6A2D1428-0459-4F75-829F-043936AE8C9E}" type="datetimeFigureOut">
               <a:rPr lang="en-US" smtClean="0"/>
-              <a:t>1/22/2021</a:t>
+              <a:t>1/27/2021</a:t>
             </a:fld>
             <a:endParaRPr lang="en-US"/>
           </a:p>
@@ -2988,7 +2988,7 @@
           <a:p>
             <a:fld id="{6A2D1428-0459-4F75-829F-043936AE8C9E}" type="datetimeFigureOut">
               <a:rPr lang="en-US" smtClean="0"/>
-              <a:t>1/22/2021</a:t>
+              <a:t>1/27/2021</a:t>
             </a:fld>
             <a:endParaRPr lang="en-US"/>
           </a:p>
@@ -4413,7 +4413,7 @@
             <p:ph idx="1"/>
             <p:extLst>
               <p:ext uri="{D42A27DB-BD31-4B8C-83A1-F6EECF244321}">
-                <p14:modId xmlns:p14="http://schemas.microsoft.com/office/powerpoint/2010/main" val="725651782"/>
+                <p14:modId xmlns:p14="http://schemas.microsoft.com/office/powerpoint/2010/main" val="2420701430"/>
               </p:ext>
             </p:extLst>
           </p:nvPr>
@@ -4471,7 +4471,28 @@
                     <a:bodyPr/>
                     <a:lstStyle/>
                     <a:p>
-                      <a:endParaRPr lang="ru-RU"/>
+                      <a:pPr marL="0" marR="0" lvl="0" indent="0" algn="l" defTabSz="914400" rtl="0" eaLnBrk="1" fontAlgn="auto" latinLnBrk="0" hangingPunct="1">
+                        <a:lnSpc>
+                          <a:spcPct val="100000"/>
+                        </a:lnSpc>
+                        <a:spcBef>
+                          <a:spcPts val="0"/>
+                        </a:spcBef>
+                        <a:spcAft>
+                          <a:spcPts val="0"/>
+                        </a:spcAft>
+                        <a:buClrTx/>
+                        <a:buSzTx/>
+                        <a:buFontTx/>
+                        <a:buNone/>
+                        <a:tabLst/>
+                        <a:defRPr/>
+                      </a:pPr>
+                      <a:r>
+                        <a:rPr lang="en-US" sz="1600" dirty="0"/>
+                        <a:t>[0,1]</a:t>
+                      </a:r>
+                      <a:endParaRPr lang="ru-RU" sz="1600" dirty="0"/>
                     </a:p>
                   </a:txBody>
                   <a:tcPr/>

</xml_diff>

<commit_message>
SC-98: Add .NET 5.0 target (#100)
</commit_message>
<xml_diff>
--- a/ShapeCrawler.Tests.Unit/Resource/001.pptx
+++ b/ShapeCrawler.Tests.Unit/Resource/001.pptx
@@ -263,7 +263,7 @@
           <a:p>
             <a:fld id="{6A2D1428-0459-4F75-829F-043936AE8C9E}" type="datetimeFigureOut">
               <a:rPr lang="en-US" smtClean="0"/>
-              <a:t>1/22/2021</a:t>
+              <a:t>1/27/2021</a:t>
             </a:fld>
             <a:endParaRPr lang="en-US"/>
           </a:p>
@@ -519,7 +519,7 @@
           <a:p>
             <a:fld id="{6A2D1428-0459-4F75-829F-043936AE8C9E}" type="datetimeFigureOut">
               <a:rPr lang="en-US" smtClean="0"/>
-              <a:t>1/22/2021</a:t>
+              <a:t>1/27/2021</a:t>
             </a:fld>
             <a:endParaRPr lang="en-US"/>
           </a:p>
@@ -729,7 +729,7 @@
           <a:p>
             <a:fld id="{6A2D1428-0459-4F75-829F-043936AE8C9E}" type="datetimeFigureOut">
               <a:rPr lang="en-US" smtClean="0"/>
-              <a:t>1/22/2021</a:t>
+              <a:t>1/27/2021</a:t>
             </a:fld>
             <a:endParaRPr lang="en-US"/>
           </a:p>
@@ -929,7 +929,7 @@
           <a:p>
             <a:fld id="{6A2D1428-0459-4F75-829F-043936AE8C9E}" type="datetimeFigureOut">
               <a:rPr lang="en-US" smtClean="0"/>
-              <a:t>1/22/2021</a:t>
+              <a:t>1/27/2021</a:t>
             </a:fld>
             <a:endParaRPr lang="en-US"/>
           </a:p>
@@ -1205,7 +1205,7 @@
           <a:p>
             <a:fld id="{6A2D1428-0459-4F75-829F-043936AE8C9E}" type="datetimeFigureOut">
               <a:rPr lang="en-US" smtClean="0"/>
-              <a:t>1/22/2021</a:t>
+              <a:t>1/27/2021</a:t>
             </a:fld>
             <a:endParaRPr lang="en-US"/>
           </a:p>
@@ -1473,7 +1473,7 @@
           <a:p>
             <a:fld id="{6A2D1428-0459-4F75-829F-043936AE8C9E}" type="datetimeFigureOut">
               <a:rPr lang="en-US" smtClean="0"/>
-              <a:t>1/22/2021</a:t>
+              <a:t>1/27/2021</a:t>
             </a:fld>
             <a:endParaRPr lang="en-US"/>
           </a:p>
@@ -1888,7 +1888,7 @@
           <a:p>
             <a:fld id="{6A2D1428-0459-4F75-829F-043936AE8C9E}" type="datetimeFigureOut">
               <a:rPr lang="en-US" smtClean="0"/>
-              <a:t>1/22/2021</a:t>
+              <a:t>1/27/2021</a:t>
             </a:fld>
             <a:endParaRPr lang="en-US"/>
           </a:p>
@@ -2030,7 +2030,7 @@
           <a:p>
             <a:fld id="{6A2D1428-0459-4F75-829F-043936AE8C9E}" type="datetimeFigureOut">
               <a:rPr lang="en-US" smtClean="0"/>
-              <a:t>1/22/2021</a:t>
+              <a:t>1/27/2021</a:t>
             </a:fld>
             <a:endParaRPr lang="en-US"/>
           </a:p>
@@ -2143,7 +2143,7 @@
           <a:p>
             <a:fld id="{6A2D1428-0459-4F75-829F-043936AE8C9E}" type="datetimeFigureOut">
               <a:rPr lang="en-US" smtClean="0"/>
-              <a:t>1/22/2021</a:t>
+              <a:t>1/27/2021</a:t>
             </a:fld>
             <a:endParaRPr lang="en-US"/>
           </a:p>
@@ -2456,7 +2456,7 @@
           <a:p>
             <a:fld id="{6A2D1428-0459-4F75-829F-043936AE8C9E}" type="datetimeFigureOut">
               <a:rPr lang="en-US" smtClean="0"/>
-              <a:t>1/22/2021</a:t>
+              <a:t>1/27/2021</a:t>
             </a:fld>
             <a:endParaRPr lang="en-US"/>
           </a:p>
@@ -2745,7 +2745,7 @@
           <a:p>
             <a:fld id="{6A2D1428-0459-4F75-829F-043936AE8C9E}" type="datetimeFigureOut">
               <a:rPr lang="en-US" smtClean="0"/>
-              <a:t>1/22/2021</a:t>
+              <a:t>1/27/2021</a:t>
             </a:fld>
             <a:endParaRPr lang="en-US"/>
           </a:p>
@@ -2988,7 +2988,7 @@
           <a:p>
             <a:fld id="{6A2D1428-0459-4F75-829F-043936AE8C9E}" type="datetimeFigureOut">
               <a:rPr lang="en-US" smtClean="0"/>
-              <a:t>1/22/2021</a:t>
+              <a:t>1/27/2021</a:t>
             </a:fld>
             <a:endParaRPr lang="en-US"/>
           </a:p>
@@ -4413,7 +4413,7 @@
             <p:ph idx="1"/>
             <p:extLst>
               <p:ext uri="{D42A27DB-BD31-4B8C-83A1-F6EECF244321}">
-                <p14:modId xmlns:p14="http://schemas.microsoft.com/office/powerpoint/2010/main" val="725651782"/>
+                <p14:modId xmlns:p14="http://schemas.microsoft.com/office/powerpoint/2010/main" val="2420701430"/>
               </p:ext>
             </p:extLst>
           </p:nvPr>
@@ -4471,7 +4471,28 @@
                     <a:bodyPr/>
                     <a:lstStyle/>
                     <a:p>
-                      <a:endParaRPr lang="ru-RU"/>
+                      <a:pPr marL="0" marR="0" lvl="0" indent="0" algn="l" defTabSz="914400" rtl="0" eaLnBrk="1" fontAlgn="auto" latinLnBrk="0" hangingPunct="1">
+                        <a:lnSpc>
+                          <a:spcPct val="100000"/>
+                        </a:lnSpc>
+                        <a:spcBef>
+                          <a:spcPts val="0"/>
+                        </a:spcBef>
+                        <a:spcAft>
+                          <a:spcPts val="0"/>
+                        </a:spcAft>
+                        <a:buClrTx/>
+                        <a:buSzTx/>
+                        <a:buFontTx/>
+                        <a:buNone/>
+                        <a:tabLst/>
+                        <a:defRPr/>
+                      </a:pPr>
+                      <a:r>
+                        <a:rPr lang="en-US" sz="1600" dirty="0"/>
+                        <a:t>[0,1]</a:t>
+                      </a:r>
+                      <a:endParaRPr lang="ru-RU" sz="1600" dirty="0"/>
                     </a:p>
                   </a:txBody>
                   <a:tcPr/>

</xml_diff>

<commit_message>
Change concept to access different shape types
</commit_message>
<xml_diff>
--- a/ShapeCrawler.Tests.Unit/Resource/001.pptx
+++ b/ShapeCrawler.Tests.Unit/Resource/001.pptx
@@ -264,7 +264,7 @@
           <a:p>
             <a:fld id="{6A2D1428-0459-4F75-829F-043936AE8C9E}" type="datetimeFigureOut">
               <a:rPr lang="en-US" smtClean="0"/>
-              <a:t>2/9/2021</a:t>
+              <a:t>2/14/2021</a:t>
             </a:fld>
             <a:endParaRPr lang="en-US"/>
           </a:p>
@@ -520,7 +520,7 @@
           <a:p>
             <a:fld id="{6A2D1428-0459-4F75-829F-043936AE8C9E}" type="datetimeFigureOut">
               <a:rPr lang="en-US" smtClean="0"/>
-              <a:t>2/9/2021</a:t>
+              <a:t>2/14/2021</a:t>
             </a:fld>
             <a:endParaRPr lang="en-US"/>
           </a:p>
@@ -730,7 +730,7 @@
           <a:p>
             <a:fld id="{6A2D1428-0459-4F75-829F-043936AE8C9E}" type="datetimeFigureOut">
               <a:rPr lang="en-US" smtClean="0"/>
-              <a:t>2/9/2021</a:t>
+              <a:t>2/14/2021</a:t>
             </a:fld>
             <a:endParaRPr lang="en-US"/>
           </a:p>
@@ -930,7 +930,7 @@
           <a:p>
             <a:fld id="{6A2D1428-0459-4F75-829F-043936AE8C9E}" type="datetimeFigureOut">
               <a:rPr lang="en-US" smtClean="0"/>
-              <a:t>2/9/2021</a:t>
+              <a:t>2/14/2021</a:t>
             </a:fld>
             <a:endParaRPr lang="en-US"/>
           </a:p>
@@ -1206,7 +1206,7 @@
           <a:p>
             <a:fld id="{6A2D1428-0459-4F75-829F-043936AE8C9E}" type="datetimeFigureOut">
               <a:rPr lang="en-US" smtClean="0"/>
-              <a:t>2/9/2021</a:t>
+              <a:t>2/14/2021</a:t>
             </a:fld>
             <a:endParaRPr lang="en-US"/>
           </a:p>
@@ -1474,7 +1474,7 @@
           <a:p>
             <a:fld id="{6A2D1428-0459-4F75-829F-043936AE8C9E}" type="datetimeFigureOut">
               <a:rPr lang="en-US" smtClean="0"/>
-              <a:t>2/9/2021</a:t>
+              <a:t>2/14/2021</a:t>
             </a:fld>
             <a:endParaRPr lang="en-US"/>
           </a:p>
@@ -1889,7 +1889,7 @@
           <a:p>
             <a:fld id="{6A2D1428-0459-4F75-829F-043936AE8C9E}" type="datetimeFigureOut">
               <a:rPr lang="en-US" smtClean="0"/>
-              <a:t>2/9/2021</a:t>
+              <a:t>2/14/2021</a:t>
             </a:fld>
             <a:endParaRPr lang="en-US"/>
           </a:p>
@@ -2031,7 +2031,7 @@
           <a:p>
             <a:fld id="{6A2D1428-0459-4F75-829F-043936AE8C9E}" type="datetimeFigureOut">
               <a:rPr lang="en-US" smtClean="0"/>
-              <a:t>2/9/2021</a:t>
+              <a:t>2/14/2021</a:t>
             </a:fld>
             <a:endParaRPr lang="en-US"/>
           </a:p>
@@ -2144,7 +2144,7 @@
           <a:p>
             <a:fld id="{6A2D1428-0459-4F75-829F-043936AE8C9E}" type="datetimeFigureOut">
               <a:rPr lang="en-US" smtClean="0"/>
-              <a:t>2/9/2021</a:t>
+              <a:t>2/14/2021</a:t>
             </a:fld>
             <a:endParaRPr lang="en-US"/>
           </a:p>
@@ -2457,7 +2457,7 @@
           <a:p>
             <a:fld id="{6A2D1428-0459-4F75-829F-043936AE8C9E}" type="datetimeFigureOut">
               <a:rPr lang="en-US" smtClean="0"/>
-              <a:t>2/9/2021</a:t>
+              <a:t>2/14/2021</a:t>
             </a:fld>
             <a:endParaRPr lang="en-US"/>
           </a:p>
@@ -2746,7 +2746,7 @@
           <a:p>
             <a:fld id="{6A2D1428-0459-4F75-829F-043936AE8C9E}" type="datetimeFigureOut">
               <a:rPr lang="en-US" smtClean="0"/>
-              <a:t>2/9/2021</a:t>
+              <a:t>2/14/2021</a:t>
             </a:fld>
             <a:endParaRPr lang="en-US"/>
           </a:p>
@@ -2989,7 +2989,7 @@
           <a:p>
             <a:fld id="{6A2D1428-0459-4F75-829F-043936AE8C9E}" type="datetimeFigureOut">
               <a:rPr lang="en-US" smtClean="0"/>
-              <a:t>2/9/2021</a:t>
+              <a:t>2/14/2021</a:t>
             </a:fld>
             <a:endParaRPr lang="en-US"/>
           </a:p>
@@ -5947,10 +5947,10 @@
                     <a:lstStyle/>
                     <a:p>
                       <a:r>
-                        <a:rPr lang="en-US"/>
+                        <a:rPr lang="en-US" dirty="0"/>
                         <a:t>id3</a:t>
                       </a:r>
-                      <a:endParaRPr lang="ru-RU"/>
+                      <a:endParaRPr lang="ru-RU" dirty="0"/>
                     </a:p>
                   </a:txBody>
                   <a:tcPr/>
@@ -5968,6 +5968,104 @@
                 <a:extLst>
                   <a:ext uri="{0D108BD9-81ED-4DB2-BD59-A6C34878D82A}">
                     <a16:rowId xmlns:a16="http://schemas.microsoft.com/office/drawing/2014/main" val="2163625966"/>
+                  </a:ext>
+                </a:extLst>
+              </a:tr>
+            </a:tbl>
+          </a:graphicData>
+        </a:graphic>
+      </p:graphicFrame>
+      <p:graphicFrame>
+        <p:nvGraphicFramePr>
+          <p:cNvPr id="6" name="Table 6">
+            <a:extLst>
+              <a:ext uri="{FF2B5EF4-FFF2-40B4-BE49-F238E27FC236}">
+                <a16:creationId xmlns:a16="http://schemas.microsoft.com/office/drawing/2014/main" id="{3359D70F-E104-4B2F-A539-6ABE5956B196}"/>
+              </a:ext>
+            </a:extLst>
+          </p:cNvPr>
+          <p:cNvGraphicFramePr>
+            <a:graphicFrameLocks noGrp="1"/>
+          </p:cNvGraphicFramePr>
+          <p:nvPr>
+            <p:extLst>
+              <p:ext uri="{D42A27DB-BD31-4B8C-83A1-F6EECF244321}">
+                <p14:modId xmlns:p14="http://schemas.microsoft.com/office/powerpoint/2010/main" val="1769434869"/>
+              </p:ext>
+            </p:extLst>
+          </p:nvPr>
+        </p:nvGraphicFramePr>
+        <p:xfrm>
+          <a:off x="273539" y="3892712"/>
+          <a:ext cx="8127999" cy="370840"/>
+        </p:xfrm>
+        <a:graphic>
+          <a:graphicData uri="http://schemas.openxmlformats.org/drawingml/2006/table">
+            <a:tbl>
+              <a:tblPr firstRow="1" bandRow="1">
+                <a:tableStyleId>{93296810-A885-4BE3-A3E7-6D5BEEA58F35}</a:tableStyleId>
+              </a:tblPr>
+              <a:tblGrid>
+                <a:gridCol w="2709333">
+                  <a:extLst>
+                    <a:ext uri="{9D8B030D-6E8A-4147-A177-3AD203B41FA5}">
+                      <a16:colId xmlns:a16="http://schemas.microsoft.com/office/drawing/2014/main" val="3598523350"/>
+                    </a:ext>
+                  </a:extLst>
+                </a:gridCol>
+                <a:gridCol w="2709333">
+                  <a:extLst>
+                    <a:ext uri="{9D8B030D-6E8A-4147-A177-3AD203B41FA5}">
+                      <a16:colId xmlns:a16="http://schemas.microsoft.com/office/drawing/2014/main" val="1840150110"/>
+                    </a:ext>
+                  </a:extLst>
+                </a:gridCol>
+                <a:gridCol w="2709333">
+                  <a:extLst>
+                    <a:ext uri="{9D8B030D-6E8A-4147-A177-3AD203B41FA5}">
+                      <a16:colId xmlns:a16="http://schemas.microsoft.com/office/drawing/2014/main" val="1629514209"/>
+                    </a:ext>
+                  </a:extLst>
+                </a:gridCol>
+              </a:tblGrid>
+              <a:tr h="370840">
+                <a:tc>
+                  <a:txBody>
+                    <a:bodyPr/>
+                    <a:lstStyle/>
+                    <a:p>
+                      <a:r>
+                        <a:rPr lang="en-US"/>
+                        <a:t>id6</a:t>
+                      </a:r>
+                      <a:endParaRPr lang="ru-RU"/>
+                    </a:p>
+                  </a:txBody>
+                  <a:tcPr/>
+                </a:tc>
+                <a:tc>
+                  <a:txBody>
+                    <a:bodyPr/>
+                    <a:lstStyle/>
+                    <a:p>
+                      <a:endParaRPr lang="ru-RU"/>
+                    </a:p>
+                  </a:txBody>
+                  <a:tcPr/>
+                </a:tc>
+                <a:tc>
+                  <a:txBody>
+                    <a:bodyPr/>
+                    <a:lstStyle/>
+                    <a:p>
+                      <a:endParaRPr lang="ru-RU" dirty="0"/>
+                    </a:p>
+                  </a:txBody>
+                  <a:tcPr/>
+                </a:tc>
+                <a:extLst>
+                  <a:ext uri="{0D108BD9-81ED-4DB2-BD59-A6C34878D82A}">
+                    <a16:rowId xmlns:a16="http://schemas.microsoft.com/office/drawing/2014/main" val="2134271287"/>
                   </a:ext>
                 </a:extLst>
               </a:tr>

</xml_diff>

<commit_message>
Change concept to access different shape types (#107)
</commit_message>
<xml_diff>
--- a/ShapeCrawler.Tests.Unit/Resource/001.pptx
+++ b/ShapeCrawler.Tests.Unit/Resource/001.pptx
@@ -264,7 +264,7 @@
           <a:p>
             <a:fld id="{6A2D1428-0459-4F75-829F-043936AE8C9E}" type="datetimeFigureOut">
               <a:rPr lang="en-US" smtClean="0"/>
-              <a:t>2/9/2021</a:t>
+              <a:t>2/14/2021</a:t>
             </a:fld>
             <a:endParaRPr lang="en-US"/>
           </a:p>
@@ -520,7 +520,7 @@
           <a:p>
             <a:fld id="{6A2D1428-0459-4F75-829F-043936AE8C9E}" type="datetimeFigureOut">
               <a:rPr lang="en-US" smtClean="0"/>
-              <a:t>2/9/2021</a:t>
+              <a:t>2/14/2021</a:t>
             </a:fld>
             <a:endParaRPr lang="en-US"/>
           </a:p>
@@ -730,7 +730,7 @@
           <a:p>
             <a:fld id="{6A2D1428-0459-4F75-829F-043936AE8C9E}" type="datetimeFigureOut">
               <a:rPr lang="en-US" smtClean="0"/>
-              <a:t>2/9/2021</a:t>
+              <a:t>2/14/2021</a:t>
             </a:fld>
             <a:endParaRPr lang="en-US"/>
           </a:p>
@@ -930,7 +930,7 @@
           <a:p>
             <a:fld id="{6A2D1428-0459-4F75-829F-043936AE8C9E}" type="datetimeFigureOut">
               <a:rPr lang="en-US" smtClean="0"/>
-              <a:t>2/9/2021</a:t>
+              <a:t>2/14/2021</a:t>
             </a:fld>
             <a:endParaRPr lang="en-US"/>
           </a:p>
@@ -1206,7 +1206,7 @@
           <a:p>
             <a:fld id="{6A2D1428-0459-4F75-829F-043936AE8C9E}" type="datetimeFigureOut">
               <a:rPr lang="en-US" smtClean="0"/>
-              <a:t>2/9/2021</a:t>
+              <a:t>2/14/2021</a:t>
             </a:fld>
             <a:endParaRPr lang="en-US"/>
           </a:p>
@@ -1474,7 +1474,7 @@
           <a:p>
             <a:fld id="{6A2D1428-0459-4F75-829F-043936AE8C9E}" type="datetimeFigureOut">
               <a:rPr lang="en-US" smtClean="0"/>
-              <a:t>2/9/2021</a:t>
+              <a:t>2/14/2021</a:t>
             </a:fld>
             <a:endParaRPr lang="en-US"/>
           </a:p>
@@ -1889,7 +1889,7 @@
           <a:p>
             <a:fld id="{6A2D1428-0459-4F75-829F-043936AE8C9E}" type="datetimeFigureOut">
               <a:rPr lang="en-US" smtClean="0"/>
-              <a:t>2/9/2021</a:t>
+              <a:t>2/14/2021</a:t>
             </a:fld>
             <a:endParaRPr lang="en-US"/>
           </a:p>
@@ -2031,7 +2031,7 @@
           <a:p>
             <a:fld id="{6A2D1428-0459-4F75-829F-043936AE8C9E}" type="datetimeFigureOut">
               <a:rPr lang="en-US" smtClean="0"/>
-              <a:t>2/9/2021</a:t>
+              <a:t>2/14/2021</a:t>
             </a:fld>
             <a:endParaRPr lang="en-US"/>
           </a:p>
@@ -2144,7 +2144,7 @@
           <a:p>
             <a:fld id="{6A2D1428-0459-4F75-829F-043936AE8C9E}" type="datetimeFigureOut">
               <a:rPr lang="en-US" smtClean="0"/>
-              <a:t>2/9/2021</a:t>
+              <a:t>2/14/2021</a:t>
             </a:fld>
             <a:endParaRPr lang="en-US"/>
           </a:p>
@@ -2457,7 +2457,7 @@
           <a:p>
             <a:fld id="{6A2D1428-0459-4F75-829F-043936AE8C9E}" type="datetimeFigureOut">
               <a:rPr lang="en-US" smtClean="0"/>
-              <a:t>2/9/2021</a:t>
+              <a:t>2/14/2021</a:t>
             </a:fld>
             <a:endParaRPr lang="en-US"/>
           </a:p>
@@ -2746,7 +2746,7 @@
           <a:p>
             <a:fld id="{6A2D1428-0459-4F75-829F-043936AE8C9E}" type="datetimeFigureOut">
               <a:rPr lang="en-US" smtClean="0"/>
-              <a:t>2/9/2021</a:t>
+              <a:t>2/14/2021</a:t>
             </a:fld>
             <a:endParaRPr lang="en-US"/>
           </a:p>
@@ -2989,7 +2989,7 @@
           <a:p>
             <a:fld id="{6A2D1428-0459-4F75-829F-043936AE8C9E}" type="datetimeFigureOut">
               <a:rPr lang="en-US" smtClean="0"/>
-              <a:t>2/9/2021</a:t>
+              <a:t>2/14/2021</a:t>
             </a:fld>
             <a:endParaRPr lang="en-US"/>
           </a:p>
@@ -5947,10 +5947,10 @@
                     <a:lstStyle/>
                     <a:p>
                       <a:r>
-                        <a:rPr lang="en-US"/>
+                        <a:rPr lang="en-US" dirty="0"/>
                         <a:t>id3</a:t>
                       </a:r>
-                      <a:endParaRPr lang="ru-RU"/>
+                      <a:endParaRPr lang="ru-RU" dirty="0"/>
                     </a:p>
                   </a:txBody>
                   <a:tcPr/>
@@ -5968,6 +5968,104 @@
                 <a:extLst>
                   <a:ext uri="{0D108BD9-81ED-4DB2-BD59-A6C34878D82A}">
                     <a16:rowId xmlns:a16="http://schemas.microsoft.com/office/drawing/2014/main" val="2163625966"/>
+                  </a:ext>
+                </a:extLst>
+              </a:tr>
+            </a:tbl>
+          </a:graphicData>
+        </a:graphic>
+      </p:graphicFrame>
+      <p:graphicFrame>
+        <p:nvGraphicFramePr>
+          <p:cNvPr id="6" name="Table 6">
+            <a:extLst>
+              <a:ext uri="{FF2B5EF4-FFF2-40B4-BE49-F238E27FC236}">
+                <a16:creationId xmlns:a16="http://schemas.microsoft.com/office/drawing/2014/main" id="{3359D70F-E104-4B2F-A539-6ABE5956B196}"/>
+              </a:ext>
+            </a:extLst>
+          </p:cNvPr>
+          <p:cNvGraphicFramePr>
+            <a:graphicFrameLocks noGrp="1"/>
+          </p:cNvGraphicFramePr>
+          <p:nvPr>
+            <p:extLst>
+              <p:ext uri="{D42A27DB-BD31-4B8C-83A1-F6EECF244321}">
+                <p14:modId xmlns:p14="http://schemas.microsoft.com/office/powerpoint/2010/main" val="1769434869"/>
+              </p:ext>
+            </p:extLst>
+          </p:nvPr>
+        </p:nvGraphicFramePr>
+        <p:xfrm>
+          <a:off x="273539" y="3892712"/>
+          <a:ext cx="8127999" cy="370840"/>
+        </p:xfrm>
+        <a:graphic>
+          <a:graphicData uri="http://schemas.openxmlformats.org/drawingml/2006/table">
+            <a:tbl>
+              <a:tblPr firstRow="1" bandRow="1">
+                <a:tableStyleId>{93296810-A885-4BE3-A3E7-6D5BEEA58F35}</a:tableStyleId>
+              </a:tblPr>
+              <a:tblGrid>
+                <a:gridCol w="2709333">
+                  <a:extLst>
+                    <a:ext uri="{9D8B030D-6E8A-4147-A177-3AD203B41FA5}">
+                      <a16:colId xmlns:a16="http://schemas.microsoft.com/office/drawing/2014/main" val="3598523350"/>
+                    </a:ext>
+                  </a:extLst>
+                </a:gridCol>
+                <a:gridCol w="2709333">
+                  <a:extLst>
+                    <a:ext uri="{9D8B030D-6E8A-4147-A177-3AD203B41FA5}">
+                      <a16:colId xmlns:a16="http://schemas.microsoft.com/office/drawing/2014/main" val="1840150110"/>
+                    </a:ext>
+                  </a:extLst>
+                </a:gridCol>
+                <a:gridCol w="2709333">
+                  <a:extLst>
+                    <a:ext uri="{9D8B030D-6E8A-4147-A177-3AD203B41FA5}">
+                      <a16:colId xmlns:a16="http://schemas.microsoft.com/office/drawing/2014/main" val="1629514209"/>
+                    </a:ext>
+                  </a:extLst>
+                </a:gridCol>
+              </a:tblGrid>
+              <a:tr h="370840">
+                <a:tc>
+                  <a:txBody>
+                    <a:bodyPr/>
+                    <a:lstStyle/>
+                    <a:p>
+                      <a:r>
+                        <a:rPr lang="en-US"/>
+                        <a:t>id6</a:t>
+                      </a:r>
+                      <a:endParaRPr lang="ru-RU"/>
+                    </a:p>
+                  </a:txBody>
+                  <a:tcPr/>
+                </a:tc>
+                <a:tc>
+                  <a:txBody>
+                    <a:bodyPr/>
+                    <a:lstStyle/>
+                    <a:p>
+                      <a:endParaRPr lang="ru-RU"/>
+                    </a:p>
+                  </a:txBody>
+                  <a:tcPr/>
+                </a:tc>
+                <a:tc>
+                  <a:txBody>
+                    <a:bodyPr/>
+                    <a:lstStyle/>
+                    <a:p>
+                      <a:endParaRPr lang="ru-RU" dirty="0"/>
+                    </a:p>
+                  </a:txBody>
+                  <a:tcPr/>
+                </a:tc>
+                <a:extLst>
+                  <a:ext uri="{0D108BD9-81ED-4DB2-BD59-A6C34878D82A}">
+                    <a16:rowId xmlns:a16="http://schemas.microsoft.com/office/drawing/2014/main" val="2134271287"/>
                   </a:ext>
                 </a:extLst>
               </a:tr>

</xml_diff>

<commit_message>
Refactor placeholder parser (#113)
</commit_message>
<xml_diff>
--- a/ShapeCrawler.Tests.Unit/Resource/001.pptx
+++ b/ShapeCrawler.Tests.Unit/Resource/001.pptx
@@ -9,6 +9,7 @@
     <p:sldId id="257" r:id="rId3"/>
     <p:sldId id="258" r:id="rId4"/>
     <p:sldId id="259" r:id="rId5"/>
+    <p:sldId id="260" r:id="rId6"/>
   </p:sldIdLst>
   <p:sldSz cx="12192000" cy="6858000"/>
   <p:notesSz cx="6858000" cy="9144000"/>
@@ -264,7 +265,7 @@
           <a:p>
             <a:fld id="{6A2D1428-0459-4F75-829F-043936AE8C9E}" type="datetimeFigureOut">
               <a:rPr lang="en-US" smtClean="0"/>
-              <a:t>2/16/2021</a:t>
+              <a:t>2/25/2021</a:t>
             </a:fld>
             <a:endParaRPr lang="en-US"/>
           </a:p>
@@ -377,6 +378,46 @@
               <a:t>Placeholder</a:t>
             </a:r>
             <a:endParaRPr lang="ru-RU" dirty="0"/>
+          </a:p>
+        </p:txBody>
+      </p:sp>
+      <p:sp>
+        <p:nvSpPr>
+          <p:cNvPr id="13" name="Text Placeholder 12">
+            <a:extLst>
+              <a:ext uri="{FF2B5EF4-FFF2-40B4-BE49-F238E27FC236}">
+                <a16:creationId xmlns:a16="http://schemas.microsoft.com/office/drawing/2014/main" id="{CE183CDF-36D3-4766-AC41-099C9C7B32F2}"/>
+              </a:ext>
+            </a:extLst>
+          </p:cNvPr>
+          <p:cNvSpPr>
+            <a:spLocks noGrp="1"/>
+          </p:cNvSpPr>
+          <p:nvPr>
+            <p:ph type="body" sz="quarter" idx="14" hasCustomPrompt="1"/>
+          </p:nvPr>
+        </p:nvSpPr>
+        <p:spPr>
+          <a:xfrm>
+            <a:off x="1524000" y="5438775"/>
+            <a:ext cx="4114800" cy="560388"/>
+          </a:xfrm>
+        </p:spPr>
+        <p:txBody>
+          <a:bodyPr/>
+          <a:lstStyle>
+            <a:lvl1pPr>
+              <a:defRPr>
+                <a:latin typeface="+mj-lt"/>
+              </a:defRPr>
+            </a:lvl1pPr>
+          </a:lstStyle>
+          <a:p>
+            <a:pPr lvl="0"/>
+            <a:r>
+              <a:rPr lang="en-US" dirty="0"/>
+              <a:t>Placeholder #2</a:t>
+            </a:r>
           </a:p>
         </p:txBody>
       </p:sp>
@@ -520,7 +561,7 @@
           <a:p>
             <a:fld id="{6A2D1428-0459-4F75-829F-043936AE8C9E}" type="datetimeFigureOut">
               <a:rPr lang="en-US" smtClean="0"/>
-              <a:t>2/16/2021</a:t>
+              <a:t>2/25/2021</a:t>
             </a:fld>
             <a:endParaRPr lang="en-US"/>
           </a:p>
@@ -730,7 +771,7 @@
           <a:p>
             <a:fld id="{6A2D1428-0459-4F75-829F-043936AE8C9E}" type="datetimeFigureOut">
               <a:rPr lang="en-US" smtClean="0"/>
-              <a:t>2/16/2021</a:t>
+              <a:t>2/25/2021</a:t>
             </a:fld>
             <a:endParaRPr lang="en-US"/>
           </a:p>
@@ -930,7 +971,7 @@
           <a:p>
             <a:fld id="{6A2D1428-0459-4F75-829F-043936AE8C9E}" type="datetimeFigureOut">
               <a:rPr lang="en-US" smtClean="0"/>
-              <a:t>2/16/2021</a:t>
+              <a:t>2/25/2021</a:t>
             </a:fld>
             <a:endParaRPr lang="en-US"/>
           </a:p>
@@ -1206,7 +1247,7 @@
           <a:p>
             <a:fld id="{6A2D1428-0459-4F75-829F-043936AE8C9E}" type="datetimeFigureOut">
               <a:rPr lang="en-US" smtClean="0"/>
-              <a:t>2/16/2021</a:t>
+              <a:t>2/25/2021</a:t>
             </a:fld>
             <a:endParaRPr lang="en-US"/>
           </a:p>
@@ -1474,7 +1515,7 @@
           <a:p>
             <a:fld id="{6A2D1428-0459-4F75-829F-043936AE8C9E}" type="datetimeFigureOut">
               <a:rPr lang="en-US" smtClean="0"/>
-              <a:t>2/16/2021</a:t>
+              <a:t>2/25/2021</a:t>
             </a:fld>
             <a:endParaRPr lang="en-US"/>
           </a:p>
@@ -1889,7 +1930,7 @@
           <a:p>
             <a:fld id="{6A2D1428-0459-4F75-829F-043936AE8C9E}" type="datetimeFigureOut">
               <a:rPr lang="en-US" smtClean="0"/>
-              <a:t>2/16/2021</a:t>
+              <a:t>2/25/2021</a:t>
             </a:fld>
             <a:endParaRPr lang="en-US"/>
           </a:p>
@@ -2031,7 +2072,7 @@
           <a:p>
             <a:fld id="{6A2D1428-0459-4F75-829F-043936AE8C9E}" type="datetimeFigureOut">
               <a:rPr lang="en-US" smtClean="0"/>
-              <a:t>2/16/2021</a:t>
+              <a:t>2/25/2021</a:t>
             </a:fld>
             <a:endParaRPr lang="en-US"/>
           </a:p>
@@ -2144,7 +2185,7 @@
           <a:p>
             <a:fld id="{6A2D1428-0459-4F75-829F-043936AE8C9E}" type="datetimeFigureOut">
               <a:rPr lang="en-US" smtClean="0"/>
-              <a:t>2/16/2021</a:t>
+              <a:t>2/25/2021</a:t>
             </a:fld>
             <a:endParaRPr lang="en-US"/>
           </a:p>
@@ -2457,7 +2498,7 @@
           <a:p>
             <a:fld id="{6A2D1428-0459-4F75-829F-043936AE8C9E}" type="datetimeFigureOut">
               <a:rPr lang="en-US" smtClean="0"/>
-              <a:t>2/16/2021</a:t>
+              <a:t>2/25/2021</a:t>
             </a:fld>
             <a:endParaRPr lang="en-US"/>
           </a:p>
@@ -2746,7 +2787,7 @@
           <a:p>
             <a:fld id="{6A2D1428-0459-4F75-829F-043936AE8C9E}" type="datetimeFigureOut">
               <a:rPr lang="en-US" smtClean="0"/>
-              <a:t>2/16/2021</a:t>
+              <a:t>2/25/2021</a:t>
             </a:fld>
             <a:endParaRPr lang="en-US"/>
           </a:p>
@@ -2989,7 +3030,7 @@
           <a:p>
             <a:fld id="{6A2D1428-0459-4F75-829F-043936AE8C9E}" type="datetimeFigureOut">
               <a:rPr lang="en-US" smtClean="0"/>
-              <a:t>2/16/2021</a:t>
+              <a:t>2/25/2021</a:t>
             </a:fld>
             <a:endParaRPr lang="en-US"/>
           </a:p>
@@ -4087,7 +4128,7 @@
           <a:bodyPr/>
           <a:lstStyle/>
           <a:p>
-            <a:endParaRPr lang="en-US"/>
+            <a:endParaRPr lang="en-US" dirty="0"/>
           </a:p>
         </p:txBody>
       </p:sp>
@@ -4339,6 +4380,59 @@
             <a:endParaRPr lang="ru-RU" sz="1400" b="1" dirty="0">
               <a:latin typeface="Times New Roman" panose="02020603050405020304" pitchFamily="18" charset="0"/>
               <a:cs typeface="Times New Roman" panose="02020603050405020304" pitchFamily="18" charset="0"/>
+            </a:endParaRPr>
+          </a:p>
+        </p:txBody>
+      </p:sp>
+      <p:sp>
+        <p:nvSpPr>
+          <p:cNvPr id="7" name="TextBox 6">
+            <a:extLst>
+              <a:ext uri="{FF2B5EF4-FFF2-40B4-BE49-F238E27FC236}">
+                <a16:creationId xmlns:a16="http://schemas.microsoft.com/office/drawing/2014/main" id="{06885644-2580-4CE9-802F-319D43E85477}"/>
+              </a:ext>
+            </a:extLst>
+          </p:cNvPr>
+          <p:cNvSpPr txBox="1"/>
+          <p:nvPr/>
+        </p:nvSpPr>
+        <p:spPr>
+          <a:xfrm>
+            <a:off x="3157415" y="4947138"/>
+            <a:ext cx="1281723" cy="369332"/>
+          </a:xfrm>
+          <a:prstGeom prst="rect">
+            <a:avLst/>
+          </a:prstGeom>
+        </p:spPr>
+        <p:style>
+          <a:lnRef idx="2">
+            <a:schemeClr val="accent5"/>
+          </a:lnRef>
+          <a:fillRef idx="1">
+            <a:schemeClr val="lt1"/>
+          </a:fillRef>
+          <a:effectRef idx="0">
+            <a:schemeClr val="accent5"/>
+          </a:effectRef>
+          <a:fontRef idx="minor">
+            <a:schemeClr val="dk1"/>
+          </a:fontRef>
+        </p:style>
+        <p:txBody>
+          <a:bodyPr wrap="square" rtlCol="0">
+            <a:spAutoFit/>
+          </a:bodyPr>
+          <a:lstStyle/>
+          <a:p>
+            <a:r>
+              <a:rPr lang="en-US" dirty="0">
+                <a:latin typeface="+mj-lt"/>
+              </a:rPr>
+              <a:t>id7</a:t>
+            </a:r>
+            <a:endParaRPr lang="ru-RU" dirty="0">
+              <a:latin typeface="+mj-lt"/>
             </a:endParaRPr>
           </a:p>
         </p:txBody>
@@ -6089,6 +6183,144 @@
     <p:extLst>
       <p:ext uri="{BB962C8B-B14F-4D97-AF65-F5344CB8AC3E}">
         <p14:creationId xmlns:p14="http://schemas.microsoft.com/office/powerpoint/2010/main" val="3684663255"/>
+      </p:ext>
+    </p:extLst>
+  </p:cSld>
+  <p:clrMapOvr>
+    <a:masterClrMapping/>
+  </p:clrMapOvr>
+</p:sld>
+</file>
+
+<file path=ppt/slides/slide5.xml><?xml version="1.0" encoding="utf-8"?>
+<p:sld xmlns:a="http://schemas.openxmlformats.org/drawingml/2006/main" xmlns:r="http://schemas.openxmlformats.org/officeDocument/2006/relationships" xmlns:p="http://schemas.openxmlformats.org/presentationml/2006/main">
+  <p:cSld>
+    <p:spTree>
+      <p:nvGrpSpPr>
+        <p:cNvPr id="1" name=""/>
+        <p:cNvGrpSpPr/>
+        <p:nvPr/>
+      </p:nvGrpSpPr>
+      <p:grpSpPr>
+        <a:xfrm>
+          <a:off x="0" y="0"/>
+          <a:ext cx="0" cy="0"/>
+          <a:chOff x="0" y="0"/>
+          <a:chExt cx="0" cy="0"/>
+        </a:xfrm>
+      </p:grpSpPr>
+      <p:sp>
+        <p:nvSpPr>
+          <p:cNvPr id="2" name="Title 1">
+            <a:extLst>
+              <a:ext uri="{FF2B5EF4-FFF2-40B4-BE49-F238E27FC236}">
+                <a16:creationId xmlns:a16="http://schemas.microsoft.com/office/drawing/2014/main" id="{EDA5BDD2-B835-4E25-919D-66702BAD893F}"/>
+              </a:ext>
+            </a:extLst>
+          </p:cNvPr>
+          <p:cNvSpPr>
+            <a:spLocks noGrp="1"/>
+          </p:cNvSpPr>
+          <p:nvPr>
+            <p:ph type="ctrTitle"/>
+          </p:nvPr>
+        </p:nvSpPr>
+        <p:spPr/>
+        <p:txBody>
+          <a:bodyPr/>
+          <a:lstStyle/>
+          <a:p>
+            <a:endParaRPr lang="ru-RU"/>
+          </a:p>
+        </p:txBody>
+      </p:sp>
+      <p:sp>
+        <p:nvSpPr>
+          <p:cNvPr id="3" name="Subtitle 2">
+            <a:extLst>
+              <a:ext uri="{FF2B5EF4-FFF2-40B4-BE49-F238E27FC236}">
+                <a16:creationId xmlns:a16="http://schemas.microsoft.com/office/drawing/2014/main" id="{C3F7681A-7145-4B7B-A82D-14B2BDDB2C74}"/>
+              </a:ext>
+            </a:extLst>
+          </p:cNvPr>
+          <p:cNvSpPr>
+            <a:spLocks noGrp="1"/>
+          </p:cNvSpPr>
+          <p:nvPr>
+            <p:ph type="subTitle" idx="1"/>
+          </p:nvPr>
+        </p:nvSpPr>
+        <p:spPr/>
+        <p:txBody>
+          <a:bodyPr/>
+          <a:lstStyle/>
+          <a:p>
+            <a:endParaRPr lang="ru-RU"/>
+          </a:p>
+        </p:txBody>
+      </p:sp>
+      <p:sp>
+        <p:nvSpPr>
+          <p:cNvPr id="4" name="Text Placeholder 3">
+            <a:extLst>
+              <a:ext uri="{FF2B5EF4-FFF2-40B4-BE49-F238E27FC236}">
+                <a16:creationId xmlns:a16="http://schemas.microsoft.com/office/drawing/2014/main" id="{29E4F5A7-1BEA-4377-B8C5-DA4BAE53A391}"/>
+              </a:ext>
+            </a:extLst>
+          </p:cNvPr>
+          <p:cNvSpPr>
+            <a:spLocks noGrp="1"/>
+          </p:cNvSpPr>
+          <p:nvPr>
+            <p:ph type="body" sz="quarter" idx="13"/>
+          </p:nvPr>
+        </p:nvSpPr>
+        <p:spPr/>
+        <p:txBody>
+          <a:bodyPr/>
+          <a:lstStyle/>
+          <a:p>
+            <a:endParaRPr lang="ru-RU"/>
+          </a:p>
+        </p:txBody>
+      </p:sp>
+      <p:sp>
+        <p:nvSpPr>
+          <p:cNvPr id="5" name="Text Placeholder 4">
+            <a:extLst>
+              <a:ext uri="{FF2B5EF4-FFF2-40B4-BE49-F238E27FC236}">
+                <a16:creationId xmlns:a16="http://schemas.microsoft.com/office/drawing/2014/main" id="{CDC0E6AB-ECE0-4353-9D6B-E628F218C72D}"/>
+              </a:ext>
+            </a:extLst>
+          </p:cNvPr>
+          <p:cNvSpPr>
+            <a:spLocks noGrp="1"/>
+          </p:cNvSpPr>
+          <p:nvPr>
+            <p:ph type="body" sz="quarter" idx="14"/>
+          </p:nvPr>
+        </p:nvSpPr>
+        <p:spPr/>
+        <p:txBody>
+          <a:bodyPr/>
+          <a:lstStyle/>
+          <a:p>
+            <a:r>
+              <a:rPr lang="en-US"/>
+              <a:t>Id5_</a:t>
+            </a:r>
+            <a:r>
+              <a:rPr lang="en-US" dirty="0" err="1"/>
+              <a:t>placeholder</a:t>
+            </a:r>
+            <a:endParaRPr lang="ru-RU" dirty="0"/>
+          </a:p>
+        </p:txBody>
+      </p:sp>
+    </p:spTree>
+    <p:extLst>
+      <p:ext uri="{BB962C8B-B14F-4D97-AF65-F5344CB8AC3E}">
+        <p14:creationId xmlns:p14="http://schemas.microsoft.com/office/powerpoint/2010/main" val="2839432172"/>
       </p:ext>
     </p:extLst>
   </p:cSld>

</xml_diff>

<commit_message>
Add test for ThrowIfRemoved() (#132)
</commit_message>
<xml_diff>
--- a/ShapeCrawler.Tests.Unit/Resource/001.pptx
+++ b/ShapeCrawler.Tests.Unit/Resource/001.pptx
@@ -265,7 +265,7 @@
           <a:p>
             <a:fld id="{6A2D1428-0459-4F75-829F-043936AE8C9E}" type="datetimeFigureOut">
               <a:rPr lang="en-US" smtClean="0"/>
-              <a:t>2/25/2021</a:t>
+              <a:t>4/26/2021</a:t>
             </a:fld>
             <a:endParaRPr lang="en-US"/>
           </a:p>
@@ -561,7 +561,7 @@
           <a:p>
             <a:fld id="{6A2D1428-0459-4F75-829F-043936AE8C9E}" type="datetimeFigureOut">
               <a:rPr lang="en-US" smtClean="0"/>
-              <a:t>2/25/2021</a:t>
+              <a:t>4/26/2021</a:t>
             </a:fld>
             <a:endParaRPr lang="en-US"/>
           </a:p>
@@ -771,7 +771,7 @@
           <a:p>
             <a:fld id="{6A2D1428-0459-4F75-829F-043936AE8C9E}" type="datetimeFigureOut">
               <a:rPr lang="en-US" smtClean="0"/>
-              <a:t>2/25/2021</a:t>
+              <a:t>4/26/2021</a:t>
             </a:fld>
             <a:endParaRPr lang="en-US"/>
           </a:p>
@@ -971,7 +971,7 @@
           <a:p>
             <a:fld id="{6A2D1428-0459-4F75-829F-043936AE8C9E}" type="datetimeFigureOut">
               <a:rPr lang="en-US" smtClean="0"/>
-              <a:t>2/25/2021</a:t>
+              <a:t>4/26/2021</a:t>
             </a:fld>
             <a:endParaRPr lang="en-US"/>
           </a:p>
@@ -1247,7 +1247,7 @@
           <a:p>
             <a:fld id="{6A2D1428-0459-4F75-829F-043936AE8C9E}" type="datetimeFigureOut">
               <a:rPr lang="en-US" smtClean="0"/>
-              <a:t>2/25/2021</a:t>
+              <a:t>4/26/2021</a:t>
             </a:fld>
             <a:endParaRPr lang="en-US"/>
           </a:p>
@@ -1515,7 +1515,7 @@
           <a:p>
             <a:fld id="{6A2D1428-0459-4F75-829F-043936AE8C9E}" type="datetimeFigureOut">
               <a:rPr lang="en-US" smtClean="0"/>
-              <a:t>2/25/2021</a:t>
+              <a:t>4/26/2021</a:t>
             </a:fld>
             <a:endParaRPr lang="en-US"/>
           </a:p>
@@ -1930,7 +1930,7 @@
           <a:p>
             <a:fld id="{6A2D1428-0459-4F75-829F-043936AE8C9E}" type="datetimeFigureOut">
               <a:rPr lang="en-US" smtClean="0"/>
-              <a:t>2/25/2021</a:t>
+              <a:t>4/26/2021</a:t>
             </a:fld>
             <a:endParaRPr lang="en-US"/>
           </a:p>
@@ -2072,7 +2072,7 @@
           <a:p>
             <a:fld id="{6A2D1428-0459-4F75-829F-043936AE8C9E}" type="datetimeFigureOut">
               <a:rPr lang="en-US" smtClean="0"/>
-              <a:t>2/25/2021</a:t>
+              <a:t>4/26/2021</a:t>
             </a:fld>
             <a:endParaRPr lang="en-US"/>
           </a:p>
@@ -2185,7 +2185,7 @@
           <a:p>
             <a:fld id="{6A2D1428-0459-4F75-829F-043936AE8C9E}" type="datetimeFigureOut">
               <a:rPr lang="en-US" smtClean="0"/>
-              <a:t>2/25/2021</a:t>
+              <a:t>4/26/2021</a:t>
             </a:fld>
             <a:endParaRPr lang="en-US"/>
           </a:p>
@@ -2498,7 +2498,7 @@
           <a:p>
             <a:fld id="{6A2D1428-0459-4F75-829F-043936AE8C9E}" type="datetimeFigureOut">
               <a:rPr lang="en-US" smtClean="0"/>
-              <a:t>2/25/2021</a:t>
+              <a:t>4/26/2021</a:t>
             </a:fld>
             <a:endParaRPr lang="en-US"/>
           </a:p>
@@ -2787,7 +2787,7 @@
           <a:p>
             <a:fld id="{6A2D1428-0459-4F75-829F-043936AE8C9E}" type="datetimeFigureOut">
               <a:rPr lang="en-US" smtClean="0"/>
-              <a:t>2/25/2021</a:t>
+              <a:t>4/26/2021</a:t>
             </a:fld>
             <a:endParaRPr lang="en-US"/>
           </a:p>
@@ -3030,7 +3030,7 @@
           <a:p>
             <a:fld id="{6A2D1428-0459-4F75-829F-043936AE8C9E}" type="datetimeFigureOut">
               <a:rPr lang="en-US" smtClean="0"/>
-              <a:t>2/25/2021</a:t>
+              <a:t>4/26/2021</a:t>
             </a:fld>
             <a:endParaRPr lang="en-US"/>
           </a:p>
@@ -4128,6 +4128,10 @@
           <a:bodyPr/>
           <a:lstStyle/>
           <a:p>
+            <a:r>
+              <a:rPr lang="en-US"/>
+              <a:t>Id2_titlePh</a:t>
+            </a:r>
             <a:endParaRPr lang="en-US" dirty="0"/>
           </a:p>
         </p:txBody>

</xml_diff>

<commit_message>
Add tests for ColorFormat (#133)
</commit_message>
<xml_diff>
--- a/ShapeCrawler.Tests.Unit/Resource/001.pptx
+++ b/ShapeCrawler.Tests.Unit/Resource/001.pptx
@@ -265,7 +265,7 @@
           <a:p>
             <a:fld id="{6A2D1428-0459-4F75-829F-043936AE8C9E}" type="datetimeFigureOut">
               <a:rPr lang="en-US" smtClean="0"/>
-              <a:t>4/26/2021</a:t>
+              <a:t>5/4/2021</a:t>
             </a:fld>
             <a:endParaRPr lang="en-US"/>
           </a:p>
@@ -561,7 +561,7 @@
           <a:p>
             <a:fld id="{6A2D1428-0459-4F75-829F-043936AE8C9E}" type="datetimeFigureOut">
               <a:rPr lang="en-US" smtClean="0"/>
-              <a:t>4/26/2021</a:t>
+              <a:t>5/4/2021</a:t>
             </a:fld>
             <a:endParaRPr lang="en-US"/>
           </a:p>
@@ -771,7 +771,7 @@
           <a:p>
             <a:fld id="{6A2D1428-0459-4F75-829F-043936AE8C9E}" type="datetimeFigureOut">
               <a:rPr lang="en-US" smtClean="0"/>
-              <a:t>4/26/2021</a:t>
+              <a:t>5/4/2021</a:t>
             </a:fld>
             <a:endParaRPr lang="en-US"/>
           </a:p>
@@ -971,7 +971,7 @@
           <a:p>
             <a:fld id="{6A2D1428-0459-4F75-829F-043936AE8C9E}" type="datetimeFigureOut">
               <a:rPr lang="en-US" smtClean="0"/>
-              <a:t>4/26/2021</a:t>
+              <a:t>5/4/2021</a:t>
             </a:fld>
             <a:endParaRPr lang="en-US"/>
           </a:p>
@@ -1247,7 +1247,7 @@
           <a:p>
             <a:fld id="{6A2D1428-0459-4F75-829F-043936AE8C9E}" type="datetimeFigureOut">
               <a:rPr lang="en-US" smtClean="0"/>
-              <a:t>4/26/2021</a:t>
+              <a:t>5/4/2021</a:t>
             </a:fld>
             <a:endParaRPr lang="en-US"/>
           </a:p>
@@ -1515,7 +1515,7 @@
           <a:p>
             <a:fld id="{6A2D1428-0459-4F75-829F-043936AE8C9E}" type="datetimeFigureOut">
               <a:rPr lang="en-US" smtClean="0"/>
-              <a:t>4/26/2021</a:t>
+              <a:t>5/4/2021</a:t>
             </a:fld>
             <a:endParaRPr lang="en-US"/>
           </a:p>
@@ -1930,7 +1930,7 @@
           <a:p>
             <a:fld id="{6A2D1428-0459-4F75-829F-043936AE8C9E}" type="datetimeFigureOut">
               <a:rPr lang="en-US" smtClean="0"/>
-              <a:t>4/26/2021</a:t>
+              <a:t>5/4/2021</a:t>
             </a:fld>
             <a:endParaRPr lang="en-US"/>
           </a:p>
@@ -2072,7 +2072,7 @@
           <a:p>
             <a:fld id="{6A2D1428-0459-4F75-829F-043936AE8C9E}" type="datetimeFigureOut">
               <a:rPr lang="en-US" smtClean="0"/>
-              <a:t>4/26/2021</a:t>
+              <a:t>5/4/2021</a:t>
             </a:fld>
             <a:endParaRPr lang="en-US"/>
           </a:p>
@@ -2185,7 +2185,7 @@
           <a:p>
             <a:fld id="{6A2D1428-0459-4F75-829F-043936AE8C9E}" type="datetimeFigureOut">
               <a:rPr lang="en-US" smtClean="0"/>
-              <a:t>4/26/2021</a:t>
+              <a:t>5/4/2021</a:t>
             </a:fld>
             <a:endParaRPr lang="en-US"/>
           </a:p>
@@ -2498,7 +2498,7 @@
           <a:p>
             <a:fld id="{6A2D1428-0459-4F75-829F-043936AE8C9E}" type="datetimeFigureOut">
               <a:rPr lang="en-US" smtClean="0"/>
-              <a:t>4/26/2021</a:t>
+              <a:t>5/4/2021</a:t>
             </a:fld>
             <a:endParaRPr lang="en-US"/>
           </a:p>
@@ -2787,7 +2787,7 @@
           <a:p>
             <a:fld id="{6A2D1428-0459-4F75-829F-043936AE8C9E}" type="datetimeFigureOut">
               <a:rPr lang="en-US" smtClean="0"/>
-              <a:t>4/26/2021</a:t>
+              <a:t>5/4/2021</a:t>
             </a:fld>
             <a:endParaRPr lang="en-US"/>
           </a:p>
@@ -3030,7 +3030,7 @@
           <a:p>
             <a:fld id="{6A2D1428-0459-4F75-829F-043936AE8C9E}" type="datetimeFigureOut">
               <a:rPr lang="en-US" smtClean="0"/>
-              <a:t>4/26/2021</a:t>
+              <a:t>5/4/2021</a:t>
             </a:fld>
             <a:endParaRPr lang="en-US"/>
           </a:p>
@@ -4512,7 +4512,7 @@
             <p:ph idx="1"/>
             <p:extLst>
               <p:ext uri="{D42A27DB-BD31-4B8C-83A1-F6EECF244321}">
-                <p14:modId xmlns:p14="http://schemas.microsoft.com/office/powerpoint/2010/main" val="2420701430"/>
+                <p14:modId xmlns:p14="http://schemas.microsoft.com/office/powerpoint/2010/main" val="3454805879"/>
               </p:ext>
             </p:extLst>
           </p:nvPr>
@@ -4557,10 +4557,18 @@
                     <a:lstStyle/>
                     <a:p>
                       <a:r>
-                        <a:rPr lang="en-US" dirty="0"/>
+                        <a:rPr lang="en-US" dirty="0">
+                          <a:solidFill>
+                            <a:srgbClr val="FF0000"/>
+                          </a:solidFill>
+                        </a:rPr>
                         <a:t>Id4</a:t>
                       </a:r>
-                      <a:endParaRPr lang="ru-RU" dirty="0"/>
+                      <a:endParaRPr lang="ru-RU" dirty="0">
+                        <a:solidFill>
+                          <a:srgbClr val="FF0000"/>
+                        </a:solidFill>
+                      </a:endParaRPr>
                     </a:p>
                   </a:txBody>
                   <a:tcPr/>

</xml_diff>

<commit_message>
SC-156: Add unit test
</commit_message>
<xml_diff>
--- a/ShapeCrawler.Tests.Unit/Resource/001.pptx
+++ b/ShapeCrawler.Tests.Unit/Resource/001.pptx
@@ -4,6 +4,9 @@
   <p:sldMasterIdLst>
     <p:sldMasterId id="2147483648" r:id="rId1"/>
   </p:sldMasterIdLst>
+  <p:notesMasterIdLst>
+    <p:notesMasterId r:id="rId7"/>
+  </p:notesMasterIdLst>
   <p:sldIdLst>
     <p:sldId id="256" r:id="rId2"/>
     <p:sldId id="257" r:id="rId3"/>
@@ -116,6 +119,442 @@
 </p:presentation>
 </file>
 
+<file path=ppt/notesMasters/notesMaster1.xml><?xml version="1.0" encoding="utf-8"?>
+<p:notesMaster xmlns:a="http://schemas.openxmlformats.org/drawingml/2006/main" xmlns:r="http://schemas.openxmlformats.org/officeDocument/2006/relationships" xmlns:p="http://schemas.openxmlformats.org/presentationml/2006/main">
+  <p:cSld>
+    <p:bg>
+      <p:bgRef idx="1001">
+        <a:schemeClr val="bg1"/>
+      </p:bgRef>
+    </p:bg>
+    <p:spTree>
+      <p:nvGrpSpPr>
+        <p:cNvPr id="1" name=""/>
+        <p:cNvGrpSpPr/>
+        <p:nvPr/>
+      </p:nvGrpSpPr>
+      <p:grpSpPr>
+        <a:xfrm>
+          <a:off x="0" y="0"/>
+          <a:ext cx="0" cy="0"/>
+          <a:chOff x="0" y="0"/>
+          <a:chExt cx="0" cy="0"/>
+        </a:xfrm>
+      </p:grpSpPr>
+      <p:sp>
+        <p:nvSpPr>
+          <p:cNvPr id="2" name="Header Placeholder 1"/>
+          <p:cNvSpPr>
+            <a:spLocks noGrp="1"/>
+          </p:cNvSpPr>
+          <p:nvPr>
+            <p:ph type="hdr" sz="quarter"/>
+          </p:nvPr>
+        </p:nvSpPr>
+        <p:spPr>
+          <a:xfrm>
+            <a:off x="0" y="0"/>
+            <a:ext cx="2971800" cy="458788"/>
+          </a:xfrm>
+          <a:prstGeom prst="rect">
+            <a:avLst/>
+          </a:prstGeom>
+        </p:spPr>
+        <p:txBody>
+          <a:bodyPr vert="horz" lIns="91440" tIns="45720" rIns="91440" bIns="45720" rtlCol="0"/>
+          <a:lstStyle>
+            <a:lvl1pPr algn="l">
+              <a:defRPr sz="1200"/>
+            </a:lvl1pPr>
+          </a:lstStyle>
+          <a:p>
+            <a:endParaRPr lang="en-US"/>
+          </a:p>
+        </p:txBody>
+      </p:sp>
+      <p:sp>
+        <p:nvSpPr>
+          <p:cNvPr id="3" name="Date Placeholder 2"/>
+          <p:cNvSpPr>
+            <a:spLocks noGrp="1"/>
+          </p:cNvSpPr>
+          <p:nvPr>
+            <p:ph type="dt" idx="1"/>
+          </p:nvPr>
+        </p:nvSpPr>
+        <p:spPr>
+          <a:xfrm>
+            <a:off x="3884613" y="0"/>
+            <a:ext cx="2971800" cy="458788"/>
+          </a:xfrm>
+          <a:prstGeom prst="rect">
+            <a:avLst/>
+          </a:prstGeom>
+        </p:spPr>
+        <p:txBody>
+          <a:bodyPr vert="horz" lIns="91440" tIns="45720" rIns="91440" bIns="45720" rtlCol="0"/>
+          <a:lstStyle>
+            <a:lvl1pPr algn="r">
+              <a:defRPr sz="1200"/>
+            </a:lvl1pPr>
+          </a:lstStyle>
+          <a:p>
+            <a:fld id="{12586301-C795-4E70-B468-514DB1C1B146}" type="datetimeFigureOut">
+              <a:rPr lang="en-US" smtClean="0"/>
+              <a:t>9/11/2021</a:t>
+            </a:fld>
+            <a:endParaRPr lang="en-US"/>
+          </a:p>
+        </p:txBody>
+      </p:sp>
+      <p:sp>
+        <p:nvSpPr>
+          <p:cNvPr id="4" name="Slide Image Placeholder 3"/>
+          <p:cNvSpPr>
+            <a:spLocks noGrp="1" noRot="1" noChangeAspect="1"/>
+          </p:cNvSpPr>
+          <p:nvPr>
+            <p:ph type="sldImg" idx="2"/>
+          </p:nvPr>
+        </p:nvSpPr>
+        <p:spPr>
+          <a:xfrm>
+            <a:off x="685800" y="1143000"/>
+            <a:ext cx="5486400" cy="3086100"/>
+          </a:xfrm>
+          <a:prstGeom prst="rect">
+            <a:avLst/>
+          </a:prstGeom>
+          <a:noFill/>
+          <a:ln w="12700">
+            <a:solidFill>
+              <a:prstClr val="black"/>
+            </a:solidFill>
+          </a:ln>
+        </p:spPr>
+        <p:txBody>
+          <a:bodyPr vert="horz" lIns="91440" tIns="45720" rIns="91440" bIns="45720" rtlCol="0" anchor="ctr"/>
+          <a:lstStyle/>
+          <a:p>
+            <a:endParaRPr lang="en-US"/>
+          </a:p>
+        </p:txBody>
+      </p:sp>
+      <p:sp>
+        <p:nvSpPr>
+          <p:cNvPr id="5" name="Notes Placeholder 4"/>
+          <p:cNvSpPr>
+            <a:spLocks noGrp="1"/>
+          </p:cNvSpPr>
+          <p:nvPr>
+            <p:ph type="body" sz="quarter" idx="3"/>
+          </p:nvPr>
+        </p:nvSpPr>
+        <p:spPr>
+          <a:xfrm>
+            <a:off x="685800" y="4400550"/>
+            <a:ext cx="5486400" cy="3600450"/>
+          </a:xfrm>
+          <a:prstGeom prst="rect">
+            <a:avLst/>
+          </a:prstGeom>
+        </p:spPr>
+        <p:txBody>
+          <a:bodyPr vert="horz" lIns="91440" tIns="45720" rIns="91440" bIns="45720" rtlCol="0"/>
+          <a:lstStyle/>
+          <a:p>
+            <a:pPr lvl="0"/>
+            <a:r>
+              <a:rPr lang="en-US"/>
+              <a:t>Click to edit Master text styles</a:t>
+            </a:r>
+          </a:p>
+          <a:p>
+            <a:pPr lvl="1"/>
+            <a:r>
+              <a:rPr lang="en-US"/>
+              <a:t>Second level</a:t>
+            </a:r>
+          </a:p>
+          <a:p>
+            <a:pPr lvl="2"/>
+            <a:r>
+              <a:rPr lang="en-US"/>
+              <a:t>Third level</a:t>
+            </a:r>
+          </a:p>
+          <a:p>
+            <a:pPr lvl="3"/>
+            <a:r>
+              <a:rPr lang="en-US"/>
+              <a:t>Fourth level</a:t>
+            </a:r>
+          </a:p>
+          <a:p>
+            <a:pPr lvl="4"/>
+            <a:r>
+              <a:rPr lang="en-US"/>
+              <a:t>Fifth level</a:t>
+            </a:r>
+          </a:p>
+        </p:txBody>
+      </p:sp>
+      <p:sp>
+        <p:nvSpPr>
+          <p:cNvPr id="6" name="Footer Placeholder 5"/>
+          <p:cNvSpPr>
+            <a:spLocks noGrp="1"/>
+          </p:cNvSpPr>
+          <p:nvPr>
+            <p:ph type="ftr" sz="quarter" idx="4"/>
+          </p:nvPr>
+        </p:nvSpPr>
+        <p:spPr>
+          <a:xfrm>
+            <a:off x="0" y="8685213"/>
+            <a:ext cx="2971800" cy="458787"/>
+          </a:xfrm>
+          <a:prstGeom prst="rect">
+            <a:avLst/>
+          </a:prstGeom>
+        </p:spPr>
+        <p:txBody>
+          <a:bodyPr vert="horz" lIns="91440" tIns="45720" rIns="91440" bIns="45720" rtlCol="0" anchor="b"/>
+          <a:lstStyle>
+            <a:lvl1pPr algn="l">
+              <a:defRPr sz="1200"/>
+            </a:lvl1pPr>
+          </a:lstStyle>
+          <a:p>
+            <a:endParaRPr lang="en-US"/>
+          </a:p>
+        </p:txBody>
+      </p:sp>
+      <p:sp>
+        <p:nvSpPr>
+          <p:cNvPr id="7" name="Slide Number Placeholder 6"/>
+          <p:cNvSpPr>
+            <a:spLocks noGrp="1"/>
+          </p:cNvSpPr>
+          <p:nvPr>
+            <p:ph type="sldNum" sz="quarter" idx="5"/>
+          </p:nvPr>
+        </p:nvSpPr>
+        <p:spPr>
+          <a:xfrm>
+            <a:off x="3884613" y="8685213"/>
+            <a:ext cx="2971800" cy="458787"/>
+          </a:xfrm>
+          <a:prstGeom prst="rect">
+            <a:avLst/>
+          </a:prstGeom>
+        </p:spPr>
+        <p:txBody>
+          <a:bodyPr vert="horz" lIns="91440" tIns="45720" rIns="91440" bIns="45720" rtlCol="0" anchor="b"/>
+          <a:lstStyle>
+            <a:lvl1pPr algn="r">
+              <a:defRPr sz="1200"/>
+            </a:lvl1pPr>
+          </a:lstStyle>
+          <a:p>
+            <a:fld id="{BC8E9BA4-601E-457E-9F74-8060180382E1}" type="slidenum">
+              <a:rPr lang="en-US" smtClean="0"/>
+              <a:t>‹#›</a:t>
+            </a:fld>
+            <a:endParaRPr lang="en-US"/>
+          </a:p>
+        </p:txBody>
+      </p:sp>
+    </p:spTree>
+    <p:extLst>
+      <p:ext uri="{BB962C8B-B14F-4D97-AF65-F5344CB8AC3E}">
+        <p14:creationId xmlns:p14="http://schemas.microsoft.com/office/powerpoint/2010/main" val="2800592083"/>
+      </p:ext>
+    </p:extLst>
+  </p:cSld>
+  <p:clrMap bg1="lt1" tx1="dk1" bg2="lt2" tx2="dk2" accent1="accent1" accent2="accent2" accent3="accent3" accent4="accent4" accent5="accent5" accent6="accent6" hlink="hlink" folHlink="folHlink"/>
+  <p:notesStyle>
+    <a:lvl1pPr marL="0" algn="l" defTabSz="914400" rtl="0" eaLnBrk="1" latinLnBrk="0" hangingPunct="1">
+      <a:defRPr sz="1200" kern="1200">
+        <a:solidFill>
+          <a:schemeClr val="tx1"/>
+        </a:solidFill>
+        <a:latin typeface="+mn-lt"/>
+        <a:ea typeface="+mn-ea"/>
+        <a:cs typeface="+mn-cs"/>
+      </a:defRPr>
+    </a:lvl1pPr>
+    <a:lvl2pPr marL="457200" algn="l" defTabSz="914400" rtl="0" eaLnBrk="1" latinLnBrk="0" hangingPunct="1">
+      <a:defRPr sz="1200" kern="1200">
+        <a:solidFill>
+          <a:schemeClr val="tx1"/>
+        </a:solidFill>
+        <a:latin typeface="+mn-lt"/>
+        <a:ea typeface="+mn-ea"/>
+        <a:cs typeface="+mn-cs"/>
+      </a:defRPr>
+    </a:lvl2pPr>
+    <a:lvl3pPr marL="914400" algn="l" defTabSz="914400" rtl="0" eaLnBrk="1" latinLnBrk="0" hangingPunct="1">
+      <a:defRPr sz="1200" kern="1200">
+        <a:solidFill>
+          <a:schemeClr val="tx1"/>
+        </a:solidFill>
+        <a:latin typeface="+mn-lt"/>
+        <a:ea typeface="+mn-ea"/>
+        <a:cs typeface="+mn-cs"/>
+      </a:defRPr>
+    </a:lvl3pPr>
+    <a:lvl4pPr marL="1371600" algn="l" defTabSz="914400" rtl="0" eaLnBrk="1" latinLnBrk="0" hangingPunct="1">
+      <a:defRPr sz="1200" kern="1200">
+        <a:solidFill>
+          <a:schemeClr val="tx1"/>
+        </a:solidFill>
+        <a:latin typeface="+mn-lt"/>
+        <a:ea typeface="+mn-ea"/>
+        <a:cs typeface="+mn-cs"/>
+      </a:defRPr>
+    </a:lvl4pPr>
+    <a:lvl5pPr marL="1828800" algn="l" defTabSz="914400" rtl="0" eaLnBrk="1" latinLnBrk="0" hangingPunct="1">
+      <a:defRPr sz="1200" kern="1200">
+        <a:solidFill>
+          <a:schemeClr val="tx1"/>
+        </a:solidFill>
+        <a:latin typeface="+mn-lt"/>
+        <a:ea typeface="+mn-ea"/>
+        <a:cs typeface="+mn-cs"/>
+      </a:defRPr>
+    </a:lvl5pPr>
+    <a:lvl6pPr marL="2286000" algn="l" defTabSz="914400" rtl="0" eaLnBrk="1" latinLnBrk="0" hangingPunct="1">
+      <a:defRPr sz="1200" kern="1200">
+        <a:solidFill>
+          <a:schemeClr val="tx1"/>
+        </a:solidFill>
+        <a:latin typeface="+mn-lt"/>
+        <a:ea typeface="+mn-ea"/>
+        <a:cs typeface="+mn-cs"/>
+      </a:defRPr>
+    </a:lvl6pPr>
+    <a:lvl7pPr marL="2743200" algn="l" defTabSz="914400" rtl="0" eaLnBrk="1" latinLnBrk="0" hangingPunct="1">
+      <a:defRPr sz="1200" kern="1200">
+        <a:solidFill>
+          <a:schemeClr val="tx1"/>
+        </a:solidFill>
+        <a:latin typeface="+mn-lt"/>
+        <a:ea typeface="+mn-ea"/>
+        <a:cs typeface="+mn-cs"/>
+      </a:defRPr>
+    </a:lvl7pPr>
+    <a:lvl8pPr marL="3200400" algn="l" defTabSz="914400" rtl="0" eaLnBrk="1" latinLnBrk="0" hangingPunct="1">
+      <a:defRPr sz="1200" kern="1200">
+        <a:solidFill>
+          <a:schemeClr val="tx1"/>
+        </a:solidFill>
+        <a:latin typeface="+mn-lt"/>
+        <a:ea typeface="+mn-ea"/>
+        <a:cs typeface="+mn-cs"/>
+      </a:defRPr>
+    </a:lvl8pPr>
+    <a:lvl9pPr marL="3657600" algn="l" defTabSz="914400" rtl="0" eaLnBrk="1" latinLnBrk="0" hangingPunct="1">
+      <a:defRPr sz="1200" kern="1200">
+        <a:solidFill>
+          <a:schemeClr val="tx1"/>
+        </a:solidFill>
+        <a:latin typeface="+mn-lt"/>
+        <a:ea typeface="+mn-ea"/>
+        <a:cs typeface="+mn-cs"/>
+      </a:defRPr>
+    </a:lvl9pPr>
+  </p:notesStyle>
+</p:notesMaster>
+</file>
+
+<file path=ppt/notesSlides/notesSlide1.xml><?xml version="1.0" encoding="utf-8"?>
+<p:notes xmlns:a="http://schemas.openxmlformats.org/drawingml/2006/main" xmlns:r="http://schemas.openxmlformats.org/officeDocument/2006/relationships" xmlns:p="http://schemas.openxmlformats.org/presentationml/2006/main">
+  <p:cSld>
+    <p:spTree>
+      <p:nvGrpSpPr>
+        <p:cNvPr id="1" name=""/>
+        <p:cNvGrpSpPr/>
+        <p:nvPr/>
+      </p:nvGrpSpPr>
+      <p:grpSpPr>
+        <a:xfrm>
+          <a:off x="0" y="0"/>
+          <a:ext cx="0" cy="0"/>
+          <a:chOff x="0" y="0"/>
+          <a:chExt cx="0" cy="0"/>
+        </a:xfrm>
+      </p:grpSpPr>
+      <p:sp>
+        <p:nvSpPr>
+          <p:cNvPr id="2" name="Slide Image Placeholder 1"/>
+          <p:cNvSpPr>
+            <a:spLocks noGrp="1" noRot="1" noChangeAspect="1"/>
+          </p:cNvSpPr>
+          <p:nvPr>
+            <p:ph type="sldImg"/>
+          </p:nvPr>
+        </p:nvSpPr>
+        <p:spPr/>
+      </p:sp>
+      <p:sp>
+        <p:nvSpPr>
+          <p:cNvPr id="3" name="Notes Placeholder 2"/>
+          <p:cNvSpPr>
+            <a:spLocks noGrp="1"/>
+          </p:cNvSpPr>
+          <p:nvPr>
+            <p:ph type="body" idx="1"/>
+          </p:nvPr>
+        </p:nvSpPr>
+        <p:spPr/>
+        <p:txBody>
+          <a:bodyPr/>
+          <a:lstStyle/>
+          <a:p>
+            <a:r>
+              <a:rPr lang="en-US"/>
+              <a:t>Test Note</a:t>
+            </a:r>
+          </a:p>
+        </p:txBody>
+      </p:sp>
+      <p:sp>
+        <p:nvSpPr>
+          <p:cNvPr id="4" name="Slide Number Placeholder 3"/>
+          <p:cNvSpPr>
+            <a:spLocks noGrp="1"/>
+          </p:cNvSpPr>
+          <p:nvPr>
+            <p:ph type="sldNum" sz="quarter" idx="5"/>
+          </p:nvPr>
+        </p:nvSpPr>
+        <p:spPr/>
+        <p:txBody>
+          <a:bodyPr/>
+          <a:lstStyle/>
+          <a:p>
+            <a:fld id="{BC8E9BA4-601E-457E-9F74-8060180382E1}" type="slidenum">
+              <a:rPr lang="en-US" smtClean="0"/>
+              <a:t>1</a:t>
+            </a:fld>
+            <a:endParaRPr lang="en-US"/>
+          </a:p>
+        </p:txBody>
+      </p:sp>
+    </p:spTree>
+    <p:extLst>
+      <p:ext uri="{BB962C8B-B14F-4D97-AF65-F5344CB8AC3E}">
+        <p14:creationId xmlns:p14="http://schemas.microsoft.com/office/powerpoint/2010/main" val="807666295"/>
+      </p:ext>
+    </p:extLst>
+  </p:cSld>
+  <p:clrMapOvr>
+    <a:masterClrMapping/>
+  </p:clrMapOvr>
+</p:notes>
+</file>
+
 <file path=ppt/slideLayouts/slideLayout1.xml><?xml version="1.0" encoding="utf-8"?>
 <p:sldLayout xmlns:a="http://schemas.openxmlformats.org/drawingml/2006/main" xmlns:r="http://schemas.openxmlformats.org/officeDocument/2006/relationships" xmlns:p="http://schemas.openxmlformats.org/presentationml/2006/main" preserve="1" userDrawn="1">
   <p:cSld name="Титульный слайд">
@@ -265,7 +704,7 @@
           <a:p>
             <a:fld id="{6A2D1428-0459-4F75-829F-043936AE8C9E}" type="datetimeFigureOut">
               <a:rPr lang="en-US" smtClean="0"/>
-              <a:t>5/4/2021</a:t>
+              <a:t>9/11/2021</a:t>
             </a:fld>
             <a:endParaRPr lang="en-US"/>
           </a:p>
@@ -561,7 +1000,7 @@
           <a:p>
             <a:fld id="{6A2D1428-0459-4F75-829F-043936AE8C9E}" type="datetimeFigureOut">
               <a:rPr lang="en-US" smtClean="0"/>
-              <a:t>5/4/2021</a:t>
+              <a:t>9/11/2021</a:t>
             </a:fld>
             <a:endParaRPr lang="en-US"/>
           </a:p>
@@ -771,7 +1210,7 @@
           <a:p>
             <a:fld id="{6A2D1428-0459-4F75-829F-043936AE8C9E}" type="datetimeFigureOut">
               <a:rPr lang="en-US" smtClean="0"/>
-              <a:t>5/4/2021</a:t>
+              <a:t>9/11/2021</a:t>
             </a:fld>
             <a:endParaRPr lang="en-US"/>
           </a:p>
@@ -971,7 +1410,7 @@
           <a:p>
             <a:fld id="{6A2D1428-0459-4F75-829F-043936AE8C9E}" type="datetimeFigureOut">
               <a:rPr lang="en-US" smtClean="0"/>
-              <a:t>5/4/2021</a:t>
+              <a:t>9/11/2021</a:t>
             </a:fld>
             <a:endParaRPr lang="en-US"/>
           </a:p>
@@ -1247,7 +1686,7 @@
           <a:p>
             <a:fld id="{6A2D1428-0459-4F75-829F-043936AE8C9E}" type="datetimeFigureOut">
               <a:rPr lang="en-US" smtClean="0"/>
-              <a:t>5/4/2021</a:t>
+              <a:t>9/11/2021</a:t>
             </a:fld>
             <a:endParaRPr lang="en-US"/>
           </a:p>
@@ -1515,7 +1954,7 @@
           <a:p>
             <a:fld id="{6A2D1428-0459-4F75-829F-043936AE8C9E}" type="datetimeFigureOut">
               <a:rPr lang="en-US" smtClean="0"/>
-              <a:t>5/4/2021</a:t>
+              <a:t>9/11/2021</a:t>
             </a:fld>
             <a:endParaRPr lang="en-US"/>
           </a:p>
@@ -1930,7 +2369,7 @@
           <a:p>
             <a:fld id="{6A2D1428-0459-4F75-829F-043936AE8C9E}" type="datetimeFigureOut">
               <a:rPr lang="en-US" smtClean="0"/>
-              <a:t>5/4/2021</a:t>
+              <a:t>9/11/2021</a:t>
             </a:fld>
             <a:endParaRPr lang="en-US"/>
           </a:p>
@@ -2072,7 +2511,7 @@
           <a:p>
             <a:fld id="{6A2D1428-0459-4F75-829F-043936AE8C9E}" type="datetimeFigureOut">
               <a:rPr lang="en-US" smtClean="0"/>
-              <a:t>5/4/2021</a:t>
+              <a:t>9/11/2021</a:t>
             </a:fld>
             <a:endParaRPr lang="en-US"/>
           </a:p>
@@ -2185,7 +2624,7 @@
           <a:p>
             <a:fld id="{6A2D1428-0459-4F75-829F-043936AE8C9E}" type="datetimeFigureOut">
               <a:rPr lang="en-US" smtClean="0"/>
-              <a:t>5/4/2021</a:t>
+              <a:t>9/11/2021</a:t>
             </a:fld>
             <a:endParaRPr lang="en-US"/>
           </a:p>
@@ -2498,7 +2937,7 @@
           <a:p>
             <a:fld id="{6A2D1428-0459-4F75-829F-043936AE8C9E}" type="datetimeFigureOut">
               <a:rPr lang="en-US" smtClean="0"/>
-              <a:t>5/4/2021</a:t>
+              <a:t>9/11/2021</a:t>
             </a:fld>
             <a:endParaRPr lang="en-US"/>
           </a:p>
@@ -2787,7 +3226,7 @@
           <a:p>
             <a:fld id="{6A2D1428-0459-4F75-829F-043936AE8C9E}" type="datetimeFigureOut">
               <a:rPr lang="en-US" smtClean="0"/>
-              <a:t>5/4/2021</a:t>
+              <a:t>9/11/2021</a:t>
             </a:fld>
             <a:endParaRPr lang="en-US"/>
           </a:p>
@@ -3030,7 +3469,7 @@
           <a:p>
             <a:fld id="{6A2D1428-0459-4F75-829F-043936AE8C9E}" type="datetimeFigureOut">
               <a:rPr lang="en-US" smtClean="0"/>
-              <a:t>5/4/2021</a:t>
+              <a:t>9/11/2021</a:t>
             </a:fld>
             <a:endParaRPr lang="en-US"/>
           </a:p>
@@ -6541,4 +6980,299 @@
     </a:ext>
   </a:extLst>
 </a:theme>
+</file>
+
+<file path=ppt/theme/theme2.xml><?xml version="1.0" encoding="utf-8"?>
+<a:theme xmlns:a="http://schemas.openxmlformats.org/drawingml/2006/main" name="Office Theme">
+  <a:themeElements>
+    <a:clrScheme name="Office">
+      <a:dk1>
+        <a:sysClr val="windowText" lastClr="000000"/>
+      </a:dk1>
+      <a:lt1>
+        <a:sysClr val="window" lastClr="FFFFFF"/>
+      </a:lt1>
+      <a:dk2>
+        <a:srgbClr val="44546A"/>
+      </a:dk2>
+      <a:lt2>
+        <a:srgbClr val="E7E6E6"/>
+      </a:lt2>
+      <a:accent1>
+        <a:srgbClr val="4472C4"/>
+      </a:accent1>
+      <a:accent2>
+        <a:srgbClr val="ED7D31"/>
+      </a:accent2>
+      <a:accent3>
+        <a:srgbClr val="A5A5A5"/>
+      </a:accent3>
+      <a:accent4>
+        <a:srgbClr val="FFC000"/>
+      </a:accent4>
+      <a:accent5>
+        <a:srgbClr val="5B9BD5"/>
+      </a:accent5>
+      <a:accent6>
+        <a:srgbClr val="70AD47"/>
+      </a:accent6>
+      <a:hlink>
+        <a:srgbClr val="0563C1"/>
+      </a:hlink>
+      <a:folHlink>
+        <a:srgbClr val="954F72"/>
+      </a:folHlink>
+    </a:clrScheme>
+    <a:fontScheme name="Office">
+      <a:majorFont>
+        <a:latin typeface="Calibri Light" panose="020F0302020204030204"/>
+        <a:ea typeface=""/>
+        <a:cs typeface=""/>
+        <a:font script="Jpan" typeface="游ゴシック Light"/>
+        <a:font script="Hang" typeface="맑은 고딕"/>
+        <a:font script="Hans" typeface="等线 Light"/>
+        <a:font script="Hant" typeface="新細明體"/>
+        <a:font script="Arab" typeface="Times New Roman"/>
+        <a:font script="Hebr" typeface="Times New Roman"/>
+        <a:font script="Thai" typeface="Angsana New"/>
+        <a:font script="Ethi" typeface="Nyala"/>
+        <a:font script="Beng" typeface="Vrinda"/>
+        <a:font script="Gujr" typeface="Shruti"/>
+        <a:font script="Khmr" typeface="MoolBoran"/>
+        <a:font script="Knda" typeface="Tunga"/>
+        <a:font script="Guru" typeface="Raavi"/>
+        <a:font script="Cans" typeface="Euphemia"/>
+        <a:font script="Cher" typeface="Plantagenet Cherokee"/>
+        <a:font script="Yiii" typeface="Microsoft Yi Baiti"/>
+        <a:font script="Tibt" typeface="Microsoft Himalaya"/>
+        <a:font script="Thaa" typeface="MV Boli"/>
+        <a:font script="Deva" typeface="Mangal"/>
+        <a:font script="Telu" typeface="Gautami"/>
+        <a:font script="Taml" typeface="Latha"/>
+        <a:font script="Syrc" typeface="Estrangelo Edessa"/>
+        <a:font script="Orya" typeface="Kalinga"/>
+        <a:font script="Mlym" typeface="Kartika"/>
+        <a:font script="Laoo" typeface="DokChampa"/>
+        <a:font script="Sinh" typeface="Iskoola Pota"/>
+        <a:font script="Mong" typeface="Mongolian Baiti"/>
+        <a:font script="Viet" typeface="Times New Roman"/>
+        <a:font script="Uigh" typeface="Microsoft Uighur"/>
+        <a:font script="Geor" typeface="Sylfaen"/>
+        <a:font script="Armn" typeface="Arial"/>
+        <a:font script="Bugi" typeface="Leelawadee UI"/>
+        <a:font script="Bopo" typeface="Microsoft JhengHei"/>
+        <a:font script="Java" typeface="Javanese Text"/>
+        <a:font script="Lisu" typeface="Segoe UI"/>
+        <a:font script="Mymr" typeface="Myanmar Text"/>
+        <a:font script="Nkoo" typeface="Ebrima"/>
+        <a:font script="Olck" typeface="Nirmala UI"/>
+        <a:font script="Osma" typeface="Ebrima"/>
+        <a:font script="Phag" typeface="Phagspa"/>
+        <a:font script="Syrn" typeface="Estrangelo Edessa"/>
+        <a:font script="Syrj" typeface="Estrangelo Edessa"/>
+        <a:font script="Syre" typeface="Estrangelo Edessa"/>
+        <a:font script="Sora" typeface="Nirmala UI"/>
+        <a:font script="Tale" typeface="Microsoft Tai Le"/>
+        <a:font script="Talu" typeface="Microsoft New Tai Lue"/>
+        <a:font script="Tfng" typeface="Ebrima"/>
+      </a:majorFont>
+      <a:minorFont>
+        <a:latin typeface="Calibri" panose="020F0502020204030204"/>
+        <a:ea typeface=""/>
+        <a:cs typeface=""/>
+        <a:font script="Jpan" typeface="游ゴシック"/>
+        <a:font script="Hang" typeface="맑은 고딕"/>
+        <a:font script="Hans" typeface="等线"/>
+        <a:font script="Hant" typeface="新細明體"/>
+        <a:font script="Arab" typeface="Arial"/>
+        <a:font script="Hebr" typeface="Arial"/>
+        <a:font script="Thai" typeface="Cordia New"/>
+        <a:font script="Ethi" typeface="Nyala"/>
+        <a:font script="Beng" typeface="Vrinda"/>
+        <a:font script="Gujr" typeface="Shruti"/>
+        <a:font script="Khmr" typeface="DaunPenh"/>
+        <a:font script="Knda" typeface="Tunga"/>
+        <a:font script="Guru" typeface="Raavi"/>
+        <a:font script="Cans" typeface="Euphemia"/>
+        <a:font script="Cher" typeface="Plantagenet Cherokee"/>
+        <a:font script="Yiii" typeface="Microsoft Yi Baiti"/>
+        <a:font script="Tibt" typeface="Microsoft Himalaya"/>
+        <a:font script="Thaa" typeface="MV Boli"/>
+        <a:font script="Deva" typeface="Mangal"/>
+        <a:font script="Telu" typeface="Gautami"/>
+        <a:font script="Taml" typeface="Latha"/>
+        <a:font script="Syrc" typeface="Estrangelo Edessa"/>
+        <a:font script="Orya" typeface="Kalinga"/>
+        <a:font script="Mlym" typeface="Kartika"/>
+        <a:font script="Laoo" typeface="DokChampa"/>
+        <a:font script="Sinh" typeface="Iskoola Pota"/>
+        <a:font script="Mong" typeface="Mongolian Baiti"/>
+        <a:font script="Viet" typeface="Arial"/>
+        <a:font script="Uigh" typeface="Microsoft Uighur"/>
+        <a:font script="Geor" typeface="Sylfaen"/>
+        <a:font script="Armn" typeface="Arial"/>
+        <a:font script="Bugi" typeface="Leelawadee UI"/>
+        <a:font script="Bopo" typeface="Microsoft JhengHei"/>
+        <a:font script="Java" typeface="Javanese Text"/>
+        <a:font script="Lisu" typeface="Segoe UI"/>
+        <a:font script="Mymr" typeface="Myanmar Text"/>
+        <a:font script="Nkoo" typeface="Ebrima"/>
+        <a:font script="Olck" typeface="Nirmala UI"/>
+        <a:font script="Osma" typeface="Ebrima"/>
+        <a:font script="Phag" typeface="Phagspa"/>
+        <a:font script="Syrn" typeface="Estrangelo Edessa"/>
+        <a:font script="Syrj" typeface="Estrangelo Edessa"/>
+        <a:font script="Syre" typeface="Estrangelo Edessa"/>
+        <a:font script="Sora" typeface="Nirmala UI"/>
+        <a:font script="Tale" typeface="Microsoft Tai Le"/>
+        <a:font script="Talu" typeface="Microsoft New Tai Lue"/>
+        <a:font script="Tfng" typeface="Ebrima"/>
+      </a:minorFont>
+    </a:fontScheme>
+    <a:fmtScheme name="Office">
+      <a:fillStyleLst>
+        <a:solidFill>
+          <a:schemeClr val="phClr"/>
+        </a:solidFill>
+        <a:gradFill rotWithShape="1">
+          <a:gsLst>
+            <a:gs pos="0">
+              <a:schemeClr val="phClr">
+                <a:lumMod val="110000"/>
+                <a:satMod val="105000"/>
+                <a:tint val="67000"/>
+              </a:schemeClr>
+            </a:gs>
+            <a:gs pos="50000">
+              <a:schemeClr val="phClr">
+                <a:lumMod val="105000"/>
+                <a:satMod val="103000"/>
+                <a:tint val="73000"/>
+              </a:schemeClr>
+            </a:gs>
+            <a:gs pos="100000">
+              <a:schemeClr val="phClr">
+                <a:lumMod val="105000"/>
+                <a:satMod val="109000"/>
+                <a:tint val="81000"/>
+              </a:schemeClr>
+            </a:gs>
+          </a:gsLst>
+          <a:lin ang="5400000" scaled="0"/>
+        </a:gradFill>
+        <a:gradFill rotWithShape="1">
+          <a:gsLst>
+            <a:gs pos="0">
+              <a:schemeClr val="phClr">
+                <a:satMod val="103000"/>
+                <a:lumMod val="102000"/>
+                <a:tint val="94000"/>
+              </a:schemeClr>
+            </a:gs>
+            <a:gs pos="50000">
+              <a:schemeClr val="phClr">
+                <a:satMod val="110000"/>
+                <a:lumMod val="100000"/>
+                <a:shade val="100000"/>
+              </a:schemeClr>
+            </a:gs>
+            <a:gs pos="100000">
+              <a:schemeClr val="phClr">
+                <a:lumMod val="99000"/>
+                <a:satMod val="120000"/>
+                <a:shade val="78000"/>
+              </a:schemeClr>
+            </a:gs>
+          </a:gsLst>
+          <a:lin ang="5400000" scaled="0"/>
+        </a:gradFill>
+      </a:fillStyleLst>
+      <a:lnStyleLst>
+        <a:ln w="6350" cap="flat" cmpd="sng" algn="ctr">
+          <a:solidFill>
+            <a:schemeClr val="phClr"/>
+          </a:solidFill>
+          <a:prstDash val="solid"/>
+          <a:miter lim="800000"/>
+        </a:ln>
+        <a:ln w="12700" cap="flat" cmpd="sng" algn="ctr">
+          <a:solidFill>
+            <a:schemeClr val="phClr"/>
+          </a:solidFill>
+          <a:prstDash val="solid"/>
+          <a:miter lim="800000"/>
+        </a:ln>
+        <a:ln w="19050" cap="flat" cmpd="sng" algn="ctr">
+          <a:solidFill>
+            <a:schemeClr val="phClr"/>
+          </a:solidFill>
+          <a:prstDash val="solid"/>
+          <a:miter lim="800000"/>
+        </a:ln>
+      </a:lnStyleLst>
+      <a:effectStyleLst>
+        <a:effectStyle>
+          <a:effectLst/>
+        </a:effectStyle>
+        <a:effectStyle>
+          <a:effectLst/>
+        </a:effectStyle>
+        <a:effectStyle>
+          <a:effectLst>
+            <a:outerShdw blurRad="57150" dist="19050" dir="5400000" algn="ctr" rotWithShape="0">
+              <a:srgbClr val="000000">
+                <a:alpha val="63000"/>
+              </a:srgbClr>
+            </a:outerShdw>
+          </a:effectLst>
+        </a:effectStyle>
+      </a:effectStyleLst>
+      <a:bgFillStyleLst>
+        <a:solidFill>
+          <a:schemeClr val="phClr"/>
+        </a:solidFill>
+        <a:solidFill>
+          <a:schemeClr val="phClr">
+            <a:tint val="95000"/>
+            <a:satMod val="170000"/>
+          </a:schemeClr>
+        </a:solidFill>
+        <a:gradFill rotWithShape="1">
+          <a:gsLst>
+            <a:gs pos="0">
+              <a:schemeClr val="phClr">
+                <a:tint val="93000"/>
+                <a:satMod val="150000"/>
+                <a:shade val="98000"/>
+                <a:lumMod val="102000"/>
+              </a:schemeClr>
+            </a:gs>
+            <a:gs pos="50000">
+              <a:schemeClr val="phClr">
+                <a:tint val="98000"/>
+                <a:satMod val="130000"/>
+                <a:shade val="90000"/>
+                <a:lumMod val="103000"/>
+              </a:schemeClr>
+            </a:gs>
+            <a:gs pos="100000">
+              <a:schemeClr val="phClr">
+                <a:shade val="63000"/>
+                <a:satMod val="120000"/>
+              </a:schemeClr>
+            </a:gs>
+          </a:gsLst>
+          <a:lin ang="5400000" scaled="0"/>
+        </a:gradFill>
+      </a:bgFillStyleLst>
+    </a:fmtScheme>
+  </a:themeElements>
+  <a:objectDefaults/>
+  <a:extraClrSchemeLst/>
+  <a:extLst>
+    <a:ext uri="{05A4C25C-085E-4340-85A3-A5531E510DB2}">
+      <thm15:themeFamily xmlns:thm15="http://schemas.microsoft.com/office/thememl/2012/main" name="Office Theme" id="{62F939B6-93AF-4DB8-9C6B-D6C7DFDC589F}" vid="{4A3C46E8-61CC-4603-A589-7422A47A8E4A}"/>
+    </a:ext>
+  </a:extLst>
+</a:theme>
 </file>
</xml_diff>

<commit_message>
SC-156: Add unit test (#167)
</commit_message>
<xml_diff>
--- a/ShapeCrawler.Tests.Unit/Resource/001.pptx
+++ b/ShapeCrawler.Tests.Unit/Resource/001.pptx
@@ -4,6 +4,9 @@
   <p:sldMasterIdLst>
     <p:sldMasterId id="2147483648" r:id="rId1"/>
   </p:sldMasterIdLst>
+  <p:notesMasterIdLst>
+    <p:notesMasterId r:id="rId7"/>
+  </p:notesMasterIdLst>
   <p:sldIdLst>
     <p:sldId id="256" r:id="rId2"/>
     <p:sldId id="257" r:id="rId3"/>
@@ -116,6 +119,442 @@
 </p:presentation>
 </file>
 
+<file path=ppt/notesMasters/notesMaster1.xml><?xml version="1.0" encoding="utf-8"?>
+<p:notesMaster xmlns:a="http://schemas.openxmlformats.org/drawingml/2006/main" xmlns:r="http://schemas.openxmlformats.org/officeDocument/2006/relationships" xmlns:p="http://schemas.openxmlformats.org/presentationml/2006/main">
+  <p:cSld>
+    <p:bg>
+      <p:bgRef idx="1001">
+        <a:schemeClr val="bg1"/>
+      </p:bgRef>
+    </p:bg>
+    <p:spTree>
+      <p:nvGrpSpPr>
+        <p:cNvPr id="1" name=""/>
+        <p:cNvGrpSpPr/>
+        <p:nvPr/>
+      </p:nvGrpSpPr>
+      <p:grpSpPr>
+        <a:xfrm>
+          <a:off x="0" y="0"/>
+          <a:ext cx="0" cy="0"/>
+          <a:chOff x="0" y="0"/>
+          <a:chExt cx="0" cy="0"/>
+        </a:xfrm>
+      </p:grpSpPr>
+      <p:sp>
+        <p:nvSpPr>
+          <p:cNvPr id="2" name="Header Placeholder 1"/>
+          <p:cNvSpPr>
+            <a:spLocks noGrp="1"/>
+          </p:cNvSpPr>
+          <p:nvPr>
+            <p:ph type="hdr" sz="quarter"/>
+          </p:nvPr>
+        </p:nvSpPr>
+        <p:spPr>
+          <a:xfrm>
+            <a:off x="0" y="0"/>
+            <a:ext cx="2971800" cy="458788"/>
+          </a:xfrm>
+          <a:prstGeom prst="rect">
+            <a:avLst/>
+          </a:prstGeom>
+        </p:spPr>
+        <p:txBody>
+          <a:bodyPr vert="horz" lIns="91440" tIns="45720" rIns="91440" bIns="45720" rtlCol="0"/>
+          <a:lstStyle>
+            <a:lvl1pPr algn="l">
+              <a:defRPr sz="1200"/>
+            </a:lvl1pPr>
+          </a:lstStyle>
+          <a:p>
+            <a:endParaRPr lang="en-US"/>
+          </a:p>
+        </p:txBody>
+      </p:sp>
+      <p:sp>
+        <p:nvSpPr>
+          <p:cNvPr id="3" name="Date Placeholder 2"/>
+          <p:cNvSpPr>
+            <a:spLocks noGrp="1"/>
+          </p:cNvSpPr>
+          <p:nvPr>
+            <p:ph type="dt" idx="1"/>
+          </p:nvPr>
+        </p:nvSpPr>
+        <p:spPr>
+          <a:xfrm>
+            <a:off x="3884613" y="0"/>
+            <a:ext cx="2971800" cy="458788"/>
+          </a:xfrm>
+          <a:prstGeom prst="rect">
+            <a:avLst/>
+          </a:prstGeom>
+        </p:spPr>
+        <p:txBody>
+          <a:bodyPr vert="horz" lIns="91440" tIns="45720" rIns="91440" bIns="45720" rtlCol="0"/>
+          <a:lstStyle>
+            <a:lvl1pPr algn="r">
+              <a:defRPr sz="1200"/>
+            </a:lvl1pPr>
+          </a:lstStyle>
+          <a:p>
+            <a:fld id="{12586301-C795-4E70-B468-514DB1C1B146}" type="datetimeFigureOut">
+              <a:rPr lang="en-US" smtClean="0"/>
+              <a:t>9/11/2021</a:t>
+            </a:fld>
+            <a:endParaRPr lang="en-US"/>
+          </a:p>
+        </p:txBody>
+      </p:sp>
+      <p:sp>
+        <p:nvSpPr>
+          <p:cNvPr id="4" name="Slide Image Placeholder 3"/>
+          <p:cNvSpPr>
+            <a:spLocks noGrp="1" noRot="1" noChangeAspect="1"/>
+          </p:cNvSpPr>
+          <p:nvPr>
+            <p:ph type="sldImg" idx="2"/>
+          </p:nvPr>
+        </p:nvSpPr>
+        <p:spPr>
+          <a:xfrm>
+            <a:off x="685800" y="1143000"/>
+            <a:ext cx="5486400" cy="3086100"/>
+          </a:xfrm>
+          <a:prstGeom prst="rect">
+            <a:avLst/>
+          </a:prstGeom>
+          <a:noFill/>
+          <a:ln w="12700">
+            <a:solidFill>
+              <a:prstClr val="black"/>
+            </a:solidFill>
+          </a:ln>
+        </p:spPr>
+        <p:txBody>
+          <a:bodyPr vert="horz" lIns="91440" tIns="45720" rIns="91440" bIns="45720" rtlCol="0" anchor="ctr"/>
+          <a:lstStyle/>
+          <a:p>
+            <a:endParaRPr lang="en-US"/>
+          </a:p>
+        </p:txBody>
+      </p:sp>
+      <p:sp>
+        <p:nvSpPr>
+          <p:cNvPr id="5" name="Notes Placeholder 4"/>
+          <p:cNvSpPr>
+            <a:spLocks noGrp="1"/>
+          </p:cNvSpPr>
+          <p:nvPr>
+            <p:ph type="body" sz="quarter" idx="3"/>
+          </p:nvPr>
+        </p:nvSpPr>
+        <p:spPr>
+          <a:xfrm>
+            <a:off x="685800" y="4400550"/>
+            <a:ext cx="5486400" cy="3600450"/>
+          </a:xfrm>
+          <a:prstGeom prst="rect">
+            <a:avLst/>
+          </a:prstGeom>
+        </p:spPr>
+        <p:txBody>
+          <a:bodyPr vert="horz" lIns="91440" tIns="45720" rIns="91440" bIns="45720" rtlCol="0"/>
+          <a:lstStyle/>
+          <a:p>
+            <a:pPr lvl="0"/>
+            <a:r>
+              <a:rPr lang="en-US"/>
+              <a:t>Click to edit Master text styles</a:t>
+            </a:r>
+          </a:p>
+          <a:p>
+            <a:pPr lvl="1"/>
+            <a:r>
+              <a:rPr lang="en-US"/>
+              <a:t>Second level</a:t>
+            </a:r>
+          </a:p>
+          <a:p>
+            <a:pPr lvl="2"/>
+            <a:r>
+              <a:rPr lang="en-US"/>
+              <a:t>Third level</a:t>
+            </a:r>
+          </a:p>
+          <a:p>
+            <a:pPr lvl="3"/>
+            <a:r>
+              <a:rPr lang="en-US"/>
+              <a:t>Fourth level</a:t>
+            </a:r>
+          </a:p>
+          <a:p>
+            <a:pPr lvl="4"/>
+            <a:r>
+              <a:rPr lang="en-US"/>
+              <a:t>Fifth level</a:t>
+            </a:r>
+          </a:p>
+        </p:txBody>
+      </p:sp>
+      <p:sp>
+        <p:nvSpPr>
+          <p:cNvPr id="6" name="Footer Placeholder 5"/>
+          <p:cNvSpPr>
+            <a:spLocks noGrp="1"/>
+          </p:cNvSpPr>
+          <p:nvPr>
+            <p:ph type="ftr" sz="quarter" idx="4"/>
+          </p:nvPr>
+        </p:nvSpPr>
+        <p:spPr>
+          <a:xfrm>
+            <a:off x="0" y="8685213"/>
+            <a:ext cx="2971800" cy="458787"/>
+          </a:xfrm>
+          <a:prstGeom prst="rect">
+            <a:avLst/>
+          </a:prstGeom>
+        </p:spPr>
+        <p:txBody>
+          <a:bodyPr vert="horz" lIns="91440" tIns="45720" rIns="91440" bIns="45720" rtlCol="0" anchor="b"/>
+          <a:lstStyle>
+            <a:lvl1pPr algn="l">
+              <a:defRPr sz="1200"/>
+            </a:lvl1pPr>
+          </a:lstStyle>
+          <a:p>
+            <a:endParaRPr lang="en-US"/>
+          </a:p>
+        </p:txBody>
+      </p:sp>
+      <p:sp>
+        <p:nvSpPr>
+          <p:cNvPr id="7" name="Slide Number Placeholder 6"/>
+          <p:cNvSpPr>
+            <a:spLocks noGrp="1"/>
+          </p:cNvSpPr>
+          <p:nvPr>
+            <p:ph type="sldNum" sz="quarter" idx="5"/>
+          </p:nvPr>
+        </p:nvSpPr>
+        <p:spPr>
+          <a:xfrm>
+            <a:off x="3884613" y="8685213"/>
+            <a:ext cx="2971800" cy="458787"/>
+          </a:xfrm>
+          <a:prstGeom prst="rect">
+            <a:avLst/>
+          </a:prstGeom>
+        </p:spPr>
+        <p:txBody>
+          <a:bodyPr vert="horz" lIns="91440" tIns="45720" rIns="91440" bIns="45720" rtlCol="0" anchor="b"/>
+          <a:lstStyle>
+            <a:lvl1pPr algn="r">
+              <a:defRPr sz="1200"/>
+            </a:lvl1pPr>
+          </a:lstStyle>
+          <a:p>
+            <a:fld id="{BC8E9BA4-601E-457E-9F74-8060180382E1}" type="slidenum">
+              <a:rPr lang="en-US" smtClean="0"/>
+              <a:t>‹#›</a:t>
+            </a:fld>
+            <a:endParaRPr lang="en-US"/>
+          </a:p>
+        </p:txBody>
+      </p:sp>
+    </p:spTree>
+    <p:extLst>
+      <p:ext uri="{BB962C8B-B14F-4D97-AF65-F5344CB8AC3E}">
+        <p14:creationId xmlns:p14="http://schemas.microsoft.com/office/powerpoint/2010/main" val="2800592083"/>
+      </p:ext>
+    </p:extLst>
+  </p:cSld>
+  <p:clrMap bg1="lt1" tx1="dk1" bg2="lt2" tx2="dk2" accent1="accent1" accent2="accent2" accent3="accent3" accent4="accent4" accent5="accent5" accent6="accent6" hlink="hlink" folHlink="folHlink"/>
+  <p:notesStyle>
+    <a:lvl1pPr marL="0" algn="l" defTabSz="914400" rtl="0" eaLnBrk="1" latinLnBrk="0" hangingPunct="1">
+      <a:defRPr sz="1200" kern="1200">
+        <a:solidFill>
+          <a:schemeClr val="tx1"/>
+        </a:solidFill>
+        <a:latin typeface="+mn-lt"/>
+        <a:ea typeface="+mn-ea"/>
+        <a:cs typeface="+mn-cs"/>
+      </a:defRPr>
+    </a:lvl1pPr>
+    <a:lvl2pPr marL="457200" algn="l" defTabSz="914400" rtl="0" eaLnBrk="1" latinLnBrk="0" hangingPunct="1">
+      <a:defRPr sz="1200" kern="1200">
+        <a:solidFill>
+          <a:schemeClr val="tx1"/>
+        </a:solidFill>
+        <a:latin typeface="+mn-lt"/>
+        <a:ea typeface="+mn-ea"/>
+        <a:cs typeface="+mn-cs"/>
+      </a:defRPr>
+    </a:lvl2pPr>
+    <a:lvl3pPr marL="914400" algn="l" defTabSz="914400" rtl="0" eaLnBrk="1" latinLnBrk="0" hangingPunct="1">
+      <a:defRPr sz="1200" kern="1200">
+        <a:solidFill>
+          <a:schemeClr val="tx1"/>
+        </a:solidFill>
+        <a:latin typeface="+mn-lt"/>
+        <a:ea typeface="+mn-ea"/>
+        <a:cs typeface="+mn-cs"/>
+      </a:defRPr>
+    </a:lvl3pPr>
+    <a:lvl4pPr marL="1371600" algn="l" defTabSz="914400" rtl="0" eaLnBrk="1" latinLnBrk="0" hangingPunct="1">
+      <a:defRPr sz="1200" kern="1200">
+        <a:solidFill>
+          <a:schemeClr val="tx1"/>
+        </a:solidFill>
+        <a:latin typeface="+mn-lt"/>
+        <a:ea typeface="+mn-ea"/>
+        <a:cs typeface="+mn-cs"/>
+      </a:defRPr>
+    </a:lvl4pPr>
+    <a:lvl5pPr marL="1828800" algn="l" defTabSz="914400" rtl="0" eaLnBrk="1" latinLnBrk="0" hangingPunct="1">
+      <a:defRPr sz="1200" kern="1200">
+        <a:solidFill>
+          <a:schemeClr val="tx1"/>
+        </a:solidFill>
+        <a:latin typeface="+mn-lt"/>
+        <a:ea typeface="+mn-ea"/>
+        <a:cs typeface="+mn-cs"/>
+      </a:defRPr>
+    </a:lvl5pPr>
+    <a:lvl6pPr marL="2286000" algn="l" defTabSz="914400" rtl="0" eaLnBrk="1" latinLnBrk="0" hangingPunct="1">
+      <a:defRPr sz="1200" kern="1200">
+        <a:solidFill>
+          <a:schemeClr val="tx1"/>
+        </a:solidFill>
+        <a:latin typeface="+mn-lt"/>
+        <a:ea typeface="+mn-ea"/>
+        <a:cs typeface="+mn-cs"/>
+      </a:defRPr>
+    </a:lvl6pPr>
+    <a:lvl7pPr marL="2743200" algn="l" defTabSz="914400" rtl="0" eaLnBrk="1" latinLnBrk="0" hangingPunct="1">
+      <a:defRPr sz="1200" kern="1200">
+        <a:solidFill>
+          <a:schemeClr val="tx1"/>
+        </a:solidFill>
+        <a:latin typeface="+mn-lt"/>
+        <a:ea typeface="+mn-ea"/>
+        <a:cs typeface="+mn-cs"/>
+      </a:defRPr>
+    </a:lvl7pPr>
+    <a:lvl8pPr marL="3200400" algn="l" defTabSz="914400" rtl="0" eaLnBrk="1" latinLnBrk="0" hangingPunct="1">
+      <a:defRPr sz="1200" kern="1200">
+        <a:solidFill>
+          <a:schemeClr val="tx1"/>
+        </a:solidFill>
+        <a:latin typeface="+mn-lt"/>
+        <a:ea typeface="+mn-ea"/>
+        <a:cs typeface="+mn-cs"/>
+      </a:defRPr>
+    </a:lvl8pPr>
+    <a:lvl9pPr marL="3657600" algn="l" defTabSz="914400" rtl="0" eaLnBrk="1" latinLnBrk="0" hangingPunct="1">
+      <a:defRPr sz="1200" kern="1200">
+        <a:solidFill>
+          <a:schemeClr val="tx1"/>
+        </a:solidFill>
+        <a:latin typeface="+mn-lt"/>
+        <a:ea typeface="+mn-ea"/>
+        <a:cs typeface="+mn-cs"/>
+      </a:defRPr>
+    </a:lvl9pPr>
+  </p:notesStyle>
+</p:notesMaster>
+</file>
+
+<file path=ppt/notesSlides/notesSlide1.xml><?xml version="1.0" encoding="utf-8"?>
+<p:notes xmlns:a="http://schemas.openxmlformats.org/drawingml/2006/main" xmlns:r="http://schemas.openxmlformats.org/officeDocument/2006/relationships" xmlns:p="http://schemas.openxmlformats.org/presentationml/2006/main">
+  <p:cSld>
+    <p:spTree>
+      <p:nvGrpSpPr>
+        <p:cNvPr id="1" name=""/>
+        <p:cNvGrpSpPr/>
+        <p:nvPr/>
+      </p:nvGrpSpPr>
+      <p:grpSpPr>
+        <a:xfrm>
+          <a:off x="0" y="0"/>
+          <a:ext cx="0" cy="0"/>
+          <a:chOff x="0" y="0"/>
+          <a:chExt cx="0" cy="0"/>
+        </a:xfrm>
+      </p:grpSpPr>
+      <p:sp>
+        <p:nvSpPr>
+          <p:cNvPr id="2" name="Slide Image Placeholder 1"/>
+          <p:cNvSpPr>
+            <a:spLocks noGrp="1" noRot="1" noChangeAspect="1"/>
+          </p:cNvSpPr>
+          <p:nvPr>
+            <p:ph type="sldImg"/>
+          </p:nvPr>
+        </p:nvSpPr>
+        <p:spPr/>
+      </p:sp>
+      <p:sp>
+        <p:nvSpPr>
+          <p:cNvPr id="3" name="Notes Placeholder 2"/>
+          <p:cNvSpPr>
+            <a:spLocks noGrp="1"/>
+          </p:cNvSpPr>
+          <p:nvPr>
+            <p:ph type="body" idx="1"/>
+          </p:nvPr>
+        </p:nvSpPr>
+        <p:spPr/>
+        <p:txBody>
+          <a:bodyPr/>
+          <a:lstStyle/>
+          <a:p>
+            <a:r>
+              <a:rPr lang="en-US"/>
+              <a:t>Test Note</a:t>
+            </a:r>
+          </a:p>
+        </p:txBody>
+      </p:sp>
+      <p:sp>
+        <p:nvSpPr>
+          <p:cNvPr id="4" name="Slide Number Placeholder 3"/>
+          <p:cNvSpPr>
+            <a:spLocks noGrp="1"/>
+          </p:cNvSpPr>
+          <p:nvPr>
+            <p:ph type="sldNum" sz="quarter" idx="5"/>
+          </p:nvPr>
+        </p:nvSpPr>
+        <p:spPr/>
+        <p:txBody>
+          <a:bodyPr/>
+          <a:lstStyle/>
+          <a:p>
+            <a:fld id="{BC8E9BA4-601E-457E-9F74-8060180382E1}" type="slidenum">
+              <a:rPr lang="en-US" smtClean="0"/>
+              <a:t>1</a:t>
+            </a:fld>
+            <a:endParaRPr lang="en-US"/>
+          </a:p>
+        </p:txBody>
+      </p:sp>
+    </p:spTree>
+    <p:extLst>
+      <p:ext uri="{BB962C8B-B14F-4D97-AF65-F5344CB8AC3E}">
+        <p14:creationId xmlns:p14="http://schemas.microsoft.com/office/powerpoint/2010/main" val="807666295"/>
+      </p:ext>
+    </p:extLst>
+  </p:cSld>
+  <p:clrMapOvr>
+    <a:masterClrMapping/>
+  </p:clrMapOvr>
+</p:notes>
+</file>
+
 <file path=ppt/slideLayouts/slideLayout1.xml><?xml version="1.0" encoding="utf-8"?>
 <p:sldLayout xmlns:a="http://schemas.openxmlformats.org/drawingml/2006/main" xmlns:r="http://schemas.openxmlformats.org/officeDocument/2006/relationships" xmlns:p="http://schemas.openxmlformats.org/presentationml/2006/main" preserve="1" userDrawn="1">
   <p:cSld name="Титульный слайд">
@@ -265,7 +704,7 @@
           <a:p>
             <a:fld id="{6A2D1428-0459-4F75-829F-043936AE8C9E}" type="datetimeFigureOut">
               <a:rPr lang="en-US" smtClean="0"/>
-              <a:t>5/4/2021</a:t>
+              <a:t>9/11/2021</a:t>
             </a:fld>
             <a:endParaRPr lang="en-US"/>
           </a:p>
@@ -561,7 +1000,7 @@
           <a:p>
             <a:fld id="{6A2D1428-0459-4F75-829F-043936AE8C9E}" type="datetimeFigureOut">
               <a:rPr lang="en-US" smtClean="0"/>
-              <a:t>5/4/2021</a:t>
+              <a:t>9/11/2021</a:t>
             </a:fld>
             <a:endParaRPr lang="en-US"/>
           </a:p>
@@ -771,7 +1210,7 @@
           <a:p>
             <a:fld id="{6A2D1428-0459-4F75-829F-043936AE8C9E}" type="datetimeFigureOut">
               <a:rPr lang="en-US" smtClean="0"/>
-              <a:t>5/4/2021</a:t>
+              <a:t>9/11/2021</a:t>
             </a:fld>
             <a:endParaRPr lang="en-US"/>
           </a:p>
@@ -971,7 +1410,7 @@
           <a:p>
             <a:fld id="{6A2D1428-0459-4F75-829F-043936AE8C9E}" type="datetimeFigureOut">
               <a:rPr lang="en-US" smtClean="0"/>
-              <a:t>5/4/2021</a:t>
+              <a:t>9/11/2021</a:t>
             </a:fld>
             <a:endParaRPr lang="en-US"/>
           </a:p>
@@ -1247,7 +1686,7 @@
           <a:p>
             <a:fld id="{6A2D1428-0459-4F75-829F-043936AE8C9E}" type="datetimeFigureOut">
               <a:rPr lang="en-US" smtClean="0"/>
-              <a:t>5/4/2021</a:t>
+              <a:t>9/11/2021</a:t>
             </a:fld>
             <a:endParaRPr lang="en-US"/>
           </a:p>
@@ -1515,7 +1954,7 @@
           <a:p>
             <a:fld id="{6A2D1428-0459-4F75-829F-043936AE8C9E}" type="datetimeFigureOut">
               <a:rPr lang="en-US" smtClean="0"/>
-              <a:t>5/4/2021</a:t>
+              <a:t>9/11/2021</a:t>
             </a:fld>
             <a:endParaRPr lang="en-US"/>
           </a:p>
@@ -1930,7 +2369,7 @@
           <a:p>
             <a:fld id="{6A2D1428-0459-4F75-829F-043936AE8C9E}" type="datetimeFigureOut">
               <a:rPr lang="en-US" smtClean="0"/>
-              <a:t>5/4/2021</a:t>
+              <a:t>9/11/2021</a:t>
             </a:fld>
             <a:endParaRPr lang="en-US"/>
           </a:p>
@@ -2072,7 +2511,7 @@
           <a:p>
             <a:fld id="{6A2D1428-0459-4F75-829F-043936AE8C9E}" type="datetimeFigureOut">
               <a:rPr lang="en-US" smtClean="0"/>
-              <a:t>5/4/2021</a:t>
+              <a:t>9/11/2021</a:t>
             </a:fld>
             <a:endParaRPr lang="en-US"/>
           </a:p>
@@ -2185,7 +2624,7 @@
           <a:p>
             <a:fld id="{6A2D1428-0459-4F75-829F-043936AE8C9E}" type="datetimeFigureOut">
               <a:rPr lang="en-US" smtClean="0"/>
-              <a:t>5/4/2021</a:t>
+              <a:t>9/11/2021</a:t>
             </a:fld>
             <a:endParaRPr lang="en-US"/>
           </a:p>
@@ -2498,7 +2937,7 @@
           <a:p>
             <a:fld id="{6A2D1428-0459-4F75-829F-043936AE8C9E}" type="datetimeFigureOut">
               <a:rPr lang="en-US" smtClean="0"/>
-              <a:t>5/4/2021</a:t>
+              <a:t>9/11/2021</a:t>
             </a:fld>
             <a:endParaRPr lang="en-US"/>
           </a:p>
@@ -2787,7 +3226,7 @@
           <a:p>
             <a:fld id="{6A2D1428-0459-4F75-829F-043936AE8C9E}" type="datetimeFigureOut">
               <a:rPr lang="en-US" smtClean="0"/>
-              <a:t>5/4/2021</a:t>
+              <a:t>9/11/2021</a:t>
             </a:fld>
             <a:endParaRPr lang="en-US"/>
           </a:p>
@@ -3030,7 +3469,7 @@
           <a:p>
             <a:fld id="{6A2D1428-0459-4F75-829F-043936AE8C9E}" type="datetimeFigureOut">
               <a:rPr lang="en-US" smtClean="0"/>
-              <a:t>5/4/2021</a:t>
+              <a:t>9/11/2021</a:t>
             </a:fld>
             <a:endParaRPr lang="en-US"/>
           </a:p>
@@ -6541,4 +6980,299 @@
     </a:ext>
   </a:extLst>
 </a:theme>
+</file>
+
+<file path=ppt/theme/theme2.xml><?xml version="1.0" encoding="utf-8"?>
+<a:theme xmlns:a="http://schemas.openxmlformats.org/drawingml/2006/main" name="Office Theme">
+  <a:themeElements>
+    <a:clrScheme name="Office">
+      <a:dk1>
+        <a:sysClr val="windowText" lastClr="000000"/>
+      </a:dk1>
+      <a:lt1>
+        <a:sysClr val="window" lastClr="FFFFFF"/>
+      </a:lt1>
+      <a:dk2>
+        <a:srgbClr val="44546A"/>
+      </a:dk2>
+      <a:lt2>
+        <a:srgbClr val="E7E6E6"/>
+      </a:lt2>
+      <a:accent1>
+        <a:srgbClr val="4472C4"/>
+      </a:accent1>
+      <a:accent2>
+        <a:srgbClr val="ED7D31"/>
+      </a:accent2>
+      <a:accent3>
+        <a:srgbClr val="A5A5A5"/>
+      </a:accent3>
+      <a:accent4>
+        <a:srgbClr val="FFC000"/>
+      </a:accent4>
+      <a:accent5>
+        <a:srgbClr val="5B9BD5"/>
+      </a:accent5>
+      <a:accent6>
+        <a:srgbClr val="70AD47"/>
+      </a:accent6>
+      <a:hlink>
+        <a:srgbClr val="0563C1"/>
+      </a:hlink>
+      <a:folHlink>
+        <a:srgbClr val="954F72"/>
+      </a:folHlink>
+    </a:clrScheme>
+    <a:fontScheme name="Office">
+      <a:majorFont>
+        <a:latin typeface="Calibri Light" panose="020F0302020204030204"/>
+        <a:ea typeface=""/>
+        <a:cs typeface=""/>
+        <a:font script="Jpan" typeface="游ゴシック Light"/>
+        <a:font script="Hang" typeface="맑은 고딕"/>
+        <a:font script="Hans" typeface="等线 Light"/>
+        <a:font script="Hant" typeface="新細明體"/>
+        <a:font script="Arab" typeface="Times New Roman"/>
+        <a:font script="Hebr" typeface="Times New Roman"/>
+        <a:font script="Thai" typeface="Angsana New"/>
+        <a:font script="Ethi" typeface="Nyala"/>
+        <a:font script="Beng" typeface="Vrinda"/>
+        <a:font script="Gujr" typeface="Shruti"/>
+        <a:font script="Khmr" typeface="MoolBoran"/>
+        <a:font script="Knda" typeface="Tunga"/>
+        <a:font script="Guru" typeface="Raavi"/>
+        <a:font script="Cans" typeface="Euphemia"/>
+        <a:font script="Cher" typeface="Plantagenet Cherokee"/>
+        <a:font script="Yiii" typeface="Microsoft Yi Baiti"/>
+        <a:font script="Tibt" typeface="Microsoft Himalaya"/>
+        <a:font script="Thaa" typeface="MV Boli"/>
+        <a:font script="Deva" typeface="Mangal"/>
+        <a:font script="Telu" typeface="Gautami"/>
+        <a:font script="Taml" typeface="Latha"/>
+        <a:font script="Syrc" typeface="Estrangelo Edessa"/>
+        <a:font script="Orya" typeface="Kalinga"/>
+        <a:font script="Mlym" typeface="Kartika"/>
+        <a:font script="Laoo" typeface="DokChampa"/>
+        <a:font script="Sinh" typeface="Iskoola Pota"/>
+        <a:font script="Mong" typeface="Mongolian Baiti"/>
+        <a:font script="Viet" typeface="Times New Roman"/>
+        <a:font script="Uigh" typeface="Microsoft Uighur"/>
+        <a:font script="Geor" typeface="Sylfaen"/>
+        <a:font script="Armn" typeface="Arial"/>
+        <a:font script="Bugi" typeface="Leelawadee UI"/>
+        <a:font script="Bopo" typeface="Microsoft JhengHei"/>
+        <a:font script="Java" typeface="Javanese Text"/>
+        <a:font script="Lisu" typeface="Segoe UI"/>
+        <a:font script="Mymr" typeface="Myanmar Text"/>
+        <a:font script="Nkoo" typeface="Ebrima"/>
+        <a:font script="Olck" typeface="Nirmala UI"/>
+        <a:font script="Osma" typeface="Ebrima"/>
+        <a:font script="Phag" typeface="Phagspa"/>
+        <a:font script="Syrn" typeface="Estrangelo Edessa"/>
+        <a:font script="Syrj" typeface="Estrangelo Edessa"/>
+        <a:font script="Syre" typeface="Estrangelo Edessa"/>
+        <a:font script="Sora" typeface="Nirmala UI"/>
+        <a:font script="Tale" typeface="Microsoft Tai Le"/>
+        <a:font script="Talu" typeface="Microsoft New Tai Lue"/>
+        <a:font script="Tfng" typeface="Ebrima"/>
+      </a:majorFont>
+      <a:minorFont>
+        <a:latin typeface="Calibri" panose="020F0502020204030204"/>
+        <a:ea typeface=""/>
+        <a:cs typeface=""/>
+        <a:font script="Jpan" typeface="游ゴシック"/>
+        <a:font script="Hang" typeface="맑은 고딕"/>
+        <a:font script="Hans" typeface="等线"/>
+        <a:font script="Hant" typeface="新細明體"/>
+        <a:font script="Arab" typeface="Arial"/>
+        <a:font script="Hebr" typeface="Arial"/>
+        <a:font script="Thai" typeface="Cordia New"/>
+        <a:font script="Ethi" typeface="Nyala"/>
+        <a:font script="Beng" typeface="Vrinda"/>
+        <a:font script="Gujr" typeface="Shruti"/>
+        <a:font script="Khmr" typeface="DaunPenh"/>
+        <a:font script="Knda" typeface="Tunga"/>
+        <a:font script="Guru" typeface="Raavi"/>
+        <a:font script="Cans" typeface="Euphemia"/>
+        <a:font script="Cher" typeface="Plantagenet Cherokee"/>
+        <a:font script="Yiii" typeface="Microsoft Yi Baiti"/>
+        <a:font script="Tibt" typeface="Microsoft Himalaya"/>
+        <a:font script="Thaa" typeface="MV Boli"/>
+        <a:font script="Deva" typeface="Mangal"/>
+        <a:font script="Telu" typeface="Gautami"/>
+        <a:font script="Taml" typeface="Latha"/>
+        <a:font script="Syrc" typeface="Estrangelo Edessa"/>
+        <a:font script="Orya" typeface="Kalinga"/>
+        <a:font script="Mlym" typeface="Kartika"/>
+        <a:font script="Laoo" typeface="DokChampa"/>
+        <a:font script="Sinh" typeface="Iskoola Pota"/>
+        <a:font script="Mong" typeface="Mongolian Baiti"/>
+        <a:font script="Viet" typeface="Arial"/>
+        <a:font script="Uigh" typeface="Microsoft Uighur"/>
+        <a:font script="Geor" typeface="Sylfaen"/>
+        <a:font script="Armn" typeface="Arial"/>
+        <a:font script="Bugi" typeface="Leelawadee UI"/>
+        <a:font script="Bopo" typeface="Microsoft JhengHei"/>
+        <a:font script="Java" typeface="Javanese Text"/>
+        <a:font script="Lisu" typeface="Segoe UI"/>
+        <a:font script="Mymr" typeface="Myanmar Text"/>
+        <a:font script="Nkoo" typeface="Ebrima"/>
+        <a:font script="Olck" typeface="Nirmala UI"/>
+        <a:font script="Osma" typeface="Ebrima"/>
+        <a:font script="Phag" typeface="Phagspa"/>
+        <a:font script="Syrn" typeface="Estrangelo Edessa"/>
+        <a:font script="Syrj" typeface="Estrangelo Edessa"/>
+        <a:font script="Syre" typeface="Estrangelo Edessa"/>
+        <a:font script="Sora" typeface="Nirmala UI"/>
+        <a:font script="Tale" typeface="Microsoft Tai Le"/>
+        <a:font script="Talu" typeface="Microsoft New Tai Lue"/>
+        <a:font script="Tfng" typeface="Ebrima"/>
+      </a:minorFont>
+    </a:fontScheme>
+    <a:fmtScheme name="Office">
+      <a:fillStyleLst>
+        <a:solidFill>
+          <a:schemeClr val="phClr"/>
+        </a:solidFill>
+        <a:gradFill rotWithShape="1">
+          <a:gsLst>
+            <a:gs pos="0">
+              <a:schemeClr val="phClr">
+                <a:lumMod val="110000"/>
+                <a:satMod val="105000"/>
+                <a:tint val="67000"/>
+              </a:schemeClr>
+            </a:gs>
+            <a:gs pos="50000">
+              <a:schemeClr val="phClr">
+                <a:lumMod val="105000"/>
+                <a:satMod val="103000"/>
+                <a:tint val="73000"/>
+              </a:schemeClr>
+            </a:gs>
+            <a:gs pos="100000">
+              <a:schemeClr val="phClr">
+                <a:lumMod val="105000"/>
+                <a:satMod val="109000"/>
+                <a:tint val="81000"/>
+              </a:schemeClr>
+            </a:gs>
+          </a:gsLst>
+          <a:lin ang="5400000" scaled="0"/>
+        </a:gradFill>
+        <a:gradFill rotWithShape="1">
+          <a:gsLst>
+            <a:gs pos="0">
+              <a:schemeClr val="phClr">
+                <a:satMod val="103000"/>
+                <a:lumMod val="102000"/>
+                <a:tint val="94000"/>
+              </a:schemeClr>
+            </a:gs>
+            <a:gs pos="50000">
+              <a:schemeClr val="phClr">
+                <a:satMod val="110000"/>
+                <a:lumMod val="100000"/>
+                <a:shade val="100000"/>
+              </a:schemeClr>
+            </a:gs>
+            <a:gs pos="100000">
+              <a:schemeClr val="phClr">
+                <a:lumMod val="99000"/>
+                <a:satMod val="120000"/>
+                <a:shade val="78000"/>
+              </a:schemeClr>
+            </a:gs>
+          </a:gsLst>
+          <a:lin ang="5400000" scaled="0"/>
+        </a:gradFill>
+      </a:fillStyleLst>
+      <a:lnStyleLst>
+        <a:ln w="6350" cap="flat" cmpd="sng" algn="ctr">
+          <a:solidFill>
+            <a:schemeClr val="phClr"/>
+          </a:solidFill>
+          <a:prstDash val="solid"/>
+          <a:miter lim="800000"/>
+        </a:ln>
+        <a:ln w="12700" cap="flat" cmpd="sng" algn="ctr">
+          <a:solidFill>
+            <a:schemeClr val="phClr"/>
+          </a:solidFill>
+          <a:prstDash val="solid"/>
+          <a:miter lim="800000"/>
+        </a:ln>
+        <a:ln w="19050" cap="flat" cmpd="sng" algn="ctr">
+          <a:solidFill>
+            <a:schemeClr val="phClr"/>
+          </a:solidFill>
+          <a:prstDash val="solid"/>
+          <a:miter lim="800000"/>
+        </a:ln>
+      </a:lnStyleLst>
+      <a:effectStyleLst>
+        <a:effectStyle>
+          <a:effectLst/>
+        </a:effectStyle>
+        <a:effectStyle>
+          <a:effectLst/>
+        </a:effectStyle>
+        <a:effectStyle>
+          <a:effectLst>
+            <a:outerShdw blurRad="57150" dist="19050" dir="5400000" algn="ctr" rotWithShape="0">
+              <a:srgbClr val="000000">
+                <a:alpha val="63000"/>
+              </a:srgbClr>
+            </a:outerShdw>
+          </a:effectLst>
+        </a:effectStyle>
+      </a:effectStyleLst>
+      <a:bgFillStyleLst>
+        <a:solidFill>
+          <a:schemeClr val="phClr"/>
+        </a:solidFill>
+        <a:solidFill>
+          <a:schemeClr val="phClr">
+            <a:tint val="95000"/>
+            <a:satMod val="170000"/>
+          </a:schemeClr>
+        </a:solidFill>
+        <a:gradFill rotWithShape="1">
+          <a:gsLst>
+            <a:gs pos="0">
+              <a:schemeClr val="phClr">
+                <a:tint val="93000"/>
+                <a:satMod val="150000"/>
+                <a:shade val="98000"/>
+                <a:lumMod val="102000"/>
+              </a:schemeClr>
+            </a:gs>
+            <a:gs pos="50000">
+              <a:schemeClr val="phClr">
+                <a:tint val="98000"/>
+                <a:satMod val="130000"/>
+                <a:shade val="90000"/>
+                <a:lumMod val="103000"/>
+              </a:schemeClr>
+            </a:gs>
+            <a:gs pos="100000">
+              <a:schemeClr val="phClr">
+                <a:shade val="63000"/>
+                <a:satMod val="120000"/>
+              </a:schemeClr>
+            </a:gs>
+          </a:gsLst>
+          <a:lin ang="5400000" scaled="0"/>
+        </a:gradFill>
+      </a:bgFillStyleLst>
+    </a:fmtScheme>
+  </a:themeElements>
+  <a:objectDefaults/>
+  <a:extraClrSchemeLst/>
+  <a:extLst>
+    <a:ext uri="{05A4C25C-085E-4340-85A3-A5531E510DB2}">
+      <thm15:themeFamily xmlns:thm15="http://schemas.microsoft.com/office/thememl/2012/main" name="Office Theme" id="{62F939B6-93AF-4DB8-9C6B-D6C7DFDC589F}" vid="{4A3C46E8-61CC-4603-A589-7422A47A8E4A}"/>
+    </a:ext>
+  </a:extLst>
+</a:theme>
 </file>
</xml_diff>

<commit_message>
SC-165: Add TextBox.AutofitType (#186)
* SC-165: Add .NET 6 target

* SC-165: Add TextBox.AutoFitType

* SC-165: Fix tests for .NET Framework 4.8

* SC-165: Add ITextBoxContainer.Shape

* SC-165: Remove .NET 6 target

* SC-165: Update README

* SC-165: Add .NET 6 in CI

* SC-165: Remove .NET 6 from test project targets

* SC-165: Set C# 8.0

* SC-165: Downgrade System.Drawing.Common to 5.0.1

* SC-165: Upgrade System.Drawing.Common" to 5.0.3 version

* SC-165: Fix Release build

* SC-165: Adjust nullable types
</commit_message>
<xml_diff>
--- a/ShapeCrawler.Tests.Unit/Resource/001.pptx
+++ b/ShapeCrawler.Tests.Unit/Resource/001.pptx
@@ -201,7 +201,7 @@
           <a:p>
             <a:fld id="{12586301-C795-4E70-B468-514DB1C1B146}" type="datetimeFigureOut">
               <a:rPr lang="en-US" smtClean="0"/>
-              <a:t>9/24/2021</a:t>
+              <a:t>12/17/2021</a:t>
             </a:fld>
             <a:endParaRPr lang="en-US"/>
           </a:p>
@@ -704,7 +704,7 @@
           <a:p>
             <a:fld id="{6A2D1428-0459-4F75-829F-043936AE8C9E}" type="datetimeFigureOut">
               <a:rPr lang="en-US" smtClean="0"/>
-              <a:t>9/24/2021</a:t>
+              <a:t>12/17/2021</a:t>
             </a:fld>
             <a:endParaRPr lang="en-US"/>
           </a:p>
@@ -1000,7 +1000,7 @@
           <a:p>
             <a:fld id="{6A2D1428-0459-4F75-829F-043936AE8C9E}" type="datetimeFigureOut">
               <a:rPr lang="en-US" smtClean="0"/>
-              <a:t>9/24/2021</a:t>
+              <a:t>12/17/2021</a:t>
             </a:fld>
             <a:endParaRPr lang="en-US"/>
           </a:p>
@@ -1210,7 +1210,7 @@
           <a:p>
             <a:fld id="{6A2D1428-0459-4F75-829F-043936AE8C9E}" type="datetimeFigureOut">
               <a:rPr lang="en-US" smtClean="0"/>
-              <a:t>9/24/2021</a:t>
+              <a:t>12/17/2021</a:t>
             </a:fld>
             <a:endParaRPr lang="en-US"/>
           </a:p>
@@ -1410,7 +1410,7 @@
           <a:p>
             <a:fld id="{6A2D1428-0459-4F75-829F-043936AE8C9E}" type="datetimeFigureOut">
               <a:rPr lang="en-US" smtClean="0"/>
-              <a:t>9/24/2021</a:t>
+              <a:t>12/17/2021</a:t>
             </a:fld>
             <a:endParaRPr lang="en-US"/>
           </a:p>
@@ -1686,7 +1686,7 @@
           <a:p>
             <a:fld id="{6A2D1428-0459-4F75-829F-043936AE8C9E}" type="datetimeFigureOut">
               <a:rPr lang="en-US" smtClean="0"/>
-              <a:t>9/24/2021</a:t>
+              <a:t>12/17/2021</a:t>
             </a:fld>
             <a:endParaRPr lang="en-US"/>
           </a:p>
@@ -1954,7 +1954,7 @@
           <a:p>
             <a:fld id="{6A2D1428-0459-4F75-829F-043936AE8C9E}" type="datetimeFigureOut">
               <a:rPr lang="en-US" smtClean="0"/>
-              <a:t>9/24/2021</a:t>
+              <a:t>12/17/2021</a:t>
             </a:fld>
             <a:endParaRPr lang="en-US"/>
           </a:p>
@@ -2369,7 +2369,7 @@
           <a:p>
             <a:fld id="{6A2D1428-0459-4F75-829F-043936AE8C9E}" type="datetimeFigureOut">
               <a:rPr lang="en-US" smtClean="0"/>
-              <a:t>9/24/2021</a:t>
+              <a:t>12/17/2021</a:t>
             </a:fld>
             <a:endParaRPr lang="en-US"/>
           </a:p>
@@ -2511,7 +2511,7 @@
           <a:p>
             <a:fld id="{6A2D1428-0459-4F75-829F-043936AE8C9E}" type="datetimeFigureOut">
               <a:rPr lang="en-US" smtClean="0"/>
-              <a:t>9/24/2021</a:t>
+              <a:t>12/17/2021</a:t>
             </a:fld>
             <a:endParaRPr lang="en-US"/>
           </a:p>
@@ -2624,7 +2624,7 @@
           <a:p>
             <a:fld id="{6A2D1428-0459-4F75-829F-043936AE8C9E}" type="datetimeFigureOut">
               <a:rPr lang="en-US" smtClean="0"/>
-              <a:t>9/24/2021</a:t>
+              <a:t>12/17/2021</a:t>
             </a:fld>
             <a:endParaRPr lang="en-US"/>
           </a:p>
@@ -2937,7 +2937,7 @@
           <a:p>
             <a:fld id="{6A2D1428-0459-4F75-829F-043936AE8C9E}" type="datetimeFigureOut">
               <a:rPr lang="en-US" smtClean="0"/>
-              <a:t>9/24/2021</a:t>
+              <a:t>12/17/2021</a:t>
             </a:fld>
             <a:endParaRPr lang="en-US"/>
           </a:p>
@@ -3226,7 +3226,7 @@
           <a:p>
             <a:fld id="{6A2D1428-0459-4F75-829F-043936AE8C9E}" type="datetimeFigureOut">
               <a:rPr lang="en-US" smtClean="0"/>
-              <a:t>9/24/2021</a:t>
+              <a:t>12/17/2021</a:t>
             </a:fld>
             <a:endParaRPr lang="en-US"/>
           </a:p>
@@ -3469,7 +3469,7 @@
           <a:p>
             <a:fld id="{6A2D1428-0459-4F75-829F-043936AE8C9E}" type="datetimeFigureOut">
               <a:rPr lang="en-US" smtClean="0"/>
-              <a:t>9/24/2021</a:t>
+              <a:t>12/17/2021</a:t>
             </a:fld>
             <a:endParaRPr lang="en-US"/>
           </a:p>
@@ -4190,12 +4190,12 @@
           <a:graphicData uri="http://schemas.openxmlformats.org/presentationml/2006/ole">
             <mc:AlternateContent xmlns:mc="http://schemas.openxmlformats.org/markup-compatibility/2006">
               <mc:Choice xmlns:v="urn:schemas-microsoft-com:vml" Requires="v">
-                <p:oleObj name="PDF" r:id="rId13" imgW="0" imgH="360" progId="FoxitReader.Document">
+                <p:oleObj spid="_x0000_s1028" name="PDF" r:id="rId14" imgW="0" imgH="360" progId="FoxitReader.Document">
                   <p:embed/>
                 </p:oleObj>
               </mc:Choice>
               <mc:Fallback>
-                <p:oleObj name="PDF" r:id="rId13" imgW="0" imgH="360" progId="FoxitReader.Document">
+                <p:oleObj name="PDF" r:id="rId14" imgW="0" imgH="360" progId="FoxitReader.Document">
                   <p:embed/>
                   <p:pic>
                     <p:nvPicPr>
@@ -4204,7 +4204,7 @@
                       <p:nvPr/>
                     </p:nvPicPr>
                     <p:blipFill>
-                      <a:blip r:embed="rId14"/>
+                      <a:blip r:embed="rId15"/>
                       <a:stretch>
                         <a:fillRect/>
                       </a:stretch>
@@ -4880,6 +4880,61 @@
           </a:p>
         </p:txBody>
       </p:sp>
+      <p:sp>
+        <p:nvSpPr>
+          <p:cNvPr id="9" name="TextBox 8">
+            <a:extLst>
+              <a:ext uri="{FF2B5EF4-FFF2-40B4-BE49-F238E27FC236}">
+                <a16:creationId xmlns:a16="http://schemas.microsoft.com/office/drawing/2014/main" id="{F6054280-29CF-42B0-82D1-A23065EF97D6}"/>
+              </a:ext>
+            </a:extLst>
+          </p:cNvPr>
+          <p:cNvSpPr txBox="1"/>
+          <p:nvPr/>
+        </p:nvSpPr>
+        <p:spPr>
+          <a:xfrm>
+            <a:off x="4876801" y="4947138"/>
+            <a:ext cx="1219199" cy="307777"/>
+          </a:xfrm>
+          <a:prstGeom prst="rect">
+            <a:avLst/>
+          </a:prstGeom>
+        </p:spPr>
+        <p:style>
+          <a:lnRef idx="2">
+            <a:schemeClr val="accent5"/>
+          </a:lnRef>
+          <a:fillRef idx="1">
+            <a:schemeClr val="lt1"/>
+          </a:fillRef>
+          <a:effectRef idx="0">
+            <a:schemeClr val="accent5"/>
+          </a:effectRef>
+          <a:fontRef idx="minor">
+            <a:schemeClr val="dk1"/>
+          </a:fontRef>
+        </p:style>
+        <p:txBody>
+          <a:bodyPr wrap="square" rtlCol="0">
+            <a:normAutofit fontScale="77500" lnSpcReduction="20000"/>
+          </a:bodyPr>
+          <a:lstStyle/>
+          <a:p>
+            <a:r>
+              <a:rPr lang="en-US" sz="1400" dirty="0">
+                <a:latin typeface="Times New Roman" panose="02020603050405020304" pitchFamily="18" charset="0"/>
+                <a:cs typeface="Times New Roman" panose="02020603050405020304" pitchFamily="18" charset="0"/>
+              </a:rPr>
+              <a:t>Id9_Test Shrinks</a:t>
+            </a:r>
+            <a:endParaRPr lang="ru-RU" sz="1400" b="1" dirty="0">
+              <a:latin typeface="Times New Roman" panose="02020603050405020304" pitchFamily="18" charset="0"/>
+              <a:cs typeface="Times New Roman" panose="02020603050405020304" pitchFamily="18" charset="0"/>
+            </a:endParaRPr>
+          </a:p>
+        </p:txBody>
+      </p:sp>
     </p:spTree>
     <p:extLst>
       <p:ext uri="{BB962C8B-B14F-4D97-AF65-F5344CB8AC3E}">
@@ -6728,7 +6783,9 @@
         </p:nvSpPr>
         <p:spPr/>
         <p:txBody>
-          <a:bodyPr/>
+          <a:bodyPr>
+            <a:normAutofit lnSpcReduction="10000"/>
+          </a:bodyPr>
           <a:lstStyle/>
           <a:p>
             <a:endParaRPr lang="ru-RU"/>

</xml_diff>

<commit_message>
SC-204: Remove unused ShapeContext references
</commit_message>
<xml_diff>
--- a/ShapeCrawler.Tests.Unit/Resource/001.pptx
+++ b/ShapeCrawler.Tests.Unit/Resource/001.pptx
@@ -201,7 +201,7 @@
           <a:p>
             <a:fld id="{12586301-C795-4E70-B468-514DB1C1B146}" type="datetimeFigureOut">
               <a:rPr lang="en-US" smtClean="0"/>
-              <a:t>12/17/2021</a:t>
+              <a:t>1/22/2022</a:t>
             </a:fld>
             <a:endParaRPr lang="en-US"/>
           </a:p>
@@ -704,7 +704,7 @@
           <a:p>
             <a:fld id="{6A2D1428-0459-4F75-829F-043936AE8C9E}" type="datetimeFigureOut">
               <a:rPr lang="en-US" smtClean="0"/>
-              <a:t>12/17/2021</a:t>
+              <a:t>1/22/2022</a:t>
             </a:fld>
             <a:endParaRPr lang="en-US"/>
           </a:p>
@@ -1000,7 +1000,7 @@
           <a:p>
             <a:fld id="{6A2D1428-0459-4F75-829F-043936AE8C9E}" type="datetimeFigureOut">
               <a:rPr lang="en-US" smtClean="0"/>
-              <a:t>12/17/2021</a:t>
+              <a:t>1/22/2022</a:t>
             </a:fld>
             <a:endParaRPr lang="en-US"/>
           </a:p>
@@ -1210,7 +1210,7 @@
           <a:p>
             <a:fld id="{6A2D1428-0459-4F75-829F-043936AE8C9E}" type="datetimeFigureOut">
               <a:rPr lang="en-US" smtClean="0"/>
-              <a:t>12/17/2021</a:t>
+              <a:t>1/22/2022</a:t>
             </a:fld>
             <a:endParaRPr lang="en-US"/>
           </a:p>
@@ -1410,7 +1410,7 @@
           <a:p>
             <a:fld id="{6A2D1428-0459-4F75-829F-043936AE8C9E}" type="datetimeFigureOut">
               <a:rPr lang="en-US" smtClean="0"/>
-              <a:t>12/17/2021</a:t>
+              <a:t>1/22/2022</a:t>
             </a:fld>
             <a:endParaRPr lang="en-US"/>
           </a:p>
@@ -1686,7 +1686,7 @@
           <a:p>
             <a:fld id="{6A2D1428-0459-4F75-829F-043936AE8C9E}" type="datetimeFigureOut">
               <a:rPr lang="en-US" smtClean="0"/>
-              <a:t>12/17/2021</a:t>
+              <a:t>1/22/2022</a:t>
             </a:fld>
             <a:endParaRPr lang="en-US"/>
           </a:p>
@@ -1954,7 +1954,7 @@
           <a:p>
             <a:fld id="{6A2D1428-0459-4F75-829F-043936AE8C9E}" type="datetimeFigureOut">
               <a:rPr lang="en-US" smtClean="0"/>
-              <a:t>12/17/2021</a:t>
+              <a:t>1/22/2022</a:t>
             </a:fld>
             <a:endParaRPr lang="en-US"/>
           </a:p>
@@ -2369,7 +2369,7 @@
           <a:p>
             <a:fld id="{6A2D1428-0459-4F75-829F-043936AE8C9E}" type="datetimeFigureOut">
               <a:rPr lang="en-US" smtClean="0"/>
-              <a:t>12/17/2021</a:t>
+              <a:t>1/22/2022</a:t>
             </a:fld>
             <a:endParaRPr lang="en-US"/>
           </a:p>
@@ -2511,7 +2511,7 @@
           <a:p>
             <a:fld id="{6A2D1428-0459-4F75-829F-043936AE8C9E}" type="datetimeFigureOut">
               <a:rPr lang="en-US" smtClean="0"/>
-              <a:t>12/17/2021</a:t>
+              <a:t>1/22/2022</a:t>
             </a:fld>
             <a:endParaRPr lang="en-US"/>
           </a:p>
@@ -2624,7 +2624,7 @@
           <a:p>
             <a:fld id="{6A2D1428-0459-4F75-829F-043936AE8C9E}" type="datetimeFigureOut">
               <a:rPr lang="en-US" smtClean="0"/>
-              <a:t>12/17/2021</a:t>
+              <a:t>1/22/2022</a:t>
             </a:fld>
             <a:endParaRPr lang="en-US"/>
           </a:p>
@@ -2937,7 +2937,7 @@
           <a:p>
             <a:fld id="{6A2D1428-0459-4F75-829F-043936AE8C9E}" type="datetimeFigureOut">
               <a:rPr lang="en-US" smtClean="0"/>
-              <a:t>12/17/2021</a:t>
+              <a:t>1/22/2022</a:t>
             </a:fld>
             <a:endParaRPr lang="en-US"/>
           </a:p>
@@ -3226,7 +3226,7 @@
           <a:p>
             <a:fld id="{6A2D1428-0459-4F75-829F-043936AE8C9E}" type="datetimeFigureOut">
               <a:rPr lang="en-US" smtClean="0"/>
-              <a:t>12/17/2021</a:t>
+              <a:t>1/22/2022</a:t>
             </a:fld>
             <a:endParaRPr lang="en-US"/>
           </a:p>
@@ -3469,7 +3469,7 @@
           <a:p>
             <a:fld id="{6A2D1428-0459-4F75-829F-043936AE8C9E}" type="datetimeFigureOut">
               <a:rPr lang="en-US" smtClean="0"/>
-              <a:t>12/17/2021</a:t>
+              <a:t>1/22/2022</a:t>
             </a:fld>
             <a:endParaRPr lang="en-US"/>
           </a:p>
@@ -4190,7 +4190,7 @@
           <a:graphicData uri="http://schemas.openxmlformats.org/presentationml/2006/ole">
             <mc:AlternateContent xmlns:mc="http://schemas.openxmlformats.org/markup-compatibility/2006">
               <mc:Choice xmlns:v="urn:schemas-microsoft-com:vml" Requires="v">
-                <p:oleObj spid="_x0000_s1028" name="PDF" r:id="rId14" imgW="0" imgH="360" progId="FoxitReader.Document">
+                <p:oleObj spid="_x0000_s1029" name="PDF" r:id="rId14" imgW="0" imgH="360" progId="FoxitReader.Document">
                   <p:embed/>
                 </p:oleObj>
               </mc:Choice>
@@ -4935,6 +4935,42 @@
           </a:p>
         </p:txBody>
       </p:sp>
+      <p:cxnSp>
+        <p:nvCxnSpPr>
+          <p:cNvPr id="10" name="Straight Connector 9">
+            <a:extLst>
+              <a:ext uri="{FF2B5EF4-FFF2-40B4-BE49-F238E27FC236}">
+                <a16:creationId xmlns:a16="http://schemas.microsoft.com/office/drawing/2014/main" id="{F5A40058-BE66-4257-AB3B-F33C669A2325}"/>
+              </a:ext>
+            </a:extLst>
+          </p:cNvPr>
+          <p:cNvCxnSpPr/>
+          <p:nvPr/>
+        </p:nvCxnSpPr>
+        <p:spPr>
+          <a:xfrm>
+            <a:off x="1455938" y="1122363"/>
+            <a:ext cx="2432481" cy="0"/>
+          </a:xfrm>
+          <a:prstGeom prst="line">
+            <a:avLst/>
+          </a:prstGeom>
+        </p:spPr>
+        <p:style>
+          <a:lnRef idx="1">
+            <a:schemeClr val="accent1"/>
+          </a:lnRef>
+          <a:fillRef idx="0">
+            <a:schemeClr val="accent1"/>
+          </a:fillRef>
+          <a:effectRef idx="0">
+            <a:schemeClr val="accent1"/>
+          </a:effectRef>
+          <a:fontRef idx="minor">
+            <a:schemeClr val="tx1"/>
+          </a:fontRef>
+        </p:style>
+      </p:cxnSp>
     </p:spTree>
     <p:extLst>
       <p:ext uri="{BB962C8B-B14F-4D97-AF65-F5344CB8AC3E}">

</xml_diff>

<commit_message>
SC-218: Add `IParagraph.TextAlignment` property
</commit_message>
<xml_diff>
--- a/ShapeCrawler.Tests.Unit/Resource/001.pptx
+++ b/ShapeCrawler.Tests.Unit/Resource/001.pptx
@@ -201,7 +201,7 @@
           <a:p>
             <a:fld id="{12586301-C795-4E70-B468-514DB1C1B146}" type="datetimeFigureOut">
               <a:rPr lang="en-US" smtClean="0"/>
-              <a:t>1/22/2022</a:t>
+              <a:t>2/5/2022</a:t>
             </a:fld>
             <a:endParaRPr lang="en-US"/>
           </a:p>
@@ -704,7 +704,7 @@
           <a:p>
             <a:fld id="{6A2D1428-0459-4F75-829F-043936AE8C9E}" type="datetimeFigureOut">
               <a:rPr lang="en-US" smtClean="0"/>
-              <a:t>1/22/2022</a:t>
+              <a:t>2/5/2022</a:t>
             </a:fld>
             <a:endParaRPr lang="en-US"/>
           </a:p>
@@ -1000,7 +1000,7 @@
           <a:p>
             <a:fld id="{6A2D1428-0459-4F75-829F-043936AE8C9E}" type="datetimeFigureOut">
               <a:rPr lang="en-US" smtClean="0"/>
-              <a:t>1/22/2022</a:t>
+              <a:t>2/5/2022</a:t>
             </a:fld>
             <a:endParaRPr lang="en-US"/>
           </a:p>
@@ -1210,7 +1210,7 @@
           <a:p>
             <a:fld id="{6A2D1428-0459-4F75-829F-043936AE8C9E}" type="datetimeFigureOut">
               <a:rPr lang="en-US" smtClean="0"/>
-              <a:t>1/22/2022</a:t>
+              <a:t>2/5/2022</a:t>
             </a:fld>
             <a:endParaRPr lang="en-US"/>
           </a:p>
@@ -1410,7 +1410,7 @@
           <a:p>
             <a:fld id="{6A2D1428-0459-4F75-829F-043936AE8C9E}" type="datetimeFigureOut">
               <a:rPr lang="en-US" smtClean="0"/>
-              <a:t>1/22/2022</a:t>
+              <a:t>2/5/2022</a:t>
             </a:fld>
             <a:endParaRPr lang="en-US"/>
           </a:p>
@@ -1686,7 +1686,7 @@
           <a:p>
             <a:fld id="{6A2D1428-0459-4F75-829F-043936AE8C9E}" type="datetimeFigureOut">
               <a:rPr lang="en-US" smtClean="0"/>
-              <a:t>1/22/2022</a:t>
+              <a:t>2/5/2022</a:t>
             </a:fld>
             <a:endParaRPr lang="en-US"/>
           </a:p>
@@ -1954,7 +1954,7 @@
           <a:p>
             <a:fld id="{6A2D1428-0459-4F75-829F-043936AE8C9E}" type="datetimeFigureOut">
               <a:rPr lang="en-US" smtClean="0"/>
-              <a:t>1/22/2022</a:t>
+              <a:t>2/5/2022</a:t>
             </a:fld>
             <a:endParaRPr lang="en-US"/>
           </a:p>
@@ -2369,7 +2369,7 @@
           <a:p>
             <a:fld id="{6A2D1428-0459-4F75-829F-043936AE8C9E}" type="datetimeFigureOut">
               <a:rPr lang="en-US" smtClean="0"/>
-              <a:t>1/22/2022</a:t>
+              <a:t>2/5/2022</a:t>
             </a:fld>
             <a:endParaRPr lang="en-US"/>
           </a:p>
@@ -2511,7 +2511,7 @@
           <a:p>
             <a:fld id="{6A2D1428-0459-4F75-829F-043936AE8C9E}" type="datetimeFigureOut">
               <a:rPr lang="en-US" smtClean="0"/>
-              <a:t>1/22/2022</a:t>
+              <a:t>2/5/2022</a:t>
             </a:fld>
             <a:endParaRPr lang="en-US"/>
           </a:p>
@@ -2624,7 +2624,7 @@
           <a:p>
             <a:fld id="{6A2D1428-0459-4F75-829F-043936AE8C9E}" type="datetimeFigureOut">
               <a:rPr lang="en-US" smtClean="0"/>
-              <a:t>1/22/2022</a:t>
+              <a:t>2/5/2022</a:t>
             </a:fld>
             <a:endParaRPr lang="en-US"/>
           </a:p>
@@ -2937,7 +2937,7 @@
           <a:p>
             <a:fld id="{6A2D1428-0459-4F75-829F-043936AE8C9E}" type="datetimeFigureOut">
               <a:rPr lang="en-US" smtClean="0"/>
-              <a:t>1/22/2022</a:t>
+              <a:t>2/5/2022</a:t>
             </a:fld>
             <a:endParaRPr lang="en-US"/>
           </a:p>
@@ -3226,7 +3226,7 @@
           <a:p>
             <a:fld id="{6A2D1428-0459-4F75-829F-043936AE8C9E}" type="datetimeFigureOut">
               <a:rPr lang="en-US" smtClean="0"/>
-              <a:t>1/22/2022</a:t>
+              <a:t>2/5/2022</a:t>
             </a:fld>
             <a:endParaRPr lang="en-US"/>
           </a:p>
@@ -3469,7 +3469,7 @@
           <a:p>
             <a:fld id="{6A2D1428-0459-4F75-829F-043936AE8C9E}" type="datetimeFigureOut">
               <a:rPr lang="en-US" smtClean="0"/>
-              <a:t>1/22/2022</a:t>
+              <a:t>2/5/2022</a:t>
             </a:fld>
             <a:endParaRPr lang="en-US"/>
           </a:p>
@@ -4190,7 +4190,7 @@
           <a:graphicData uri="http://schemas.openxmlformats.org/presentationml/2006/ole">
             <mc:AlternateContent xmlns:mc="http://schemas.openxmlformats.org/markup-compatibility/2006">
               <mc:Choice xmlns:v="urn:schemas-microsoft-com:vml" Requires="v">
-                <p:oleObj spid="_x0000_s1029" name="PDF" r:id="rId14" imgW="0" imgH="360" progId="FoxitReader.Document">
+                <p:oleObj spid="_x0000_s1030" name="PDF" r:id="rId14" imgW="0" imgH="360" progId="FoxitReader.Document">
                   <p:embed/>
                 </p:oleObj>
               </mc:Choice>
@@ -4568,10 +4568,9 @@
           <a:lstStyle/>
           <a:p>
             <a:r>
-              <a:rPr lang="en-US"/>
+              <a:rPr lang="en-US" dirty="0"/>
               <a:t>Id2_titlePh</a:t>
             </a:r>
-            <a:endParaRPr lang="en-US" dirty="0"/>
           </a:p>
         </p:txBody>
       </p:sp>
@@ -4616,6 +4615,7 @@
           </a:bodyPr>
           <a:lstStyle/>
           <a:p>
+            <a:pPr algn="ctr"/>
             <a:r>
               <a:rPr lang="en-US" sz="1600" dirty="0"/>
               <a:t>id4</a:t>

</xml_diff>

<commit_message>
SC-218: Parse alignment of Centered Title
</commit_message>
<xml_diff>
--- a/ShapeCrawler.Tests.Unit/Resource/001.pptx
+++ b/ShapeCrawler.Tests.Unit/Resource/001.pptx
@@ -201,7 +201,7 @@
           <a:p>
             <a:fld id="{12586301-C795-4E70-B468-514DB1C1B146}" type="datetimeFigureOut">
               <a:rPr lang="en-US" smtClean="0"/>
-              <a:t>2/5/2022</a:t>
+              <a:t>2/6/2022</a:t>
             </a:fld>
             <a:endParaRPr lang="en-US"/>
           </a:p>
@@ -704,7 +704,7 @@
           <a:p>
             <a:fld id="{6A2D1428-0459-4F75-829F-043936AE8C9E}" type="datetimeFigureOut">
               <a:rPr lang="en-US" smtClean="0"/>
-              <a:t>2/5/2022</a:t>
+              <a:t>2/6/2022</a:t>
             </a:fld>
             <a:endParaRPr lang="en-US"/>
           </a:p>
@@ -1000,7 +1000,7 @@
           <a:p>
             <a:fld id="{6A2D1428-0459-4F75-829F-043936AE8C9E}" type="datetimeFigureOut">
               <a:rPr lang="en-US" smtClean="0"/>
-              <a:t>2/5/2022</a:t>
+              <a:t>2/6/2022</a:t>
             </a:fld>
             <a:endParaRPr lang="en-US"/>
           </a:p>
@@ -1210,7 +1210,7 @@
           <a:p>
             <a:fld id="{6A2D1428-0459-4F75-829F-043936AE8C9E}" type="datetimeFigureOut">
               <a:rPr lang="en-US" smtClean="0"/>
-              <a:t>2/5/2022</a:t>
+              <a:t>2/6/2022</a:t>
             </a:fld>
             <a:endParaRPr lang="en-US"/>
           </a:p>
@@ -1410,7 +1410,7 @@
           <a:p>
             <a:fld id="{6A2D1428-0459-4F75-829F-043936AE8C9E}" type="datetimeFigureOut">
               <a:rPr lang="en-US" smtClean="0"/>
-              <a:t>2/5/2022</a:t>
+              <a:t>2/6/2022</a:t>
             </a:fld>
             <a:endParaRPr lang="en-US"/>
           </a:p>
@@ -1686,7 +1686,7 @@
           <a:p>
             <a:fld id="{6A2D1428-0459-4F75-829F-043936AE8C9E}" type="datetimeFigureOut">
               <a:rPr lang="en-US" smtClean="0"/>
-              <a:t>2/5/2022</a:t>
+              <a:t>2/6/2022</a:t>
             </a:fld>
             <a:endParaRPr lang="en-US"/>
           </a:p>
@@ -1954,7 +1954,7 @@
           <a:p>
             <a:fld id="{6A2D1428-0459-4F75-829F-043936AE8C9E}" type="datetimeFigureOut">
               <a:rPr lang="en-US" smtClean="0"/>
-              <a:t>2/5/2022</a:t>
+              <a:t>2/6/2022</a:t>
             </a:fld>
             <a:endParaRPr lang="en-US"/>
           </a:p>
@@ -2369,7 +2369,7 @@
           <a:p>
             <a:fld id="{6A2D1428-0459-4F75-829F-043936AE8C9E}" type="datetimeFigureOut">
               <a:rPr lang="en-US" smtClean="0"/>
-              <a:t>2/5/2022</a:t>
+              <a:t>2/6/2022</a:t>
             </a:fld>
             <a:endParaRPr lang="en-US"/>
           </a:p>
@@ -2511,7 +2511,7 @@
           <a:p>
             <a:fld id="{6A2D1428-0459-4F75-829F-043936AE8C9E}" type="datetimeFigureOut">
               <a:rPr lang="en-US" smtClean="0"/>
-              <a:t>2/5/2022</a:t>
+              <a:t>2/6/2022</a:t>
             </a:fld>
             <a:endParaRPr lang="en-US"/>
           </a:p>
@@ -2624,7 +2624,7 @@
           <a:p>
             <a:fld id="{6A2D1428-0459-4F75-829F-043936AE8C9E}" type="datetimeFigureOut">
               <a:rPr lang="en-US" smtClean="0"/>
-              <a:t>2/5/2022</a:t>
+              <a:t>2/6/2022</a:t>
             </a:fld>
             <a:endParaRPr lang="en-US"/>
           </a:p>
@@ -2937,7 +2937,7 @@
           <a:p>
             <a:fld id="{6A2D1428-0459-4F75-829F-043936AE8C9E}" type="datetimeFigureOut">
               <a:rPr lang="en-US" smtClean="0"/>
-              <a:t>2/5/2022</a:t>
+              <a:t>2/6/2022</a:t>
             </a:fld>
             <a:endParaRPr lang="en-US"/>
           </a:p>
@@ -3226,7 +3226,7 @@
           <a:p>
             <a:fld id="{6A2D1428-0459-4F75-829F-043936AE8C9E}" type="datetimeFigureOut">
               <a:rPr lang="en-US" smtClean="0"/>
-              <a:t>2/5/2022</a:t>
+              <a:t>2/6/2022</a:t>
             </a:fld>
             <a:endParaRPr lang="en-US"/>
           </a:p>
@@ -3469,7 +3469,7 @@
           <a:p>
             <a:fld id="{6A2D1428-0459-4F75-829F-043936AE8C9E}" type="datetimeFigureOut">
               <a:rPr lang="en-US" smtClean="0"/>
-              <a:t>2/5/2022</a:t>
+              <a:t>2/6/2022</a:t>
             </a:fld>
             <a:endParaRPr lang="en-US"/>
           </a:p>
@@ -4190,7 +4190,7 @@
           <a:graphicData uri="http://schemas.openxmlformats.org/presentationml/2006/ole">
             <mc:AlternateContent xmlns:mc="http://schemas.openxmlformats.org/markup-compatibility/2006">
               <mc:Choice xmlns:v="urn:schemas-microsoft-com:vml" Requires="v">
-                <p:oleObj spid="_x0000_s1030" name="PDF" r:id="rId14" imgW="0" imgH="360" progId="FoxitReader.Document">
+                <p:oleObj spid="_x0000_s1031" name="PDF" r:id="rId14" imgW="0" imgH="360" progId="FoxitReader.Document">
                   <p:embed/>
                 </p:oleObj>
               </mc:Choice>
@@ -4548,7 +4548,7 @@
       </p:grpSpPr>
       <p:sp>
         <p:nvSpPr>
-          <p:cNvPr id="2" name="Заголовок 1">
+          <p:cNvPr id="2" name="Head 1">
             <a:extLst>
               <a:ext uri="{FF2B5EF4-FFF2-40B4-BE49-F238E27FC236}">
                 <a16:creationId xmlns:a16="http://schemas.microsoft.com/office/drawing/2014/main" id="{287F069E-5FCC-49F5-9C9D-C412CFAEB4D1}"/>

</xml_diff>